<commit_message>
add stream video player
</commit_message>
<xml_diff>
--- a/2.Design/ui.pptx
+++ b/2.Design/ui.pptx
@@ -299,7 +299,7 @@
             <a:fld id="{72AB7076-BA11-4D5D-90BA-2C7F8A65331E}" type="datetimeFigureOut">
               <a:rPr lang="ko-KR" altLang="en-US" smtClean="0"/>
               <a:pPr/>
-              <a:t>2018-02-21</a:t>
+              <a:t>2018-03-06</a:t>
             </a:fld>
             <a:endParaRPr lang="ko-KR" altLang="en-US" dirty="0"/>
           </a:p>
@@ -466,7 +466,7 @@
             <a:fld id="{72AB7076-BA11-4D5D-90BA-2C7F8A65331E}" type="datetimeFigureOut">
               <a:rPr lang="ko-KR" altLang="en-US" smtClean="0"/>
               <a:pPr/>
-              <a:t>2018-02-21</a:t>
+              <a:t>2018-03-06</a:t>
             </a:fld>
             <a:endParaRPr lang="ko-KR" altLang="en-US" dirty="0"/>
           </a:p>
@@ -643,7 +643,7 @@
             <a:fld id="{72AB7076-BA11-4D5D-90BA-2C7F8A65331E}" type="datetimeFigureOut">
               <a:rPr lang="ko-KR" altLang="en-US" smtClean="0"/>
               <a:pPr/>
-              <a:t>2018-02-21</a:t>
+              <a:t>2018-03-06</a:t>
             </a:fld>
             <a:endParaRPr lang="ko-KR" altLang="en-US" dirty="0"/>
           </a:p>
@@ -810,7 +810,7 @@
             <a:fld id="{72AB7076-BA11-4D5D-90BA-2C7F8A65331E}" type="datetimeFigureOut">
               <a:rPr lang="ko-KR" altLang="en-US" smtClean="0"/>
               <a:pPr/>
-              <a:t>2018-02-21</a:t>
+              <a:t>2018-03-06</a:t>
             </a:fld>
             <a:endParaRPr lang="ko-KR" altLang="en-US" dirty="0"/>
           </a:p>
@@ -1053,7 +1053,7 @@
             <a:fld id="{72AB7076-BA11-4D5D-90BA-2C7F8A65331E}" type="datetimeFigureOut">
               <a:rPr lang="ko-KR" altLang="en-US" smtClean="0"/>
               <a:pPr/>
-              <a:t>2018-02-21</a:t>
+              <a:t>2018-03-06</a:t>
             </a:fld>
             <a:endParaRPr lang="ko-KR" altLang="en-US" dirty="0"/>
           </a:p>
@@ -1338,7 +1338,7 @@
             <a:fld id="{72AB7076-BA11-4D5D-90BA-2C7F8A65331E}" type="datetimeFigureOut">
               <a:rPr lang="ko-KR" altLang="en-US" smtClean="0"/>
               <a:pPr/>
-              <a:t>2018-02-21</a:t>
+              <a:t>2018-03-06</a:t>
             </a:fld>
             <a:endParaRPr lang="ko-KR" altLang="en-US" dirty="0"/>
           </a:p>
@@ -1757,7 +1757,7 @@
             <a:fld id="{72AB7076-BA11-4D5D-90BA-2C7F8A65331E}" type="datetimeFigureOut">
               <a:rPr lang="ko-KR" altLang="en-US" smtClean="0"/>
               <a:pPr/>
-              <a:t>2018-02-21</a:t>
+              <a:t>2018-03-06</a:t>
             </a:fld>
             <a:endParaRPr lang="ko-KR" altLang="en-US" dirty="0"/>
           </a:p>
@@ -1872,7 +1872,7 @@
             <a:fld id="{72AB7076-BA11-4D5D-90BA-2C7F8A65331E}" type="datetimeFigureOut">
               <a:rPr lang="ko-KR" altLang="en-US" smtClean="0"/>
               <a:pPr/>
-              <a:t>2018-02-21</a:t>
+              <a:t>2018-03-06</a:t>
             </a:fld>
             <a:endParaRPr lang="ko-KR" altLang="en-US" dirty="0"/>
           </a:p>
@@ -1964,7 +1964,7 @@
             <a:fld id="{72AB7076-BA11-4D5D-90BA-2C7F8A65331E}" type="datetimeFigureOut">
               <a:rPr lang="ko-KR" altLang="en-US" smtClean="0"/>
               <a:pPr/>
-              <a:t>2018-02-21</a:t>
+              <a:t>2018-03-06</a:t>
             </a:fld>
             <a:endParaRPr lang="ko-KR" altLang="en-US" dirty="0"/>
           </a:p>
@@ -2238,7 +2238,7 @@
             <a:fld id="{72AB7076-BA11-4D5D-90BA-2C7F8A65331E}" type="datetimeFigureOut">
               <a:rPr lang="ko-KR" altLang="en-US" smtClean="0"/>
               <a:pPr/>
-              <a:t>2018-02-21</a:t>
+              <a:t>2018-03-06</a:t>
             </a:fld>
             <a:endParaRPr lang="ko-KR" altLang="en-US" dirty="0"/>
           </a:p>
@@ -2488,7 +2488,7 @@
             <a:fld id="{72AB7076-BA11-4D5D-90BA-2C7F8A65331E}" type="datetimeFigureOut">
               <a:rPr lang="ko-KR" altLang="en-US" smtClean="0"/>
               <a:pPr/>
-              <a:t>2018-02-21</a:t>
+              <a:t>2018-03-06</a:t>
             </a:fld>
             <a:endParaRPr lang="ko-KR" altLang="en-US" dirty="0"/>
           </a:p>
@@ -2698,7 +2698,7 @@
             <a:fld id="{72AB7076-BA11-4D5D-90BA-2C7F8A65331E}" type="datetimeFigureOut">
               <a:rPr lang="ko-KR" altLang="en-US" smtClean="0"/>
               <a:pPr/>
-              <a:t>2018-02-21</a:t>
+              <a:t>2018-03-06</a:t>
             </a:fld>
             <a:endParaRPr lang="ko-KR" altLang="en-US" dirty="0"/>
           </a:p>
@@ -4277,7 +4277,7 @@
         </p:nvSpPr>
         <p:spPr>
           <a:xfrm>
-            <a:off x="3071802" y="1785926"/>
+            <a:off x="3071802" y="1357298"/>
             <a:ext cx="3286148" cy="4714908"/>
           </a:xfrm>
           <a:prstGeom prst="rect">
@@ -4341,7 +4341,6 @@
               <a:rPr lang="en-US" altLang="ko-KR" dirty="0" smtClean="0"/>
               <a:t>Attendance Request</a:t>
             </a:r>
-            <a:endParaRPr lang="en-US" altLang="ko-KR" dirty="0" smtClean="0"/>
           </a:p>
         </p:txBody>
       </p:sp>
@@ -4353,7 +4352,7 @@
         </p:nvSpPr>
         <p:spPr>
           <a:xfrm>
-            <a:off x="3214678" y="2143116"/>
+            <a:off x="3214678" y="1714488"/>
             <a:ext cx="646331" cy="369332"/>
           </a:xfrm>
           <a:prstGeom prst="rect">
@@ -4369,11 +4368,7 @@
           <a:p>
             <a:r>
               <a:rPr lang="ko-KR" altLang="en-US" dirty="0" smtClean="0"/>
-              <a:t>날</a:t>
-            </a:r>
-            <a:r>
-              <a:rPr lang="ko-KR" altLang="en-US" dirty="0" smtClean="0"/>
-              <a:t>짜</a:t>
+              <a:t>날짜</a:t>
             </a:r>
             <a:endParaRPr lang="en-US" altLang="ko-KR" dirty="0" smtClean="0"/>
           </a:p>
@@ -4387,7 +4382,7 @@
         </p:nvSpPr>
         <p:spPr>
           <a:xfrm>
-            <a:off x="3214678" y="2571744"/>
+            <a:off x="3214678" y="2143116"/>
             <a:ext cx="1107996" cy="369332"/>
           </a:xfrm>
           <a:prstGeom prst="rect">
@@ -4403,11 +4398,7 @@
           <a:p>
             <a:r>
               <a:rPr lang="ko-KR" altLang="en-US" dirty="0" smtClean="0"/>
-              <a:t>출근시</a:t>
-            </a:r>
-            <a:r>
-              <a:rPr lang="ko-KR" altLang="en-US" dirty="0" smtClean="0"/>
-              <a:t>간</a:t>
+              <a:t>출근시간</a:t>
             </a:r>
             <a:endParaRPr lang="ko-KR" altLang="en-US" dirty="0"/>
           </a:p>
@@ -4421,7 +4412,7 @@
         </p:nvSpPr>
         <p:spPr>
           <a:xfrm>
-            <a:off x="4357686" y="2214554"/>
+            <a:off x="4357686" y="1785926"/>
             <a:ext cx="1785950" cy="285752"/>
           </a:xfrm>
           <a:prstGeom prst="rect">
@@ -4461,7 +4452,7 @@
         </p:nvSpPr>
         <p:spPr>
           <a:xfrm>
-            <a:off x="4357686" y="2643182"/>
+            <a:off x="4357686" y="2214554"/>
             <a:ext cx="1785950" cy="285752"/>
           </a:xfrm>
           <a:prstGeom prst="rect">
@@ -4501,7 +4492,7 @@
         </p:nvSpPr>
         <p:spPr>
           <a:xfrm>
-            <a:off x="5286380" y="5357826"/>
+            <a:off x="5286380" y="4929198"/>
             <a:ext cx="785818" cy="357190"/>
           </a:xfrm>
           <a:prstGeom prst="rect">
@@ -4545,7 +4536,7 @@
         </p:nvSpPr>
         <p:spPr>
           <a:xfrm>
-            <a:off x="4286248" y="5357826"/>
+            <a:off x="4286248" y="4929198"/>
             <a:ext cx="785818" cy="357190"/>
           </a:xfrm>
           <a:prstGeom prst="rect">
@@ -4589,7 +4580,7 @@
         </p:nvSpPr>
         <p:spPr>
           <a:xfrm>
-            <a:off x="3214678" y="3929066"/>
+            <a:off x="3214678" y="3500438"/>
             <a:ext cx="646331" cy="369332"/>
           </a:xfrm>
           <a:prstGeom prst="rect">
@@ -4619,7 +4610,7 @@
         </p:nvSpPr>
         <p:spPr>
           <a:xfrm>
-            <a:off x="3214678" y="3000372"/>
+            <a:off x="3214678" y="2571744"/>
             <a:ext cx="1107996" cy="369332"/>
           </a:xfrm>
           <a:prstGeom prst="rect">
@@ -4635,11 +4626,7 @@
           <a:p>
             <a:r>
               <a:rPr lang="ko-KR" altLang="en-US" dirty="0" smtClean="0"/>
-              <a:t>퇴</a:t>
-            </a:r>
-            <a:r>
-              <a:rPr lang="ko-KR" altLang="en-US" dirty="0" smtClean="0"/>
-              <a:t>근시간</a:t>
+              <a:t>퇴근시간</a:t>
             </a:r>
             <a:endParaRPr lang="ko-KR" altLang="en-US" dirty="0"/>
           </a:p>
@@ -4653,7 +4640,7 @@
         </p:nvSpPr>
         <p:spPr>
           <a:xfrm>
-            <a:off x="4357686" y="3071810"/>
+            <a:off x="4357686" y="2643182"/>
             <a:ext cx="1785950" cy="285752"/>
           </a:xfrm>
           <a:prstGeom prst="rect">
@@ -4693,7 +4680,7 @@
         </p:nvSpPr>
         <p:spPr>
           <a:xfrm>
-            <a:off x="3214678" y="3429000"/>
+            <a:off x="3214678" y="3000372"/>
             <a:ext cx="646331" cy="369332"/>
           </a:xfrm>
           <a:prstGeom prst="rect">
@@ -4723,7 +4710,7 @@
         </p:nvSpPr>
         <p:spPr>
           <a:xfrm>
-            <a:off x="4357686" y="3500438"/>
+            <a:off x="4357686" y="3071810"/>
             <a:ext cx="1785950" cy="285752"/>
           </a:xfrm>
           <a:prstGeom prst="rect">
@@ -4763,7 +4750,7 @@
         </p:nvSpPr>
         <p:spPr>
           <a:xfrm>
-            <a:off x="4357686" y="3929066"/>
+            <a:off x="4357686" y="3500438"/>
             <a:ext cx="1785950" cy="1071570"/>
           </a:xfrm>
           <a:prstGeom prst="rect">
@@ -4890,13 +4877,8 @@
           <a:p>
             <a:r>
               <a:rPr lang="en-US" altLang="ko-KR" dirty="0" smtClean="0"/>
-              <a:t>Overtime </a:t>
-            </a:r>
-            <a:r>
-              <a:rPr lang="en-US" altLang="ko-KR" dirty="0" smtClean="0"/>
-              <a:t>Request</a:t>
-            </a:r>
-            <a:endParaRPr lang="en-US" altLang="ko-KR" dirty="0" smtClean="0"/>
+              <a:t>Overtime Request</a:t>
+            </a:r>
           </a:p>
         </p:txBody>
       </p:sp>
@@ -5496,13 +5478,8 @@
           <a:p>
             <a:r>
               <a:rPr lang="en-US" altLang="ko-KR" dirty="0" smtClean="0"/>
-              <a:t>Off </a:t>
-            </a:r>
-            <a:r>
-              <a:rPr lang="en-US" altLang="ko-KR" dirty="0" smtClean="0"/>
-              <a:t>Request</a:t>
-            </a:r>
-            <a:endParaRPr lang="en-US" altLang="ko-KR" dirty="0" smtClean="0"/>
+              <a:t>Off Request</a:t>
+            </a:r>
           </a:p>
         </p:txBody>
       </p:sp>
@@ -6283,7 +6260,7 @@
         </p:nvSpPr>
         <p:spPr>
           <a:xfrm>
-            <a:off x="1643042" y="1643050"/>
+            <a:off x="357158" y="1643050"/>
             <a:ext cx="2500330" cy="357190"/>
           </a:xfrm>
           <a:prstGeom prst="rect">
@@ -6329,7 +6306,7 @@
         </p:nvSpPr>
         <p:spPr>
           <a:xfrm>
-            <a:off x="1643042" y="1643050"/>
+            <a:off x="357158" y="1643050"/>
             <a:ext cx="2500330" cy="3143272"/>
           </a:xfrm>
           <a:prstGeom prst="rect">
@@ -6404,7 +6381,7 @@
         </p:nvSpPr>
         <p:spPr>
           <a:xfrm>
-            <a:off x="1643042" y="1643050"/>
+            <a:off x="357158" y="1643050"/>
             <a:ext cx="857256" cy="357190"/>
           </a:xfrm>
           <a:prstGeom prst="rect">
@@ -6470,7 +6447,7 @@
         </p:nvSpPr>
         <p:spPr>
           <a:xfrm>
-            <a:off x="2500298" y="1643050"/>
+            <a:off x="1214414" y="1643050"/>
             <a:ext cx="857256" cy="357190"/>
           </a:xfrm>
           <a:prstGeom prst="rect">
@@ -6510,7 +6487,15 @@
                   <a:schemeClr val="tx1"/>
                 </a:solidFill>
               </a:rPr>
-              <a:t>삭제</a:t>
+              <a:t>수</a:t>
+            </a:r>
+            <a:r>
+              <a:rPr lang="ko-KR" altLang="en-US" dirty="0" smtClean="0">
+                <a:solidFill>
+                  <a:schemeClr val="tx1"/>
+                </a:solidFill>
+              </a:rPr>
+              <a:t>정</a:t>
             </a:r>
             <a:endParaRPr lang="ko-KR" altLang="en-US" dirty="0">
               <a:solidFill>
@@ -6528,7 +6513,7 @@
         </p:nvSpPr>
         <p:spPr>
           <a:xfrm>
-            <a:off x="1785918" y="2571744"/>
+            <a:off x="500034" y="2571744"/>
             <a:ext cx="646331" cy="369332"/>
           </a:xfrm>
           <a:prstGeom prst="rect">
@@ -6558,7 +6543,7 @@
         </p:nvSpPr>
         <p:spPr>
           <a:xfrm>
-            <a:off x="1785918" y="3000372"/>
+            <a:off x="500034" y="3000372"/>
             <a:ext cx="646331" cy="369332"/>
           </a:xfrm>
           <a:prstGeom prst="rect">
@@ -6588,7 +6573,7 @@
         </p:nvSpPr>
         <p:spPr>
           <a:xfrm>
-            <a:off x="2500298" y="2643182"/>
+            <a:off x="1214414" y="2643182"/>
             <a:ext cx="1357322" cy="285752"/>
           </a:xfrm>
           <a:prstGeom prst="rect">
@@ -6628,7 +6613,7 @@
         </p:nvSpPr>
         <p:spPr>
           <a:xfrm>
-            <a:off x="2500298" y="3071810"/>
+            <a:off x="1214414" y="3071810"/>
             <a:ext cx="1357322" cy="285752"/>
           </a:xfrm>
           <a:prstGeom prst="rect">
@@ -6668,7 +6653,7 @@
         </p:nvSpPr>
         <p:spPr>
           <a:xfrm>
-            <a:off x="3000364" y="3643314"/>
+            <a:off x="1714480" y="3643314"/>
             <a:ext cx="785818" cy="357190"/>
           </a:xfrm>
           <a:prstGeom prst="rect">
@@ -6712,7 +6697,7 @@
         </p:nvSpPr>
         <p:spPr>
           <a:xfrm>
-            <a:off x="2000232" y="3643314"/>
+            <a:off x="714348" y="3643314"/>
             <a:ext cx="785818" cy="357190"/>
           </a:xfrm>
           <a:prstGeom prst="rect">
@@ -6756,7 +6741,7 @@
         </p:nvSpPr>
         <p:spPr>
           <a:xfrm>
-            <a:off x="5214942" y="1643050"/>
+            <a:off x="6215074" y="1643050"/>
             <a:ext cx="2500330" cy="357190"/>
           </a:xfrm>
           <a:prstGeom prst="rect">
@@ -6802,7 +6787,7 @@
         </p:nvSpPr>
         <p:spPr>
           <a:xfrm>
-            <a:off x="5214942" y="1643050"/>
+            <a:off x="6215074" y="1643050"/>
             <a:ext cx="2500330" cy="3143272"/>
           </a:xfrm>
           <a:prstGeom prst="rect">
@@ -6848,7 +6833,7 @@
         </p:nvSpPr>
         <p:spPr>
           <a:xfrm>
-            <a:off x="5214942" y="1643050"/>
+            <a:off x="6215074" y="1643050"/>
             <a:ext cx="857256" cy="357190"/>
           </a:xfrm>
           <a:prstGeom prst="rect">
@@ -6909,18 +6894,13 @@
         </p:nvSpPr>
         <p:spPr>
           <a:xfrm>
-            <a:off x="6072198" y="1643050"/>
+            <a:off x="7072330" y="1643050"/>
             <a:ext cx="857256" cy="357190"/>
           </a:xfrm>
           <a:prstGeom prst="rect">
             <a:avLst/>
           </a:prstGeom>
-          <a:solidFill>
-            <a:schemeClr val="accent5">
-              <a:lumMod val="60000"/>
-              <a:lumOff val="40000"/>
-            </a:schemeClr>
-          </a:solidFill>
+          <a:noFill/>
           <a:ln>
             <a:solidFill>
               <a:schemeClr val="tx1"/>
@@ -6954,7 +6934,7 @@
                   <a:schemeClr val="tx1"/>
                 </a:solidFill>
               </a:rPr>
-              <a:t>삭제</a:t>
+              <a:t>수정</a:t>
             </a:r>
             <a:endParaRPr lang="ko-KR" altLang="en-US" dirty="0">
               <a:solidFill>
@@ -6972,7 +6952,7 @@
         </p:nvSpPr>
         <p:spPr>
           <a:xfrm>
-            <a:off x="6572264" y="4071942"/>
+            <a:off x="7572396" y="4071942"/>
             <a:ext cx="785818" cy="357190"/>
           </a:xfrm>
           <a:prstGeom prst="rect">
@@ -7016,7 +6996,7 @@
         </p:nvSpPr>
         <p:spPr>
           <a:xfrm>
-            <a:off x="5572132" y="4071942"/>
+            <a:off x="6572264" y="4071942"/>
             <a:ext cx="785818" cy="357190"/>
           </a:xfrm>
           <a:prstGeom prst="rect">
@@ -7060,7 +7040,7 @@
         </p:nvGrpSpPr>
         <p:grpSpPr>
           <a:xfrm>
-            <a:off x="5429256" y="2428868"/>
+            <a:off x="6429388" y="2428868"/>
             <a:ext cx="2071702" cy="1214446"/>
             <a:chOff x="357158" y="857232"/>
             <a:chExt cx="714380" cy="857256"/>
@@ -7232,6 +7212,716 @@
           </p:txBody>
         </p:sp>
       </p:grpSp>
+      <p:sp>
+        <p:nvSpPr>
+          <p:cNvPr id="25" name="직사각형 24"/>
+          <p:cNvSpPr/>
+          <p:nvPr/>
+        </p:nvSpPr>
+        <p:spPr>
+          <a:xfrm>
+            <a:off x="3286116" y="1643050"/>
+            <a:ext cx="2500330" cy="357190"/>
+          </a:xfrm>
+          <a:prstGeom prst="rect">
+            <a:avLst/>
+          </a:prstGeom>
+          <a:noFill/>
+          <a:ln>
+            <a:solidFill>
+              <a:schemeClr val="tx1"/>
+            </a:solidFill>
+          </a:ln>
+        </p:spPr>
+        <p:style>
+          <a:lnRef idx="2">
+            <a:schemeClr val="accent1">
+              <a:shade val="50000"/>
+            </a:schemeClr>
+          </a:lnRef>
+          <a:fillRef idx="1">
+            <a:schemeClr val="accent1"/>
+          </a:fillRef>
+          <a:effectRef idx="0">
+            <a:schemeClr val="accent1"/>
+          </a:effectRef>
+          <a:fontRef idx="minor">
+            <a:schemeClr val="lt1"/>
+          </a:fontRef>
+        </p:style>
+        <p:txBody>
+          <a:bodyPr rtlCol="0" anchor="ctr"/>
+          <a:lstStyle/>
+          <a:p>
+            <a:pPr algn="ctr"/>
+            <a:endParaRPr lang="ko-KR" altLang="en-US"/>
+          </a:p>
+        </p:txBody>
+      </p:sp>
+      <p:sp>
+        <p:nvSpPr>
+          <p:cNvPr id="26" name="직사각형 25"/>
+          <p:cNvSpPr/>
+          <p:nvPr/>
+        </p:nvSpPr>
+        <p:spPr>
+          <a:xfrm>
+            <a:off x="3286116" y="1643050"/>
+            <a:ext cx="2500330" cy="3143272"/>
+          </a:xfrm>
+          <a:prstGeom prst="rect">
+            <a:avLst/>
+          </a:prstGeom>
+          <a:noFill/>
+          <a:ln>
+            <a:solidFill>
+              <a:schemeClr val="tx1"/>
+            </a:solidFill>
+          </a:ln>
+        </p:spPr>
+        <p:style>
+          <a:lnRef idx="2">
+            <a:schemeClr val="accent1">
+              <a:shade val="50000"/>
+            </a:schemeClr>
+          </a:lnRef>
+          <a:fillRef idx="1">
+            <a:schemeClr val="accent1"/>
+          </a:fillRef>
+          <a:effectRef idx="0">
+            <a:schemeClr val="accent1"/>
+          </a:effectRef>
+          <a:fontRef idx="minor">
+            <a:schemeClr val="lt1"/>
+          </a:fontRef>
+        </p:style>
+        <p:txBody>
+          <a:bodyPr rtlCol="0" anchor="ctr"/>
+          <a:lstStyle/>
+          <a:p>
+            <a:pPr algn="ctr"/>
+            <a:endParaRPr lang="ko-KR" altLang="en-US"/>
+          </a:p>
+        </p:txBody>
+      </p:sp>
+      <p:sp>
+        <p:nvSpPr>
+          <p:cNvPr id="27" name="직사각형 26"/>
+          <p:cNvSpPr/>
+          <p:nvPr/>
+        </p:nvSpPr>
+        <p:spPr>
+          <a:xfrm>
+            <a:off x="3286116" y="1643050"/>
+            <a:ext cx="857256" cy="357190"/>
+          </a:xfrm>
+          <a:prstGeom prst="rect">
+            <a:avLst/>
+          </a:prstGeom>
+          <a:noFill/>
+          <a:ln>
+            <a:solidFill>
+              <a:schemeClr val="tx1"/>
+            </a:solidFill>
+          </a:ln>
+        </p:spPr>
+        <p:style>
+          <a:lnRef idx="2">
+            <a:schemeClr val="accent1">
+              <a:shade val="50000"/>
+            </a:schemeClr>
+          </a:lnRef>
+          <a:fillRef idx="1">
+            <a:schemeClr val="accent1"/>
+          </a:fillRef>
+          <a:effectRef idx="0">
+            <a:schemeClr val="accent1"/>
+          </a:effectRef>
+          <a:fontRef idx="minor">
+            <a:schemeClr val="lt1"/>
+          </a:fontRef>
+        </p:style>
+        <p:txBody>
+          <a:bodyPr rtlCol="0" anchor="ctr"/>
+          <a:lstStyle/>
+          <a:p>
+            <a:pPr algn="ctr"/>
+            <a:r>
+              <a:rPr lang="ko-KR" altLang="en-US" dirty="0" smtClean="0">
+                <a:solidFill>
+                  <a:schemeClr val="tx1"/>
+                </a:solidFill>
+              </a:rPr>
+              <a:t>추</a:t>
+            </a:r>
+            <a:r>
+              <a:rPr lang="ko-KR" altLang="en-US" dirty="0">
+                <a:solidFill>
+                  <a:schemeClr val="tx1"/>
+                </a:solidFill>
+              </a:rPr>
+              <a:t>가</a:t>
+            </a:r>
+          </a:p>
+        </p:txBody>
+      </p:sp>
+      <p:sp>
+        <p:nvSpPr>
+          <p:cNvPr id="28" name="직사각형 27"/>
+          <p:cNvSpPr/>
+          <p:nvPr/>
+        </p:nvSpPr>
+        <p:spPr>
+          <a:xfrm>
+            <a:off x="4143372" y="1643050"/>
+            <a:ext cx="857256" cy="357190"/>
+          </a:xfrm>
+          <a:prstGeom prst="rect">
+            <a:avLst/>
+          </a:prstGeom>
+          <a:solidFill>
+            <a:schemeClr val="accent5">
+              <a:lumMod val="60000"/>
+              <a:lumOff val="40000"/>
+            </a:schemeClr>
+          </a:solidFill>
+          <a:ln>
+            <a:solidFill>
+              <a:schemeClr val="tx1"/>
+            </a:solidFill>
+          </a:ln>
+        </p:spPr>
+        <p:style>
+          <a:lnRef idx="2">
+            <a:schemeClr val="accent1">
+              <a:shade val="50000"/>
+            </a:schemeClr>
+          </a:lnRef>
+          <a:fillRef idx="1">
+            <a:schemeClr val="accent1"/>
+          </a:fillRef>
+          <a:effectRef idx="0">
+            <a:schemeClr val="accent1"/>
+          </a:effectRef>
+          <a:fontRef idx="minor">
+            <a:schemeClr val="lt1"/>
+          </a:fontRef>
+        </p:style>
+        <p:txBody>
+          <a:bodyPr rtlCol="0" anchor="ctr"/>
+          <a:lstStyle/>
+          <a:p>
+            <a:pPr algn="ctr"/>
+            <a:r>
+              <a:rPr lang="ko-KR" altLang="en-US" dirty="0" smtClean="0">
+                <a:solidFill>
+                  <a:schemeClr val="tx1"/>
+                </a:solidFill>
+              </a:rPr>
+              <a:t>수정</a:t>
+            </a:r>
+            <a:endParaRPr lang="ko-KR" altLang="en-US" dirty="0">
+              <a:solidFill>
+                <a:schemeClr val="tx1"/>
+              </a:solidFill>
+            </a:endParaRPr>
+          </a:p>
+        </p:txBody>
+      </p:sp>
+      <p:sp>
+        <p:nvSpPr>
+          <p:cNvPr id="29" name="TextBox 28"/>
+          <p:cNvSpPr txBox="1"/>
+          <p:nvPr/>
+        </p:nvSpPr>
+        <p:spPr>
+          <a:xfrm>
+            <a:off x="3428992" y="2214554"/>
+            <a:ext cx="646331" cy="369332"/>
+          </a:xfrm>
+          <a:prstGeom prst="rect">
+            <a:avLst/>
+          </a:prstGeom>
+          <a:noFill/>
+        </p:spPr>
+        <p:txBody>
+          <a:bodyPr wrap="none" rtlCol="0">
+            <a:spAutoFit/>
+          </a:bodyPr>
+          <a:lstStyle/>
+          <a:p>
+            <a:r>
+              <a:rPr lang="ko-KR" altLang="en-US" dirty="0" smtClean="0"/>
+              <a:t>코드</a:t>
+            </a:r>
+            <a:endParaRPr lang="ko-KR" altLang="en-US" dirty="0"/>
+          </a:p>
+        </p:txBody>
+      </p:sp>
+      <p:sp>
+        <p:nvSpPr>
+          <p:cNvPr id="30" name="TextBox 29"/>
+          <p:cNvSpPr txBox="1"/>
+          <p:nvPr/>
+        </p:nvSpPr>
+        <p:spPr>
+          <a:xfrm>
+            <a:off x="3428992" y="2643182"/>
+            <a:ext cx="646331" cy="369332"/>
+          </a:xfrm>
+          <a:prstGeom prst="rect">
+            <a:avLst/>
+          </a:prstGeom>
+          <a:noFill/>
+        </p:spPr>
+        <p:txBody>
+          <a:bodyPr wrap="none" rtlCol="0">
+            <a:spAutoFit/>
+          </a:bodyPr>
+          <a:lstStyle/>
+          <a:p>
+            <a:r>
+              <a:rPr lang="ko-KR" altLang="en-US" dirty="0" smtClean="0"/>
+              <a:t>이름</a:t>
+            </a:r>
+            <a:endParaRPr lang="ko-KR" altLang="en-US" dirty="0"/>
+          </a:p>
+        </p:txBody>
+      </p:sp>
+      <p:sp>
+        <p:nvSpPr>
+          <p:cNvPr id="32" name="직사각형 31"/>
+          <p:cNvSpPr/>
+          <p:nvPr/>
+        </p:nvSpPr>
+        <p:spPr>
+          <a:xfrm>
+            <a:off x="4143372" y="2285992"/>
+            <a:ext cx="1357322" cy="285752"/>
+          </a:xfrm>
+          <a:prstGeom prst="rect">
+            <a:avLst/>
+          </a:prstGeom>
+          <a:noFill/>
+        </p:spPr>
+        <p:style>
+          <a:lnRef idx="2">
+            <a:schemeClr val="accent1">
+              <a:shade val="50000"/>
+            </a:schemeClr>
+          </a:lnRef>
+          <a:fillRef idx="1">
+            <a:schemeClr val="accent1"/>
+          </a:fillRef>
+          <a:effectRef idx="0">
+            <a:schemeClr val="accent1"/>
+          </a:effectRef>
+          <a:fontRef idx="minor">
+            <a:schemeClr val="lt1"/>
+          </a:fontRef>
+        </p:style>
+        <p:txBody>
+          <a:bodyPr rtlCol="0" anchor="ctr"/>
+          <a:lstStyle/>
+          <a:p>
+            <a:pPr algn="ctr"/>
+            <a:r>
+              <a:rPr lang="en-US" altLang="ko-KR" sz="1400" dirty="0" smtClean="0">
+                <a:solidFill>
+                  <a:schemeClr val="tx1"/>
+                </a:solidFill>
+              </a:rPr>
+              <a:t>AA</a:t>
+            </a:r>
+            <a:endParaRPr lang="ko-KR" altLang="en-US" sz="1400" dirty="0">
+              <a:solidFill>
+                <a:schemeClr val="tx1"/>
+              </a:solidFill>
+            </a:endParaRPr>
+          </a:p>
+        </p:txBody>
+      </p:sp>
+      <p:sp>
+        <p:nvSpPr>
+          <p:cNvPr id="33" name="직사각형 32"/>
+          <p:cNvSpPr/>
+          <p:nvPr/>
+        </p:nvSpPr>
+        <p:spPr>
+          <a:xfrm>
+            <a:off x="4143372" y="2714620"/>
+            <a:ext cx="1357322" cy="285752"/>
+          </a:xfrm>
+          <a:prstGeom prst="rect">
+            <a:avLst/>
+          </a:prstGeom>
+        </p:spPr>
+        <p:style>
+          <a:lnRef idx="2">
+            <a:schemeClr val="accent1">
+              <a:shade val="50000"/>
+            </a:schemeClr>
+          </a:lnRef>
+          <a:fillRef idx="1">
+            <a:schemeClr val="accent1"/>
+          </a:fillRef>
+          <a:effectRef idx="0">
+            <a:schemeClr val="accent1"/>
+          </a:effectRef>
+          <a:fontRef idx="minor">
+            <a:schemeClr val="lt1"/>
+          </a:fontRef>
+        </p:style>
+        <p:txBody>
+          <a:bodyPr rtlCol="0" anchor="ctr"/>
+          <a:lstStyle/>
+          <a:p>
+            <a:pPr algn="ctr"/>
+            <a:endParaRPr lang="ko-KR" altLang="en-US"/>
+          </a:p>
+        </p:txBody>
+      </p:sp>
+      <p:sp>
+        <p:nvSpPr>
+          <p:cNvPr id="34" name="직사각형 33"/>
+          <p:cNvSpPr/>
+          <p:nvPr/>
+        </p:nvSpPr>
+        <p:spPr>
+          <a:xfrm>
+            <a:off x="4643438" y="4071942"/>
+            <a:ext cx="785818" cy="357190"/>
+          </a:xfrm>
+          <a:prstGeom prst="rect">
+            <a:avLst/>
+          </a:prstGeom>
+        </p:spPr>
+        <p:style>
+          <a:lnRef idx="2">
+            <a:schemeClr val="accent1">
+              <a:shade val="50000"/>
+            </a:schemeClr>
+          </a:lnRef>
+          <a:fillRef idx="1">
+            <a:schemeClr val="accent1"/>
+          </a:fillRef>
+          <a:effectRef idx="0">
+            <a:schemeClr val="accent1"/>
+          </a:effectRef>
+          <a:fontRef idx="minor">
+            <a:schemeClr val="lt1"/>
+          </a:fontRef>
+        </p:style>
+        <p:txBody>
+          <a:bodyPr rtlCol="0" anchor="ctr"/>
+          <a:lstStyle/>
+          <a:p>
+            <a:pPr algn="ctr"/>
+            <a:r>
+              <a:rPr lang="ko-KR" altLang="en-US" dirty="0" smtClean="0"/>
+              <a:t>추가</a:t>
+            </a:r>
+            <a:endParaRPr lang="ko-KR" altLang="en-US" dirty="0"/>
+          </a:p>
+        </p:txBody>
+      </p:sp>
+      <p:sp>
+        <p:nvSpPr>
+          <p:cNvPr id="35" name="직사각형 34"/>
+          <p:cNvSpPr/>
+          <p:nvPr/>
+        </p:nvSpPr>
+        <p:spPr>
+          <a:xfrm>
+            <a:off x="3643306" y="4071942"/>
+            <a:ext cx="785818" cy="357190"/>
+          </a:xfrm>
+          <a:prstGeom prst="rect">
+            <a:avLst/>
+          </a:prstGeom>
+        </p:spPr>
+        <p:style>
+          <a:lnRef idx="2">
+            <a:schemeClr val="accent1">
+              <a:shade val="50000"/>
+            </a:schemeClr>
+          </a:lnRef>
+          <a:fillRef idx="1">
+            <a:schemeClr val="accent1"/>
+          </a:fillRef>
+          <a:effectRef idx="0">
+            <a:schemeClr val="accent1"/>
+          </a:effectRef>
+          <a:fontRef idx="minor">
+            <a:schemeClr val="lt1"/>
+          </a:fontRef>
+        </p:style>
+        <p:txBody>
+          <a:bodyPr rtlCol="0" anchor="ctr"/>
+          <a:lstStyle/>
+          <a:p>
+            <a:pPr algn="ctr"/>
+            <a:r>
+              <a:rPr lang="ko-KR" altLang="en-US" dirty="0" smtClean="0"/>
+              <a:t>취소</a:t>
+            </a:r>
+            <a:endParaRPr lang="ko-KR" altLang="en-US" dirty="0"/>
+          </a:p>
+        </p:txBody>
+      </p:sp>
+      <p:sp>
+        <p:nvSpPr>
+          <p:cNvPr id="36" name="직사각형 35"/>
+          <p:cNvSpPr/>
+          <p:nvPr/>
+        </p:nvSpPr>
+        <p:spPr>
+          <a:xfrm>
+            <a:off x="5000628" y="1643050"/>
+            <a:ext cx="785818" cy="357190"/>
+          </a:xfrm>
+          <a:prstGeom prst="rect">
+            <a:avLst/>
+          </a:prstGeom>
+          <a:noFill/>
+          <a:ln>
+            <a:solidFill>
+              <a:schemeClr val="tx1"/>
+            </a:solidFill>
+          </a:ln>
+        </p:spPr>
+        <p:style>
+          <a:lnRef idx="2">
+            <a:schemeClr val="accent1">
+              <a:shade val="50000"/>
+            </a:schemeClr>
+          </a:lnRef>
+          <a:fillRef idx="1">
+            <a:schemeClr val="accent1"/>
+          </a:fillRef>
+          <a:effectRef idx="0">
+            <a:schemeClr val="accent1"/>
+          </a:effectRef>
+          <a:fontRef idx="minor">
+            <a:schemeClr val="lt1"/>
+          </a:fontRef>
+        </p:style>
+        <p:txBody>
+          <a:bodyPr rtlCol="0" anchor="ctr"/>
+          <a:lstStyle/>
+          <a:p>
+            <a:pPr algn="ctr"/>
+            <a:r>
+              <a:rPr lang="ko-KR" altLang="en-US" dirty="0" smtClean="0">
+                <a:solidFill>
+                  <a:schemeClr val="tx1"/>
+                </a:solidFill>
+              </a:rPr>
+              <a:t>삭제</a:t>
+            </a:r>
+            <a:endParaRPr lang="ko-KR" altLang="en-US" dirty="0">
+              <a:solidFill>
+                <a:schemeClr val="tx1"/>
+              </a:solidFill>
+            </a:endParaRPr>
+          </a:p>
+        </p:txBody>
+      </p:sp>
+      <p:sp>
+        <p:nvSpPr>
+          <p:cNvPr id="43" name="직사각형 42"/>
+          <p:cNvSpPr/>
+          <p:nvPr/>
+        </p:nvSpPr>
+        <p:spPr>
+          <a:xfrm>
+            <a:off x="2071670" y="1643050"/>
+            <a:ext cx="785818" cy="357190"/>
+          </a:xfrm>
+          <a:prstGeom prst="rect">
+            <a:avLst/>
+          </a:prstGeom>
+          <a:noFill/>
+          <a:ln>
+            <a:solidFill>
+              <a:schemeClr val="tx1"/>
+            </a:solidFill>
+          </a:ln>
+        </p:spPr>
+        <p:style>
+          <a:lnRef idx="2">
+            <a:schemeClr val="accent1">
+              <a:shade val="50000"/>
+            </a:schemeClr>
+          </a:lnRef>
+          <a:fillRef idx="1">
+            <a:schemeClr val="accent1"/>
+          </a:fillRef>
+          <a:effectRef idx="0">
+            <a:schemeClr val="accent1"/>
+          </a:effectRef>
+          <a:fontRef idx="minor">
+            <a:schemeClr val="lt1"/>
+          </a:fontRef>
+        </p:style>
+        <p:txBody>
+          <a:bodyPr rtlCol="0" anchor="ctr"/>
+          <a:lstStyle/>
+          <a:p>
+            <a:pPr algn="ctr"/>
+            <a:r>
+              <a:rPr lang="ko-KR" altLang="en-US" dirty="0" smtClean="0">
+                <a:solidFill>
+                  <a:schemeClr val="tx1"/>
+                </a:solidFill>
+              </a:rPr>
+              <a:t>삭제</a:t>
+            </a:r>
+            <a:endParaRPr lang="ko-KR" altLang="en-US" dirty="0">
+              <a:solidFill>
+                <a:schemeClr val="tx1"/>
+              </a:solidFill>
+            </a:endParaRPr>
+          </a:p>
+        </p:txBody>
+      </p:sp>
+      <p:sp>
+        <p:nvSpPr>
+          <p:cNvPr id="45" name="직사각형 44"/>
+          <p:cNvSpPr/>
+          <p:nvPr/>
+        </p:nvSpPr>
+        <p:spPr>
+          <a:xfrm>
+            <a:off x="7929586" y="1643050"/>
+            <a:ext cx="785818" cy="357190"/>
+          </a:xfrm>
+          <a:prstGeom prst="rect">
+            <a:avLst/>
+          </a:prstGeom>
+          <a:solidFill>
+            <a:schemeClr val="accent5">
+              <a:lumMod val="60000"/>
+              <a:lumOff val="40000"/>
+            </a:schemeClr>
+          </a:solidFill>
+          <a:ln>
+            <a:solidFill>
+              <a:schemeClr val="tx1"/>
+            </a:solidFill>
+          </a:ln>
+        </p:spPr>
+        <p:style>
+          <a:lnRef idx="2">
+            <a:schemeClr val="accent1">
+              <a:shade val="50000"/>
+            </a:schemeClr>
+          </a:lnRef>
+          <a:fillRef idx="1">
+            <a:schemeClr val="accent1"/>
+          </a:fillRef>
+          <a:effectRef idx="0">
+            <a:schemeClr val="accent1"/>
+          </a:effectRef>
+          <a:fontRef idx="minor">
+            <a:schemeClr val="lt1"/>
+          </a:fontRef>
+        </p:style>
+        <p:txBody>
+          <a:bodyPr rtlCol="0" anchor="ctr"/>
+          <a:lstStyle/>
+          <a:p>
+            <a:pPr algn="ctr"/>
+            <a:r>
+              <a:rPr lang="ko-KR" altLang="en-US" dirty="0" smtClean="0">
+                <a:solidFill>
+                  <a:schemeClr val="tx1"/>
+                </a:solidFill>
+              </a:rPr>
+              <a:t>삭제</a:t>
+            </a:r>
+            <a:endParaRPr lang="ko-KR" altLang="en-US" dirty="0">
+              <a:solidFill>
+                <a:schemeClr val="tx1"/>
+              </a:solidFill>
+            </a:endParaRPr>
+          </a:p>
+        </p:txBody>
+      </p:sp>
+      <p:sp>
+        <p:nvSpPr>
+          <p:cNvPr id="46" name="TextBox 45"/>
+          <p:cNvSpPr txBox="1"/>
+          <p:nvPr/>
+        </p:nvSpPr>
+        <p:spPr>
+          <a:xfrm>
+            <a:off x="3428992" y="3071810"/>
+            <a:ext cx="646331" cy="369332"/>
+          </a:xfrm>
+          <a:prstGeom prst="rect">
+            <a:avLst/>
+          </a:prstGeom>
+          <a:noFill/>
+        </p:spPr>
+        <p:txBody>
+          <a:bodyPr wrap="none" rtlCol="0">
+            <a:spAutoFit/>
+          </a:bodyPr>
+          <a:lstStyle/>
+          <a:p>
+            <a:r>
+              <a:rPr lang="ko-KR" altLang="en-US" dirty="0" smtClean="0"/>
+              <a:t>사</a:t>
+            </a:r>
+            <a:r>
+              <a:rPr lang="ko-KR" altLang="en-US" dirty="0" smtClean="0"/>
+              <a:t>유</a:t>
+            </a:r>
+            <a:endParaRPr lang="ko-KR" altLang="en-US" dirty="0"/>
+          </a:p>
+        </p:txBody>
+      </p:sp>
+      <p:sp>
+        <p:nvSpPr>
+          <p:cNvPr id="47" name="직사각형 46"/>
+          <p:cNvSpPr/>
+          <p:nvPr/>
+        </p:nvSpPr>
+        <p:spPr>
+          <a:xfrm>
+            <a:off x="4143372" y="3143248"/>
+            <a:ext cx="1357322" cy="642942"/>
+          </a:xfrm>
+          <a:prstGeom prst="rect">
+            <a:avLst/>
+          </a:prstGeom>
+        </p:spPr>
+        <p:style>
+          <a:lnRef idx="2">
+            <a:schemeClr val="accent1">
+              <a:shade val="50000"/>
+            </a:schemeClr>
+          </a:lnRef>
+          <a:fillRef idx="1">
+            <a:schemeClr val="accent1"/>
+          </a:fillRef>
+          <a:effectRef idx="0">
+            <a:schemeClr val="accent1"/>
+          </a:effectRef>
+          <a:fontRef idx="minor">
+            <a:schemeClr val="lt1"/>
+          </a:fontRef>
+        </p:style>
+        <p:txBody>
+          <a:bodyPr rtlCol="0" anchor="ctr"/>
+          <a:lstStyle/>
+          <a:p>
+            <a:pPr algn="ctr"/>
+            <a:endParaRPr lang="ko-KR" altLang="en-US"/>
+          </a:p>
+        </p:txBody>
+      </p:sp>
     </p:spTree>
   </p:cSld>
   <p:clrMapOvr>
@@ -8776,7 +9466,7 @@
         </p:nvSpPr>
         <p:spPr>
           <a:xfrm>
-            <a:off x="3000364" y="1214422"/>
+            <a:off x="1071538" y="1214422"/>
             <a:ext cx="3214710" cy="4357718"/>
           </a:xfrm>
           <a:prstGeom prst="rect">
@@ -8838,15 +9528,7 @@
           <a:p>
             <a:r>
               <a:rPr lang="en-US" altLang="ko-KR" dirty="0" smtClean="0"/>
-              <a:t>Staff </a:t>
-            </a:r>
-            <a:r>
-              <a:rPr lang="en-US" altLang="ko-KR" dirty="0" smtClean="0"/>
-              <a:t>Management – </a:t>
-            </a:r>
-            <a:r>
-              <a:rPr lang="en-US" altLang="ko-KR" dirty="0" smtClean="0"/>
-              <a:t>add</a:t>
+              <a:t>Staff Management – add</a:t>
             </a:r>
           </a:p>
         </p:txBody>
@@ -8859,7 +9541,7 @@
         </p:nvSpPr>
         <p:spPr>
           <a:xfrm>
-            <a:off x="3000364" y="1214421"/>
+            <a:off x="1071538" y="1214421"/>
             <a:ext cx="3214710" cy="357191"/>
           </a:xfrm>
           <a:prstGeom prst="rect">
@@ -8905,7 +9587,7 @@
         </p:nvSpPr>
         <p:spPr>
           <a:xfrm>
-            <a:off x="3000364" y="1214421"/>
+            <a:off x="1071538" y="1214421"/>
             <a:ext cx="857256" cy="357191"/>
           </a:xfrm>
           <a:prstGeom prst="rect">
@@ -8971,7 +9653,7 @@
         </p:nvSpPr>
         <p:spPr>
           <a:xfrm>
-            <a:off x="3857620" y="1214421"/>
+            <a:off x="1928794" y="1214421"/>
             <a:ext cx="857256" cy="357191"/>
           </a:xfrm>
           <a:prstGeom prst="rect">
@@ -9029,7 +9711,7 @@
         </p:nvSpPr>
         <p:spPr>
           <a:xfrm>
-            <a:off x="3571868" y="1857364"/>
+            <a:off x="1643042" y="1857364"/>
             <a:ext cx="646331" cy="369332"/>
           </a:xfrm>
           <a:prstGeom prst="rect">
@@ -9059,7 +9741,7 @@
         </p:nvSpPr>
         <p:spPr>
           <a:xfrm>
-            <a:off x="3571868" y="2340012"/>
+            <a:off x="1643042" y="2340012"/>
             <a:ext cx="646331" cy="369332"/>
           </a:xfrm>
           <a:prstGeom prst="rect">
@@ -9092,7 +9774,7 @@
         </p:nvSpPr>
         <p:spPr>
           <a:xfrm>
-            <a:off x="4286248" y="1928802"/>
+            <a:off x="2357422" y="1928802"/>
             <a:ext cx="1357322" cy="285752"/>
           </a:xfrm>
           <a:prstGeom prst="rect">
@@ -9138,7 +9820,7 @@
         </p:nvSpPr>
         <p:spPr>
           <a:xfrm>
-            <a:off x="4286248" y="2411450"/>
+            <a:off x="2357422" y="2411450"/>
             <a:ext cx="1357322" cy="285752"/>
           </a:xfrm>
           <a:prstGeom prst="rect">
@@ -9184,7 +9866,7 @@
         </p:nvSpPr>
         <p:spPr>
           <a:xfrm>
-            <a:off x="4714876" y="4643446"/>
+            <a:off x="2786050" y="4643446"/>
             <a:ext cx="785818" cy="357190"/>
           </a:xfrm>
           <a:prstGeom prst="rect">
@@ -9228,7 +9910,7 @@
         </p:nvSpPr>
         <p:spPr>
           <a:xfrm>
-            <a:off x="3714744" y="4643446"/>
+            <a:off x="1785918" y="4643446"/>
             <a:ext cx="785818" cy="357190"/>
           </a:xfrm>
           <a:prstGeom prst="rect">
@@ -9272,7 +9954,7 @@
         </p:nvSpPr>
         <p:spPr>
           <a:xfrm>
-            <a:off x="3564925" y="2850553"/>
+            <a:off x="1636099" y="2850553"/>
             <a:ext cx="646331" cy="369332"/>
           </a:xfrm>
           <a:prstGeom prst="rect">
@@ -9302,7 +9984,7 @@
         </p:nvSpPr>
         <p:spPr>
           <a:xfrm>
-            <a:off x="3564925" y="3350619"/>
+            <a:off x="1636099" y="3350619"/>
             <a:ext cx="646331" cy="369332"/>
           </a:xfrm>
           <a:prstGeom prst="rect">
@@ -9335,7 +10017,7 @@
         </p:nvSpPr>
         <p:spPr>
           <a:xfrm>
-            <a:off x="4279305" y="2921991"/>
+            <a:off x="2350479" y="2921991"/>
             <a:ext cx="1357322" cy="285752"/>
           </a:xfrm>
           <a:prstGeom prst="rect">
@@ -9381,7 +10063,7 @@
         </p:nvSpPr>
         <p:spPr>
           <a:xfrm>
-            <a:off x="4279305" y="3422057"/>
+            <a:off x="2350479" y="3422057"/>
             <a:ext cx="1357322" cy="285752"/>
           </a:xfrm>
           <a:prstGeom prst="rect">
@@ -9427,7 +10109,7 @@
         </p:nvSpPr>
         <p:spPr>
           <a:xfrm>
-            <a:off x="3571868" y="3845486"/>
+            <a:off x="1643042" y="3845486"/>
             <a:ext cx="646331" cy="276999"/>
           </a:xfrm>
           <a:prstGeom prst="rect">
@@ -9457,7 +10139,7 @@
         </p:nvSpPr>
         <p:spPr>
           <a:xfrm>
-            <a:off x="4286248" y="3916924"/>
+            <a:off x="2357422" y="3916924"/>
             <a:ext cx="1357322" cy="285752"/>
           </a:xfrm>
           <a:prstGeom prst="rect">
@@ -9503,7 +10185,7 @@
         </p:nvSpPr>
         <p:spPr>
           <a:xfrm flipH="1" flipV="1">
-            <a:off x="5429256" y="2000240"/>
+            <a:off x="3500430" y="2000240"/>
             <a:ext cx="142876" cy="142876"/>
           </a:xfrm>
           <a:prstGeom prst="triangle">
@@ -9543,12 +10225,1088 @@
         </p:nvSpPr>
         <p:spPr>
           <a:xfrm flipH="1" flipV="1">
-            <a:off x="5429256" y="2500306"/>
+            <a:off x="3500430" y="2500306"/>
             <a:ext cx="142876" cy="142876"/>
           </a:xfrm>
           <a:prstGeom prst="triangle">
             <a:avLst/>
           </a:prstGeom>
+        </p:spPr>
+        <p:style>
+          <a:lnRef idx="2">
+            <a:schemeClr val="accent1">
+              <a:shade val="50000"/>
+            </a:schemeClr>
+          </a:lnRef>
+          <a:fillRef idx="1">
+            <a:schemeClr val="accent1"/>
+          </a:fillRef>
+          <a:effectRef idx="0">
+            <a:schemeClr val="accent1"/>
+          </a:effectRef>
+          <a:fontRef idx="minor">
+            <a:schemeClr val="lt1"/>
+          </a:fontRef>
+        </p:style>
+        <p:txBody>
+          <a:bodyPr rtlCol="0" anchor="ctr"/>
+          <a:lstStyle/>
+          <a:p>
+            <a:pPr algn="ctr"/>
+            <a:endParaRPr lang="ko-KR" altLang="en-US"/>
+          </a:p>
+        </p:txBody>
+      </p:sp>
+      <p:sp>
+        <p:nvSpPr>
+          <p:cNvPr id="21" name="직사각형 20"/>
+          <p:cNvSpPr/>
+          <p:nvPr/>
+        </p:nvSpPr>
+        <p:spPr>
+          <a:xfrm>
+            <a:off x="4857752" y="1214422"/>
+            <a:ext cx="3214710" cy="4357718"/>
+          </a:xfrm>
+          <a:prstGeom prst="rect">
+            <a:avLst/>
+          </a:prstGeom>
+          <a:noFill/>
+          <a:ln>
+            <a:solidFill>
+              <a:schemeClr val="tx1"/>
+            </a:solidFill>
+          </a:ln>
+        </p:spPr>
+        <p:style>
+          <a:lnRef idx="2">
+            <a:schemeClr val="accent1">
+              <a:shade val="50000"/>
+            </a:schemeClr>
+          </a:lnRef>
+          <a:fillRef idx="1">
+            <a:schemeClr val="accent1"/>
+          </a:fillRef>
+          <a:effectRef idx="0">
+            <a:schemeClr val="accent1"/>
+          </a:effectRef>
+          <a:fontRef idx="minor">
+            <a:schemeClr val="lt1"/>
+          </a:fontRef>
+        </p:style>
+        <p:txBody>
+          <a:bodyPr rtlCol="0" anchor="ctr"/>
+          <a:lstStyle/>
+          <a:p>
+            <a:pPr algn="ctr"/>
+            <a:endParaRPr lang="ko-KR" altLang="en-US"/>
+          </a:p>
+        </p:txBody>
+      </p:sp>
+      <p:sp>
+        <p:nvSpPr>
+          <p:cNvPr id="22" name="직사각형 21"/>
+          <p:cNvSpPr/>
+          <p:nvPr/>
+        </p:nvSpPr>
+        <p:spPr>
+          <a:xfrm>
+            <a:off x="4857752" y="1214421"/>
+            <a:ext cx="3214710" cy="357191"/>
+          </a:xfrm>
+          <a:prstGeom prst="rect">
+            <a:avLst/>
+          </a:prstGeom>
+          <a:noFill/>
+          <a:ln>
+            <a:solidFill>
+              <a:schemeClr val="tx1"/>
+            </a:solidFill>
+          </a:ln>
+        </p:spPr>
+        <p:style>
+          <a:lnRef idx="2">
+            <a:schemeClr val="accent1">
+              <a:shade val="50000"/>
+            </a:schemeClr>
+          </a:lnRef>
+          <a:fillRef idx="1">
+            <a:schemeClr val="accent1"/>
+          </a:fillRef>
+          <a:effectRef idx="0">
+            <a:schemeClr val="accent1"/>
+          </a:effectRef>
+          <a:fontRef idx="minor">
+            <a:schemeClr val="lt1"/>
+          </a:fontRef>
+        </p:style>
+        <p:txBody>
+          <a:bodyPr rtlCol="0" anchor="ctr"/>
+          <a:lstStyle/>
+          <a:p>
+            <a:pPr algn="ctr"/>
+            <a:endParaRPr lang="ko-KR" altLang="en-US"/>
+          </a:p>
+        </p:txBody>
+      </p:sp>
+      <p:sp>
+        <p:nvSpPr>
+          <p:cNvPr id="23" name="직사각형 22"/>
+          <p:cNvSpPr/>
+          <p:nvPr/>
+        </p:nvSpPr>
+        <p:spPr>
+          <a:xfrm>
+            <a:off x="4857752" y="1214421"/>
+            <a:ext cx="857256" cy="357191"/>
+          </a:xfrm>
+          <a:prstGeom prst="rect">
+            <a:avLst/>
+          </a:prstGeom>
+          <a:noFill/>
+          <a:ln>
+            <a:solidFill>
+              <a:schemeClr val="tx1"/>
+            </a:solidFill>
+          </a:ln>
+        </p:spPr>
+        <p:style>
+          <a:lnRef idx="2">
+            <a:schemeClr val="accent1">
+              <a:shade val="50000"/>
+            </a:schemeClr>
+          </a:lnRef>
+          <a:fillRef idx="1">
+            <a:schemeClr val="accent1"/>
+          </a:fillRef>
+          <a:effectRef idx="0">
+            <a:schemeClr val="accent1"/>
+          </a:effectRef>
+          <a:fontRef idx="minor">
+            <a:schemeClr val="lt1"/>
+          </a:fontRef>
+        </p:style>
+        <p:txBody>
+          <a:bodyPr rtlCol="0" anchor="ctr"/>
+          <a:lstStyle/>
+          <a:p>
+            <a:pPr algn="ctr"/>
+            <a:r>
+              <a:rPr lang="ko-KR" altLang="en-US" dirty="0" smtClean="0">
+                <a:solidFill>
+                  <a:schemeClr val="tx1"/>
+                </a:solidFill>
+              </a:rPr>
+              <a:t>추</a:t>
+            </a:r>
+            <a:r>
+              <a:rPr lang="ko-KR" altLang="en-US" dirty="0">
+                <a:solidFill>
+                  <a:schemeClr val="tx1"/>
+                </a:solidFill>
+              </a:rPr>
+              <a:t>가</a:t>
+            </a:r>
+          </a:p>
+        </p:txBody>
+      </p:sp>
+      <p:sp>
+        <p:nvSpPr>
+          <p:cNvPr id="24" name="직사각형 23"/>
+          <p:cNvSpPr/>
+          <p:nvPr/>
+        </p:nvSpPr>
+        <p:spPr>
+          <a:xfrm>
+            <a:off x="5715008" y="1214421"/>
+            <a:ext cx="857256" cy="357191"/>
+          </a:xfrm>
+          <a:prstGeom prst="rect">
+            <a:avLst/>
+          </a:prstGeom>
+          <a:solidFill>
+            <a:schemeClr val="accent5">
+              <a:lumMod val="60000"/>
+              <a:lumOff val="40000"/>
+            </a:schemeClr>
+          </a:solidFill>
+          <a:ln>
+            <a:solidFill>
+              <a:schemeClr val="tx1"/>
+            </a:solidFill>
+          </a:ln>
+        </p:spPr>
+        <p:style>
+          <a:lnRef idx="2">
+            <a:schemeClr val="accent1">
+              <a:shade val="50000"/>
+            </a:schemeClr>
+          </a:lnRef>
+          <a:fillRef idx="1">
+            <a:schemeClr val="accent1"/>
+          </a:fillRef>
+          <a:effectRef idx="0">
+            <a:schemeClr val="accent1"/>
+          </a:effectRef>
+          <a:fontRef idx="minor">
+            <a:schemeClr val="lt1"/>
+          </a:fontRef>
+        </p:style>
+        <p:txBody>
+          <a:bodyPr rtlCol="0" anchor="ctr"/>
+          <a:lstStyle/>
+          <a:p>
+            <a:pPr algn="ctr"/>
+            <a:r>
+              <a:rPr lang="ko-KR" altLang="en-US" dirty="0" smtClean="0">
+                <a:solidFill>
+                  <a:schemeClr val="tx1"/>
+                </a:solidFill>
+              </a:rPr>
+              <a:t>변경</a:t>
+            </a:r>
+            <a:endParaRPr lang="ko-KR" altLang="en-US" dirty="0">
+              <a:solidFill>
+                <a:schemeClr val="tx1"/>
+              </a:solidFill>
+            </a:endParaRPr>
+          </a:p>
+        </p:txBody>
+      </p:sp>
+      <p:sp>
+        <p:nvSpPr>
+          <p:cNvPr id="25" name="TextBox 24"/>
+          <p:cNvSpPr txBox="1"/>
+          <p:nvPr/>
+        </p:nvSpPr>
+        <p:spPr>
+          <a:xfrm>
+            <a:off x="5429256" y="1714488"/>
+            <a:ext cx="646331" cy="369332"/>
+          </a:xfrm>
+          <a:prstGeom prst="rect">
+            <a:avLst/>
+          </a:prstGeom>
+          <a:noFill/>
+        </p:spPr>
+        <p:txBody>
+          <a:bodyPr wrap="square" rtlCol="0">
+            <a:spAutoFit/>
+          </a:bodyPr>
+          <a:lstStyle/>
+          <a:p>
+            <a:r>
+              <a:rPr lang="ko-KR" altLang="en-US" dirty="0" smtClean="0"/>
+              <a:t>부서</a:t>
+            </a:r>
+            <a:endParaRPr lang="ko-KR" altLang="en-US" dirty="0"/>
+          </a:p>
+        </p:txBody>
+      </p:sp>
+      <p:sp>
+        <p:nvSpPr>
+          <p:cNvPr id="26" name="TextBox 25"/>
+          <p:cNvSpPr txBox="1"/>
+          <p:nvPr/>
+        </p:nvSpPr>
+        <p:spPr>
+          <a:xfrm>
+            <a:off x="5429256" y="2197136"/>
+            <a:ext cx="646331" cy="369332"/>
+          </a:xfrm>
+          <a:prstGeom prst="rect">
+            <a:avLst/>
+          </a:prstGeom>
+          <a:noFill/>
+        </p:spPr>
+        <p:txBody>
+          <a:bodyPr wrap="square" rtlCol="0">
+            <a:spAutoFit/>
+          </a:bodyPr>
+          <a:lstStyle/>
+          <a:p>
+            <a:r>
+              <a:rPr lang="ko-KR" altLang="en-US" dirty="0" smtClean="0"/>
+              <a:t>직</a:t>
+            </a:r>
+            <a:r>
+              <a:rPr lang="ko-KR" altLang="en-US" dirty="0"/>
+              <a:t>급</a:t>
+            </a:r>
+          </a:p>
+        </p:txBody>
+      </p:sp>
+      <p:sp>
+        <p:nvSpPr>
+          <p:cNvPr id="27" name="직사각형 26"/>
+          <p:cNvSpPr/>
+          <p:nvPr/>
+        </p:nvSpPr>
+        <p:spPr>
+          <a:xfrm>
+            <a:off x="6143636" y="1785926"/>
+            <a:ext cx="1357322" cy="285752"/>
+          </a:xfrm>
+          <a:prstGeom prst="rect">
+            <a:avLst/>
+          </a:prstGeom>
+          <a:noFill/>
+          <a:ln w="19050">
+            <a:solidFill>
+              <a:schemeClr val="tx1"/>
+            </a:solidFill>
+          </a:ln>
+        </p:spPr>
+        <p:style>
+          <a:lnRef idx="2">
+            <a:schemeClr val="accent1">
+              <a:shade val="50000"/>
+            </a:schemeClr>
+          </a:lnRef>
+          <a:fillRef idx="1">
+            <a:schemeClr val="accent1"/>
+          </a:fillRef>
+          <a:effectRef idx="0">
+            <a:schemeClr val="accent1"/>
+          </a:effectRef>
+          <a:fontRef idx="minor">
+            <a:schemeClr val="lt1"/>
+          </a:fontRef>
+        </p:style>
+        <p:txBody>
+          <a:bodyPr rtlCol="0" anchor="ctr"/>
+          <a:lstStyle/>
+          <a:p>
+            <a:pPr algn="ctr"/>
+            <a:endParaRPr lang="ko-KR" altLang="en-US"/>
+          </a:p>
+        </p:txBody>
+      </p:sp>
+      <p:sp>
+        <p:nvSpPr>
+          <p:cNvPr id="28" name="직사각형 27"/>
+          <p:cNvSpPr/>
+          <p:nvPr/>
+        </p:nvSpPr>
+        <p:spPr>
+          <a:xfrm>
+            <a:off x="6143636" y="2268574"/>
+            <a:ext cx="1357322" cy="285752"/>
+          </a:xfrm>
+          <a:prstGeom prst="rect">
+            <a:avLst/>
+          </a:prstGeom>
+          <a:noFill/>
+          <a:ln w="19050">
+            <a:solidFill>
+              <a:schemeClr val="tx1"/>
+            </a:solidFill>
+          </a:ln>
+        </p:spPr>
+        <p:style>
+          <a:lnRef idx="2">
+            <a:schemeClr val="accent1">
+              <a:shade val="50000"/>
+            </a:schemeClr>
+          </a:lnRef>
+          <a:fillRef idx="1">
+            <a:schemeClr val="accent1"/>
+          </a:fillRef>
+          <a:effectRef idx="0">
+            <a:schemeClr val="accent1"/>
+          </a:effectRef>
+          <a:fontRef idx="minor">
+            <a:schemeClr val="lt1"/>
+          </a:fontRef>
+        </p:style>
+        <p:txBody>
+          <a:bodyPr rtlCol="0" anchor="ctr"/>
+          <a:lstStyle/>
+          <a:p>
+            <a:pPr algn="ctr"/>
+            <a:endParaRPr lang="ko-KR" altLang="en-US"/>
+          </a:p>
+        </p:txBody>
+      </p:sp>
+      <p:sp>
+        <p:nvSpPr>
+          <p:cNvPr id="29" name="직사각형 28"/>
+          <p:cNvSpPr/>
+          <p:nvPr/>
+        </p:nvSpPr>
+        <p:spPr>
+          <a:xfrm>
+            <a:off x="6572264" y="5000636"/>
+            <a:ext cx="785818" cy="357190"/>
+          </a:xfrm>
+          <a:prstGeom prst="rect">
+            <a:avLst/>
+          </a:prstGeom>
+        </p:spPr>
+        <p:style>
+          <a:lnRef idx="2">
+            <a:schemeClr val="accent1">
+              <a:shade val="50000"/>
+            </a:schemeClr>
+          </a:lnRef>
+          <a:fillRef idx="1">
+            <a:schemeClr val="accent1"/>
+          </a:fillRef>
+          <a:effectRef idx="0">
+            <a:schemeClr val="accent1"/>
+          </a:effectRef>
+          <a:fontRef idx="minor">
+            <a:schemeClr val="lt1"/>
+          </a:fontRef>
+        </p:style>
+        <p:txBody>
+          <a:bodyPr rtlCol="0" anchor="ctr"/>
+          <a:lstStyle/>
+          <a:p>
+            <a:pPr algn="ctr"/>
+            <a:r>
+              <a:rPr lang="ko-KR" altLang="en-US" dirty="0" smtClean="0"/>
+              <a:t>추가</a:t>
+            </a:r>
+            <a:endParaRPr lang="ko-KR" altLang="en-US" dirty="0"/>
+          </a:p>
+        </p:txBody>
+      </p:sp>
+      <p:sp>
+        <p:nvSpPr>
+          <p:cNvPr id="37" name="직사각형 36"/>
+          <p:cNvSpPr/>
+          <p:nvPr/>
+        </p:nvSpPr>
+        <p:spPr>
+          <a:xfrm>
+            <a:off x="5572132" y="5000636"/>
+            <a:ext cx="785818" cy="357190"/>
+          </a:xfrm>
+          <a:prstGeom prst="rect">
+            <a:avLst/>
+          </a:prstGeom>
+        </p:spPr>
+        <p:style>
+          <a:lnRef idx="2">
+            <a:schemeClr val="accent1">
+              <a:shade val="50000"/>
+            </a:schemeClr>
+          </a:lnRef>
+          <a:fillRef idx="1">
+            <a:schemeClr val="accent1"/>
+          </a:fillRef>
+          <a:effectRef idx="0">
+            <a:schemeClr val="accent1"/>
+          </a:effectRef>
+          <a:fontRef idx="minor">
+            <a:schemeClr val="lt1"/>
+          </a:fontRef>
+        </p:style>
+        <p:txBody>
+          <a:bodyPr rtlCol="0" anchor="ctr"/>
+          <a:lstStyle/>
+          <a:p>
+            <a:pPr algn="ctr"/>
+            <a:r>
+              <a:rPr lang="ko-KR" altLang="en-US" dirty="0" smtClean="0"/>
+              <a:t>취소</a:t>
+            </a:r>
+            <a:endParaRPr lang="ko-KR" altLang="en-US" dirty="0"/>
+          </a:p>
+        </p:txBody>
+      </p:sp>
+      <p:sp>
+        <p:nvSpPr>
+          <p:cNvPr id="38" name="TextBox 37"/>
+          <p:cNvSpPr txBox="1"/>
+          <p:nvPr/>
+        </p:nvSpPr>
+        <p:spPr>
+          <a:xfrm>
+            <a:off x="5422313" y="2707677"/>
+            <a:ext cx="646331" cy="369332"/>
+          </a:xfrm>
+          <a:prstGeom prst="rect">
+            <a:avLst/>
+          </a:prstGeom>
+          <a:noFill/>
+        </p:spPr>
+        <p:txBody>
+          <a:bodyPr wrap="square" rtlCol="0">
+            <a:spAutoFit/>
+          </a:bodyPr>
+          <a:lstStyle/>
+          <a:p>
+            <a:r>
+              <a:rPr lang="ko-KR" altLang="en-US" dirty="0" smtClean="0"/>
+              <a:t>이름</a:t>
+            </a:r>
+            <a:endParaRPr lang="ko-KR" altLang="en-US" dirty="0"/>
+          </a:p>
+        </p:txBody>
+      </p:sp>
+      <p:sp>
+        <p:nvSpPr>
+          <p:cNvPr id="40" name="TextBox 39"/>
+          <p:cNvSpPr txBox="1"/>
+          <p:nvPr/>
+        </p:nvSpPr>
+        <p:spPr>
+          <a:xfrm>
+            <a:off x="5422313" y="3207743"/>
+            <a:ext cx="646331" cy="369332"/>
+          </a:xfrm>
+          <a:prstGeom prst="rect">
+            <a:avLst/>
+          </a:prstGeom>
+          <a:noFill/>
+        </p:spPr>
+        <p:txBody>
+          <a:bodyPr wrap="square" rtlCol="0">
+            <a:spAutoFit/>
+          </a:bodyPr>
+          <a:lstStyle/>
+          <a:p>
+            <a:r>
+              <a:rPr lang="ko-KR" altLang="en-US" dirty="0" smtClean="0"/>
+              <a:t>주</a:t>
+            </a:r>
+            <a:r>
+              <a:rPr lang="ko-KR" altLang="en-US" dirty="0"/>
+              <a:t>소</a:t>
+            </a:r>
+          </a:p>
+        </p:txBody>
+      </p:sp>
+      <p:sp>
+        <p:nvSpPr>
+          <p:cNvPr id="41" name="직사각형 40"/>
+          <p:cNvSpPr/>
+          <p:nvPr/>
+        </p:nvSpPr>
+        <p:spPr>
+          <a:xfrm>
+            <a:off x="6136693" y="2779115"/>
+            <a:ext cx="1357322" cy="285752"/>
+          </a:xfrm>
+          <a:prstGeom prst="rect">
+            <a:avLst/>
+          </a:prstGeom>
+          <a:noFill/>
+          <a:ln w="19050">
+            <a:solidFill>
+              <a:schemeClr val="tx1"/>
+            </a:solidFill>
+          </a:ln>
+        </p:spPr>
+        <p:style>
+          <a:lnRef idx="2">
+            <a:schemeClr val="accent1">
+              <a:shade val="50000"/>
+            </a:schemeClr>
+          </a:lnRef>
+          <a:fillRef idx="1">
+            <a:schemeClr val="accent1"/>
+          </a:fillRef>
+          <a:effectRef idx="0">
+            <a:schemeClr val="accent1"/>
+          </a:effectRef>
+          <a:fontRef idx="minor">
+            <a:schemeClr val="lt1"/>
+          </a:fontRef>
+        </p:style>
+        <p:txBody>
+          <a:bodyPr rtlCol="0" anchor="ctr"/>
+          <a:lstStyle/>
+          <a:p>
+            <a:pPr algn="ctr"/>
+            <a:endParaRPr lang="ko-KR" altLang="en-US"/>
+          </a:p>
+        </p:txBody>
+      </p:sp>
+      <p:sp>
+        <p:nvSpPr>
+          <p:cNvPr id="42" name="직사각형 41"/>
+          <p:cNvSpPr/>
+          <p:nvPr/>
+        </p:nvSpPr>
+        <p:spPr>
+          <a:xfrm>
+            <a:off x="6136693" y="3279181"/>
+            <a:ext cx="1357322" cy="285752"/>
+          </a:xfrm>
+          <a:prstGeom prst="rect">
+            <a:avLst/>
+          </a:prstGeom>
+          <a:noFill/>
+          <a:ln w="19050">
+            <a:solidFill>
+              <a:schemeClr val="tx1"/>
+            </a:solidFill>
+          </a:ln>
+        </p:spPr>
+        <p:style>
+          <a:lnRef idx="2">
+            <a:schemeClr val="accent1">
+              <a:shade val="50000"/>
+            </a:schemeClr>
+          </a:lnRef>
+          <a:fillRef idx="1">
+            <a:schemeClr val="accent1"/>
+          </a:fillRef>
+          <a:effectRef idx="0">
+            <a:schemeClr val="accent1"/>
+          </a:effectRef>
+          <a:fontRef idx="minor">
+            <a:schemeClr val="lt1"/>
+          </a:fontRef>
+        </p:style>
+        <p:txBody>
+          <a:bodyPr rtlCol="0" anchor="ctr"/>
+          <a:lstStyle/>
+          <a:p>
+            <a:pPr algn="ctr"/>
+            <a:endParaRPr lang="ko-KR" altLang="en-US"/>
+          </a:p>
+        </p:txBody>
+      </p:sp>
+      <p:sp>
+        <p:nvSpPr>
+          <p:cNvPr id="44" name="TextBox 43"/>
+          <p:cNvSpPr txBox="1"/>
+          <p:nvPr/>
+        </p:nvSpPr>
+        <p:spPr>
+          <a:xfrm>
+            <a:off x="5429256" y="3702610"/>
+            <a:ext cx="646331" cy="276999"/>
+          </a:xfrm>
+          <a:prstGeom prst="rect">
+            <a:avLst/>
+          </a:prstGeom>
+          <a:noFill/>
+        </p:spPr>
+        <p:txBody>
+          <a:bodyPr wrap="square" rtlCol="0">
+            <a:spAutoFit/>
+          </a:bodyPr>
+          <a:lstStyle/>
+          <a:p>
+            <a:r>
+              <a:rPr lang="ko-KR" altLang="en-US" sz="1200" dirty="0" smtClean="0"/>
+              <a:t>연락처</a:t>
+            </a:r>
+            <a:endParaRPr lang="ko-KR" altLang="en-US" sz="1200" dirty="0"/>
+          </a:p>
+        </p:txBody>
+      </p:sp>
+      <p:sp>
+        <p:nvSpPr>
+          <p:cNvPr id="45" name="직사각형 44"/>
+          <p:cNvSpPr/>
+          <p:nvPr/>
+        </p:nvSpPr>
+        <p:spPr>
+          <a:xfrm>
+            <a:off x="6143636" y="3774048"/>
+            <a:ext cx="1357322" cy="285752"/>
+          </a:xfrm>
+          <a:prstGeom prst="rect">
+            <a:avLst/>
+          </a:prstGeom>
+          <a:noFill/>
+          <a:ln w="19050">
+            <a:solidFill>
+              <a:schemeClr val="tx1"/>
+            </a:solidFill>
+          </a:ln>
+        </p:spPr>
+        <p:style>
+          <a:lnRef idx="2">
+            <a:schemeClr val="accent1">
+              <a:shade val="50000"/>
+            </a:schemeClr>
+          </a:lnRef>
+          <a:fillRef idx="1">
+            <a:schemeClr val="accent1"/>
+          </a:fillRef>
+          <a:effectRef idx="0">
+            <a:schemeClr val="accent1"/>
+          </a:effectRef>
+          <a:fontRef idx="minor">
+            <a:schemeClr val="lt1"/>
+          </a:fontRef>
+        </p:style>
+        <p:txBody>
+          <a:bodyPr rtlCol="0" anchor="ctr"/>
+          <a:lstStyle/>
+          <a:p>
+            <a:pPr algn="ctr"/>
+            <a:endParaRPr lang="ko-KR" altLang="en-US"/>
+          </a:p>
+        </p:txBody>
+      </p:sp>
+      <p:sp>
+        <p:nvSpPr>
+          <p:cNvPr id="46" name="이등변 삼각형 45"/>
+          <p:cNvSpPr/>
+          <p:nvPr/>
+        </p:nvSpPr>
+        <p:spPr>
+          <a:xfrm flipH="1" flipV="1">
+            <a:off x="7286644" y="1857364"/>
+            <a:ext cx="142876" cy="142876"/>
+          </a:xfrm>
+          <a:prstGeom prst="triangle">
+            <a:avLst/>
+          </a:prstGeom>
+        </p:spPr>
+        <p:style>
+          <a:lnRef idx="2">
+            <a:schemeClr val="accent1">
+              <a:shade val="50000"/>
+            </a:schemeClr>
+          </a:lnRef>
+          <a:fillRef idx="1">
+            <a:schemeClr val="accent1"/>
+          </a:fillRef>
+          <a:effectRef idx="0">
+            <a:schemeClr val="accent1"/>
+          </a:effectRef>
+          <a:fontRef idx="minor">
+            <a:schemeClr val="lt1"/>
+          </a:fontRef>
+        </p:style>
+        <p:txBody>
+          <a:bodyPr rtlCol="0" anchor="ctr"/>
+          <a:lstStyle/>
+          <a:p>
+            <a:pPr algn="ctr"/>
+            <a:endParaRPr lang="ko-KR" altLang="en-US"/>
+          </a:p>
+        </p:txBody>
+      </p:sp>
+      <p:sp>
+        <p:nvSpPr>
+          <p:cNvPr id="47" name="이등변 삼각형 46"/>
+          <p:cNvSpPr/>
+          <p:nvPr/>
+        </p:nvSpPr>
+        <p:spPr>
+          <a:xfrm flipH="1" flipV="1">
+            <a:off x="7286644" y="2357430"/>
+            <a:ext cx="142876" cy="142876"/>
+          </a:xfrm>
+          <a:prstGeom prst="triangle">
+            <a:avLst/>
+          </a:prstGeom>
+        </p:spPr>
+        <p:style>
+          <a:lnRef idx="2">
+            <a:schemeClr val="accent1">
+              <a:shade val="50000"/>
+            </a:schemeClr>
+          </a:lnRef>
+          <a:fillRef idx="1">
+            <a:schemeClr val="accent1"/>
+          </a:fillRef>
+          <a:effectRef idx="0">
+            <a:schemeClr val="accent1"/>
+          </a:effectRef>
+          <a:fontRef idx="minor">
+            <a:schemeClr val="lt1"/>
+          </a:fontRef>
+        </p:style>
+        <p:txBody>
+          <a:bodyPr rtlCol="0" anchor="ctr"/>
+          <a:lstStyle/>
+          <a:p>
+            <a:pPr algn="ctr"/>
+            <a:endParaRPr lang="ko-KR" altLang="en-US"/>
+          </a:p>
+        </p:txBody>
+      </p:sp>
+      <p:sp>
+        <p:nvSpPr>
+          <p:cNvPr id="48" name="직사각형 47"/>
+          <p:cNvSpPr/>
+          <p:nvPr/>
+        </p:nvSpPr>
+        <p:spPr>
+          <a:xfrm>
+            <a:off x="5214942" y="2786058"/>
+            <a:ext cx="142876" cy="142876"/>
+          </a:xfrm>
+          <a:prstGeom prst="rect">
+            <a:avLst/>
+          </a:prstGeom>
+          <a:noFill/>
+          <a:ln w="19050">
+            <a:solidFill>
+              <a:schemeClr val="tx1"/>
+            </a:solidFill>
+          </a:ln>
+        </p:spPr>
+        <p:style>
+          <a:lnRef idx="2">
+            <a:schemeClr val="accent1">
+              <a:shade val="50000"/>
+            </a:schemeClr>
+          </a:lnRef>
+          <a:fillRef idx="1">
+            <a:schemeClr val="accent1"/>
+          </a:fillRef>
+          <a:effectRef idx="0">
+            <a:schemeClr val="accent1"/>
+          </a:effectRef>
+          <a:fontRef idx="minor">
+            <a:schemeClr val="lt1"/>
+          </a:fontRef>
+        </p:style>
+        <p:txBody>
+          <a:bodyPr rtlCol="0" anchor="ctr"/>
+          <a:lstStyle/>
+          <a:p>
+            <a:pPr algn="ctr"/>
+            <a:endParaRPr lang="ko-KR" altLang="en-US"/>
+          </a:p>
+        </p:txBody>
+      </p:sp>
+      <p:sp>
+        <p:nvSpPr>
+          <p:cNvPr id="49" name="직사각형 48"/>
+          <p:cNvSpPr/>
+          <p:nvPr/>
+        </p:nvSpPr>
+        <p:spPr>
+          <a:xfrm>
+            <a:off x="5214942" y="2285992"/>
+            <a:ext cx="142876" cy="142876"/>
+          </a:xfrm>
+          <a:prstGeom prst="rect">
+            <a:avLst/>
+          </a:prstGeom>
+          <a:noFill/>
+          <a:ln w="19050">
+            <a:solidFill>
+              <a:schemeClr val="tx1"/>
+            </a:solidFill>
+          </a:ln>
+        </p:spPr>
+        <p:style>
+          <a:lnRef idx="2">
+            <a:schemeClr val="accent1">
+              <a:shade val="50000"/>
+            </a:schemeClr>
+          </a:lnRef>
+          <a:fillRef idx="1">
+            <a:schemeClr val="accent1"/>
+          </a:fillRef>
+          <a:effectRef idx="0">
+            <a:schemeClr val="accent1"/>
+          </a:effectRef>
+          <a:fontRef idx="minor">
+            <a:schemeClr val="lt1"/>
+          </a:fontRef>
+        </p:style>
+        <p:txBody>
+          <a:bodyPr rtlCol="0" anchor="ctr"/>
+          <a:lstStyle/>
+          <a:p>
+            <a:pPr algn="ctr"/>
+            <a:endParaRPr lang="ko-KR" altLang="en-US"/>
+          </a:p>
+        </p:txBody>
+      </p:sp>
+      <p:sp>
+        <p:nvSpPr>
+          <p:cNvPr id="50" name="직사각형 49"/>
+          <p:cNvSpPr/>
+          <p:nvPr/>
+        </p:nvSpPr>
+        <p:spPr>
+          <a:xfrm>
+            <a:off x="5214942" y="1785926"/>
+            <a:ext cx="142876" cy="142876"/>
+          </a:xfrm>
+          <a:prstGeom prst="rect">
+            <a:avLst/>
+          </a:prstGeom>
+          <a:noFill/>
+          <a:ln w="19050">
+            <a:solidFill>
+              <a:schemeClr val="tx1"/>
+            </a:solidFill>
+          </a:ln>
+        </p:spPr>
+        <p:style>
+          <a:lnRef idx="2">
+            <a:schemeClr val="accent1">
+              <a:shade val="50000"/>
+            </a:schemeClr>
+          </a:lnRef>
+          <a:fillRef idx="1">
+            <a:schemeClr val="accent1"/>
+          </a:fillRef>
+          <a:effectRef idx="0">
+            <a:schemeClr val="accent1"/>
+          </a:effectRef>
+          <a:fontRef idx="minor">
+            <a:schemeClr val="lt1"/>
+          </a:fontRef>
+        </p:style>
+        <p:txBody>
+          <a:bodyPr rtlCol="0" anchor="ctr"/>
+          <a:lstStyle/>
+          <a:p>
+            <a:pPr algn="ctr"/>
+            <a:endParaRPr lang="ko-KR" altLang="en-US"/>
+          </a:p>
+        </p:txBody>
+      </p:sp>
+      <p:sp>
+        <p:nvSpPr>
+          <p:cNvPr id="53" name="직사각형 52"/>
+          <p:cNvSpPr/>
+          <p:nvPr/>
+        </p:nvSpPr>
+        <p:spPr>
+          <a:xfrm>
+            <a:off x="5214942" y="3286124"/>
+            <a:ext cx="142876" cy="142876"/>
+          </a:xfrm>
+          <a:prstGeom prst="rect">
+            <a:avLst/>
+          </a:prstGeom>
+          <a:noFill/>
+          <a:ln w="19050">
+            <a:solidFill>
+              <a:schemeClr val="tx1"/>
+            </a:solidFill>
+          </a:ln>
+        </p:spPr>
+        <p:style>
+          <a:lnRef idx="2">
+            <a:schemeClr val="accent1">
+              <a:shade val="50000"/>
+            </a:schemeClr>
+          </a:lnRef>
+          <a:fillRef idx="1">
+            <a:schemeClr val="accent1"/>
+          </a:fillRef>
+          <a:effectRef idx="0">
+            <a:schemeClr val="accent1"/>
+          </a:effectRef>
+          <a:fontRef idx="minor">
+            <a:schemeClr val="lt1"/>
+          </a:fontRef>
+        </p:style>
+        <p:txBody>
+          <a:bodyPr rtlCol="0" anchor="ctr"/>
+          <a:lstStyle/>
+          <a:p>
+            <a:pPr algn="ctr"/>
+            <a:endParaRPr lang="ko-KR" altLang="en-US"/>
+          </a:p>
+        </p:txBody>
+      </p:sp>
+      <p:sp>
+        <p:nvSpPr>
+          <p:cNvPr id="54" name="직사각형 53"/>
+          <p:cNvSpPr/>
+          <p:nvPr/>
+        </p:nvSpPr>
+        <p:spPr>
+          <a:xfrm>
+            <a:off x="5214942" y="3786190"/>
+            <a:ext cx="142876" cy="142876"/>
+          </a:xfrm>
+          <a:prstGeom prst="rect">
+            <a:avLst/>
+          </a:prstGeom>
+          <a:noFill/>
+          <a:ln w="19050">
+            <a:solidFill>
+              <a:schemeClr val="tx1"/>
+            </a:solidFill>
+          </a:ln>
+        </p:spPr>
+        <p:style>
+          <a:lnRef idx="2">
+            <a:schemeClr val="accent1">
+              <a:shade val="50000"/>
+            </a:schemeClr>
+          </a:lnRef>
+          <a:fillRef idx="1">
+            <a:schemeClr val="accent1"/>
+          </a:fillRef>
+          <a:effectRef idx="0">
+            <a:schemeClr val="accent1"/>
+          </a:effectRef>
+          <a:fontRef idx="minor">
+            <a:schemeClr val="lt1"/>
+          </a:fontRef>
+        </p:style>
+        <p:txBody>
+          <a:bodyPr rtlCol="0" anchor="ctr"/>
+          <a:lstStyle/>
+          <a:p>
+            <a:pPr algn="ctr"/>
+            <a:endParaRPr lang="ko-KR" altLang="en-US"/>
+          </a:p>
+        </p:txBody>
+      </p:sp>
+      <p:sp>
+        <p:nvSpPr>
+          <p:cNvPr id="55" name="TextBox 54"/>
+          <p:cNvSpPr txBox="1"/>
+          <p:nvPr/>
+        </p:nvSpPr>
+        <p:spPr>
+          <a:xfrm>
+            <a:off x="5422313" y="4143380"/>
+            <a:ext cx="646331" cy="369332"/>
+          </a:xfrm>
+          <a:prstGeom prst="rect">
+            <a:avLst/>
+          </a:prstGeom>
+          <a:noFill/>
+        </p:spPr>
+        <p:txBody>
+          <a:bodyPr wrap="square" rtlCol="0">
+            <a:spAutoFit/>
+          </a:bodyPr>
+          <a:lstStyle/>
+          <a:p>
+            <a:r>
+              <a:rPr lang="ko-KR" altLang="en-US" dirty="0" smtClean="0"/>
+              <a:t>사유</a:t>
+            </a:r>
+            <a:endParaRPr lang="ko-KR" altLang="en-US" dirty="0"/>
+          </a:p>
+        </p:txBody>
+      </p:sp>
+      <p:sp>
+        <p:nvSpPr>
+          <p:cNvPr id="56" name="직사각형 55"/>
+          <p:cNvSpPr/>
+          <p:nvPr/>
+        </p:nvSpPr>
+        <p:spPr>
+          <a:xfrm>
+            <a:off x="6136693" y="4214818"/>
+            <a:ext cx="1357322" cy="285752"/>
+          </a:xfrm>
+          <a:prstGeom prst="rect">
+            <a:avLst/>
+          </a:prstGeom>
+          <a:noFill/>
+          <a:ln w="19050">
+            <a:solidFill>
+              <a:schemeClr val="tx1"/>
+            </a:solidFill>
+          </a:ln>
         </p:spPr>
         <p:style>
           <a:lnRef idx="2">
@@ -10656,11 +12414,7 @@
             <a:pPr algn="ctr"/>
             <a:r>
               <a:rPr lang="ko-KR" altLang="en-US" dirty="0" smtClean="0"/>
-              <a:t>취</a:t>
-            </a:r>
-            <a:r>
-              <a:rPr lang="ko-KR" altLang="en-US" dirty="0" smtClean="0"/>
-              <a:t>소</a:t>
+              <a:t>취소</a:t>
             </a:r>
             <a:endParaRPr lang="en-US" altLang="ko-KR" dirty="0" smtClean="0"/>
           </a:p>
@@ -11933,11 +13687,7 @@
             <a:pPr algn="ctr"/>
             <a:r>
               <a:rPr lang="ko-KR" altLang="en-US" dirty="0" smtClean="0"/>
-              <a:t>취</a:t>
-            </a:r>
-            <a:r>
-              <a:rPr lang="ko-KR" altLang="en-US" dirty="0" smtClean="0"/>
-              <a:t>소</a:t>
+              <a:t>취소</a:t>
             </a:r>
             <a:endParaRPr lang="en-US" altLang="ko-KR" dirty="0" smtClean="0"/>
           </a:p>
@@ -12598,11 +14348,7 @@
           <a:p>
             <a:r>
               <a:rPr lang="ko-KR" altLang="en-US" dirty="0" smtClean="0"/>
-              <a:t>야</a:t>
-            </a:r>
-            <a:r>
-              <a:rPr lang="ko-KR" altLang="en-US" dirty="0" smtClean="0"/>
-              <a:t>근</a:t>
+              <a:t>야근</a:t>
             </a:r>
             <a:endParaRPr lang="en-US" altLang="ko-KR" dirty="0" smtClean="0"/>
           </a:p>
@@ -12634,7 +14380,6 @@
               <a:rPr lang="en-US" altLang="ko-KR" dirty="0" smtClean="0"/>
               <a:t>Etc. Management</a:t>
             </a:r>
-            <a:endParaRPr lang="en-US" altLang="ko-KR" dirty="0" smtClean="0"/>
           </a:p>
         </p:txBody>
       </p:sp>
@@ -12676,11 +14421,7 @@
             <a:pPr algn="ctr"/>
             <a:r>
               <a:rPr lang="ko-KR" altLang="en-US" dirty="0" smtClean="0"/>
-              <a:t>취</a:t>
-            </a:r>
-            <a:r>
-              <a:rPr lang="ko-KR" altLang="en-US" dirty="0" smtClean="0"/>
-              <a:t>소</a:t>
+              <a:t>취소</a:t>
             </a:r>
             <a:endParaRPr lang="en-US" altLang="ko-KR" dirty="0" smtClean="0"/>
           </a:p>

</xml_diff>

<commit_message>
Update (edit staff, attendance, ...)
</commit_message>
<xml_diff>
--- a/2.Design/ui.pptx
+++ b/2.Design/ui.pptx
@@ -11,11 +11,12 @@
     <p:sldId id="261" r:id="rId5"/>
     <p:sldId id="259" r:id="rId6"/>
     <p:sldId id="264" r:id="rId7"/>
-    <p:sldId id="266" r:id="rId8"/>
-    <p:sldId id="263" r:id="rId9"/>
-    <p:sldId id="262" r:id="rId10"/>
-    <p:sldId id="260" r:id="rId11"/>
-    <p:sldId id="267" r:id="rId12"/>
+    <p:sldId id="268" r:id="rId8"/>
+    <p:sldId id="266" r:id="rId9"/>
+    <p:sldId id="263" r:id="rId10"/>
+    <p:sldId id="262" r:id="rId11"/>
+    <p:sldId id="260" r:id="rId12"/>
+    <p:sldId id="267" r:id="rId13"/>
   </p:sldIdLst>
   <p:sldSz cx="9144000" cy="6858000" type="screen4x3"/>
   <p:notesSz cx="6858000" cy="9144000"/>
@@ -299,7 +300,7 @@
             <a:fld id="{72AB7076-BA11-4D5D-90BA-2C7F8A65331E}" type="datetimeFigureOut">
               <a:rPr lang="ko-KR" altLang="en-US" smtClean="0"/>
               <a:pPr/>
-              <a:t>2018-03-06</a:t>
+              <a:t>2018-03-14</a:t>
             </a:fld>
             <a:endParaRPr lang="ko-KR" altLang="en-US" dirty="0"/>
           </a:p>
@@ -466,7 +467,7 @@
             <a:fld id="{72AB7076-BA11-4D5D-90BA-2C7F8A65331E}" type="datetimeFigureOut">
               <a:rPr lang="ko-KR" altLang="en-US" smtClean="0"/>
               <a:pPr/>
-              <a:t>2018-03-06</a:t>
+              <a:t>2018-03-14</a:t>
             </a:fld>
             <a:endParaRPr lang="ko-KR" altLang="en-US" dirty="0"/>
           </a:p>
@@ -643,7 +644,7 @@
             <a:fld id="{72AB7076-BA11-4D5D-90BA-2C7F8A65331E}" type="datetimeFigureOut">
               <a:rPr lang="ko-KR" altLang="en-US" smtClean="0"/>
               <a:pPr/>
-              <a:t>2018-03-06</a:t>
+              <a:t>2018-03-14</a:t>
             </a:fld>
             <a:endParaRPr lang="ko-KR" altLang="en-US" dirty="0"/>
           </a:p>
@@ -810,7 +811,7 @@
             <a:fld id="{72AB7076-BA11-4D5D-90BA-2C7F8A65331E}" type="datetimeFigureOut">
               <a:rPr lang="ko-KR" altLang="en-US" smtClean="0"/>
               <a:pPr/>
-              <a:t>2018-03-06</a:t>
+              <a:t>2018-03-14</a:t>
             </a:fld>
             <a:endParaRPr lang="ko-KR" altLang="en-US" dirty="0"/>
           </a:p>
@@ -1053,7 +1054,7 @@
             <a:fld id="{72AB7076-BA11-4D5D-90BA-2C7F8A65331E}" type="datetimeFigureOut">
               <a:rPr lang="ko-KR" altLang="en-US" smtClean="0"/>
               <a:pPr/>
-              <a:t>2018-03-06</a:t>
+              <a:t>2018-03-14</a:t>
             </a:fld>
             <a:endParaRPr lang="ko-KR" altLang="en-US" dirty="0"/>
           </a:p>
@@ -1338,7 +1339,7 @@
             <a:fld id="{72AB7076-BA11-4D5D-90BA-2C7F8A65331E}" type="datetimeFigureOut">
               <a:rPr lang="ko-KR" altLang="en-US" smtClean="0"/>
               <a:pPr/>
-              <a:t>2018-03-06</a:t>
+              <a:t>2018-03-14</a:t>
             </a:fld>
             <a:endParaRPr lang="ko-KR" altLang="en-US" dirty="0"/>
           </a:p>
@@ -1757,7 +1758,7 @@
             <a:fld id="{72AB7076-BA11-4D5D-90BA-2C7F8A65331E}" type="datetimeFigureOut">
               <a:rPr lang="ko-KR" altLang="en-US" smtClean="0"/>
               <a:pPr/>
-              <a:t>2018-03-06</a:t>
+              <a:t>2018-03-14</a:t>
             </a:fld>
             <a:endParaRPr lang="ko-KR" altLang="en-US" dirty="0"/>
           </a:p>
@@ -1872,7 +1873,7 @@
             <a:fld id="{72AB7076-BA11-4D5D-90BA-2C7F8A65331E}" type="datetimeFigureOut">
               <a:rPr lang="ko-KR" altLang="en-US" smtClean="0"/>
               <a:pPr/>
-              <a:t>2018-03-06</a:t>
+              <a:t>2018-03-14</a:t>
             </a:fld>
             <a:endParaRPr lang="ko-KR" altLang="en-US" dirty="0"/>
           </a:p>
@@ -1964,7 +1965,7 @@
             <a:fld id="{72AB7076-BA11-4D5D-90BA-2C7F8A65331E}" type="datetimeFigureOut">
               <a:rPr lang="ko-KR" altLang="en-US" smtClean="0"/>
               <a:pPr/>
-              <a:t>2018-03-06</a:t>
+              <a:t>2018-03-14</a:t>
             </a:fld>
             <a:endParaRPr lang="ko-KR" altLang="en-US" dirty="0"/>
           </a:p>
@@ -2238,7 +2239,7 @@
             <a:fld id="{72AB7076-BA11-4D5D-90BA-2C7F8A65331E}" type="datetimeFigureOut">
               <a:rPr lang="ko-KR" altLang="en-US" smtClean="0"/>
               <a:pPr/>
-              <a:t>2018-03-06</a:t>
+              <a:t>2018-03-14</a:t>
             </a:fld>
             <a:endParaRPr lang="ko-KR" altLang="en-US" dirty="0"/>
           </a:p>
@@ -2488,7 +2489,7 @@
             <a:fld id="{72AB7076-BA11-4D5D-90BA-2C7F8A65331E}" type="datetimeFigureOut">
               <a:rPr lang="ko-KR" altLang="en-US" smtClean="0"/>
               <a:pPr/>
-              <a:t>2018-03-06</a:t>
+              <a:t>2018-03-14</a:t>
             </a:fld>
             <a:endParaRPr lang="ko-KR" altLang="en-US" dirty="0"/>
           </a:p>
@@ -2698,7 +2699,7 @@
             <a:fld id="{72AB7076-BA11-4D5D-90BA-2C7F8A65331E}" type="datetimeFigureOut">
               <a:rPr lang="ko-KR" altLang="en-US" smtClean="0"/>
               <a:pPr/>
-              <a:t>2018-03-06</a:t>
+              <a:t>2018-03-14</a:t>
             </a:fld>
             <a:endParaRPr lang="ko-KR" altLang="en-US" dirty="0"/>
           </a:p>
@@ -4277,8 +4278,8 @@
         </p:nvSpPr>
         <p:spPr>
           <a:xfrm>
-            <a:off x="3071802" y="1357298"/>
-            <a:ext cx="3286148" cy="4714908"/>
+            <a:off x="142844" y="1285860"/>
+            <a:ext cx="8858312" cy="4143404"/>
           </a:xfrm>
           <a:prstGeom prst="rect">
             <a:avLst/>
@@ -4315,16 +4316,635 @@
           </a:p>
         </p:txBody>
       </p:sp>
-      <p:sp>
-        <p:nvSpPr>
-          <p:cNvPr id="31" name="TextBox 30"/>
+      <p:graphicFrame>
+        <p:nvGraphicFramePr>
+          <p:cNvPr id="15" name="표 14"/>
+          <p:cNvGraphicFramePr>
+            <a:graphicFrameLocks noGrp="1"/>
+          </p:cNvGraphicFramePr>
+          <p:nvPr/>
+        </p:nvGraphicFramePr>
+        <p:xfrm>
+          <a:off x="357158" y="2000240"/>
+          <a:ext cx="8501125" cy="3071834"/>
+        </p:xfrm>
+        <a:graphic>
+          <a:graphicData uri="http://schemas.openxmlformats.org/drawingml/2006/table">
+            <a:tbl>
+              <a:tblPr firstRow="1" bandRow="1">
+                <a:tableStyleId>{073A0DAA-6AF3-43AB-8588-CEC1D06C72B9}</a:tableStyleId>
+              </a:tblPr>
+              <a:tblGrid>
+                <a:gridCol w="1700225"/>
+                <a:gridCol w="1700225"/>
+                <a:gridCol w="1700225"/>
+                <a:gridCol w="1700225"/>
+                <a:gridCol w="1700225"/>
+              </a:tblGrid>
+              <a:tr h="500066">
+                <a:tc>
+                  <a:txBody>
+                    <a:bodyPr/>
+                    <a:lstStyle/>
+                    <a:p>
+                      <a:pPr algn="ctr" latinLnBrk="1"/>
+                      <a:r>
+                        <a:rPr lang="ko-KR" altLang="en-US" sz="1200" dirty="0" smtClean="0"/>
+                        <a:t>날짜</a:t>
+                      </a:r>
+                      <a:endParaRPr lang="ko-KR" altLang="en-US" sz="1200" dirty="0"/>
+                    </a:p>
+                  </a:txBody>
+                  <a:tcPr anchor="ctr"/>
+                </a:tc>
+                <a:tc>
+                  <a:txBody>
+                    <a:bodyPr/>
+                    <a:lstStyle/>
+                    <a:p>
+                      <a:pPr algn="ctr" latinLnBrk="1"/>
+                      <a:r>
+                        <a:rPr lang="ko-KR" altLang="en-US" sz="1200" dirty="0" smtClean="0"/>
+                        <a:t>출근시간</a:t>
+                      </a:r>
+                      <a:endParaRPr lang="ko-KR" altLang="en-US" sz="1200" dirty="0"/>
+                    </a:p>
+                  </a:txBody>
+                  <a:tcPr anchor="ctr"/>
+                </a:tc>
+                <a:tc>
+                  <a:txBody>
+                    <a:bodyPr/>
+                    <a:lstStyle/>
+                    <a:p>
+                      <a:pPr algn="ctr" latinLnBrk="1"/>
+                      <a:r>
+                        <a:rPr lang="ko-KR" altLang="en-US" sz="1200" dirty="0" smtClean="0"/>
+                        <a:t>퇴근시간</a:t>
+                      </a:r>
+                      <a:endParaRPr lang="ko-KR" altLang="en-US" sz="1200" dirty="0"/>
+                    </a:p>
+                  </a:txBody>
+                  <a:tcPr anchor="ctr"/>
+                </a:tc>
+                <a:tc>
+                  <a:txBody>
+                    <a:bodyPr/>
+                    <a:lstStyle/>
+                    <a:p>
+                      <a:pPr algn="ctr" latinLnBrk="1"/>
+                      <a:r>
+                        <a:rPr lang="ko-KR" altLang="en-US" sz="1200" dirty="0" smtClean="0"/>
+                        <a:t>초과근무시간</a:t>
+                      </a:r>
+                      <a:endParaRPr lang="ko-KR" altLang="en-US" sz="1200" dirty="0"/>
+                    </a:p>
+                  </a:txBody>
+                  <a:tcPr anchor="ctr"/>
+                </a:tc>
+                <a:tc>
+                  <a:txBody>
+                    <a:bodyPr/>
+                    <a:lstStyle/>
+                    <a:p>
+                      <a:pPr algn="ctr" latinLnBrk="1"/>
+                      <a:r>
+                        <a:rPr lang="ko-KR" altLang="en-US" sz="1200" dirty="0" smtClean="0"/>
+                        <a:t>구분</a:t>
+                      </a:r>
+                      <a:endParaRPr lang="ko-KR" altLang="en-US" sz="1200" dirty="0"/>
+                    </a:p>
+                  </a:txBody>
+                  <a:tcPr anchor="ctr"/>
+                </a:tc>
+              </a:tr>
+              <a:tr h="285752">
+                <a:tc>
+                  <a:txBody>
+                    <a:bodyPr/>
+                    <a:lstStyle/>
+                    <a:p>
+                      <a:pPr latinLnBrk="1"/>
+                      <a:endParaRPr lang="ko-KR" altLang="en-US" sz="1200" dirty="0"/>
+                    </a:p>
+                  </a:txBody>
+                  <a:tcPr/>
+                </a:tc>
+                <a:tc>
+                  <a:txBody>
+                    <a:bodyPr/>
+                    <a:lstStyle/>
+                    <a:p>
+                      <a:pPr latinLnBrk="1"/>
+                      <a:endParaRPr lang="ko-KR" altLang="en-US" sz="1200"/>
+                    </a:p>
+                  </a:txBody>
+                  <a:tcPr/>
+                </a:tc>
+                <a:tc>
+                  <a:txBody>
+                    <a:bodyPr/>
+                    <a:lstStyle/>
+                    <a:p>
+                      <a:pPr latinLnBrk="1"/>
+                      <a:endParaRPr lang="ko-KR" altLang="en-US" sz="1200" dirty="0"/>
+                    </a:p>
+                  </a:txBody>
+                  <a:tcPr/>
+                </a:tc>
+                <a:tc>
+                  <a:txBody>
+                    <a:bodyPr/>
+                    <a:lstStyle/>
+                    <a:p>
+                      <a:pPr latinLnBrk="1"/>
+                      <a:endParaRPr lang="ko-KR" altLang="en-US" sz="1200" dirty="0"/>
+                    </a:p>
+                  </a:txBody>
+                  <a:tcPr/>
+                </a:tc>
+                <a:tc>
+                  <a:txBody>
+                    <a:bodyPr/>
+                    <a:lstStyle/>
+                    <a:p>
+                      <a:pPr latinLnBrk="1"/>
+                      <a:endParaRPr lang="ko-KR" altLang="en-US" sz="1200"/>
+                    </a:p>
+                  </a:txBody>
+                  <a:tcPr/>
+                </a:tc>
+              </a:tr>
+              <a:tr h="285752">
+                <a:tc>
+                  <a:txBody>
+                    <a:bodyPr/>
+                    <a:lstStyle/>
+                    <a:p>
+                      <a:pPr latinLnBrk="1"/>
+                      <a:endParaRPr lang="ko-KR" altLang="en-US" sz="1200"/>
+                    </a:p>
+                  </a:txBody>
+                  <a:tcPr/>
+                </a:tc>
+                <a:tc>
+                  <a:txBody>
+                    <a:bodyPr/>
+                    <a:lstStyle/>
+                    <a:p>
+                      <a:pPr latinLnBrk="1"/>
+                      <a:endParaRPr lang="ko-KR" altLang="en-US" sz="1200"/>
+                    </a:p>
+                  </a:txBody>
+                  <a:tcPr/>
+                </a:tc>
+                <a:tc>
+                  <a:txBody>
+                    <a:bodyPr/>
+                    <a:lstStyle/>
+                    <a:p>
+                      <a:pPr latinLnBrk="1"/>
+                      <a:endParaRPr lang="ko-KR" altLang="en-US" sz="1200"/>
+                    </a:p>
+                  </a:txBody>
+                  <a:tcPr/>
+                </a:tc>
+                <a:tc>
+                  <a:txBody>
+                    <a:bodyPr/>
+                    <a:lstStyle/>
+                    <a:p>
+                      <a:pPr latinLnBrk="1"/>
+                      <a:endParaRPr lang="ko-KR" altLang="en-US" sz="1200" dirty="0"/>
+                    </a:p>
+                  </a:txBody>
+                  <a:tcPr/>
+                </a:tc>
+                <a:tc>
+                  <a:txBody>
+                    <a:bodyPr/>
+                    <a:lstStyle/>
+                    <a:p>
+                      <a:pPr latinLnBrk="1"/>
+                      <a:endParaRPr lang="ko-KR" altLang="en-US" sz="1200"/>
+                    </a:p>
+                  </a:txBody>
+                  <a:tcPr/>
+                </a:tc>
+              </a:tr>
+              <a:tr h="285752">
+                <a:tc>
+                  <a:txBody>
+                    <a:bodyPr/>
+                    <a:lstStyle/>
+                    <a:p>
+                      <a:pPr latinLnBrk="1"/>
+                      <a:endParaRPr lang="ko-KR" altLang="en-US" sz="1200" dirty="0"/>
+                    </a:p>
+                  </a:txBody>
+                  <a:tcPr/>
+                </a:tc>
+                <a:tc>
+                  <a:txBody>
+                    <a:bodyPr/>
+                    <a:lstStyle/>
+                    <a:p>
+                      <a:pPr latinLnBrk="1"/>
+                      <a:endParaRPr lang="ko-KR" altLang="en-US" sz="1200"/>
+                    </a:p>
+                  </a:txBody>
+                  <a:tcPr/>
+                </a:tc>
+                <a:tc>
+                  <a:txBody>
+                    <a:bodyPr/>
+                    <a:lstStyle/>
+                    <a:p>
+                      <a:pPr latinLnBrk="1"/>
+                      <a:endParaRPr lang="ko-KR" altLang="en-US" sz="1200"/>
+                    </a:p>
+                  </a:txBody>
+                  <a:tcPr/>
+                </a:tc>
+                <a:tc>
+                  <a:txBody>
+                    <a:bodyPr/>
+                    <a:lstStyle/>
+                    <a:p>
+                      <a:pPr latinLnBrk="1"/>
+                      <a:endParaRPr lang="ko-KR" altLang="en-US" sz="1200"/>
+                    </a:p>
+                  </a:txBody>
+                  <a:tcPr/>
+                </a:tc>
+                <a:tc>
+                  <a:txBody>
+                    <a:bodyPr/>
+                    <a:lstStyle/>
+                    <a:p>
+                      <a:pPr latinLnBrk="1"/>
+                      <a:endParaRPr lang="ko-KR" altLang="en-US" sz="1200"/>
+                    </a:p>
+                  </a:txBody>
+                  <a:tcPr/>
+                </a:tc>
+              </a:tr>
+              <a:tr h="285752">
+                <a:tc>
+                  <a:txBody>
+                    <a:bodyPr/>
+                    <a:lstStyle/>
+                    <a:p>
+                      <a:pPr latinLnBrk="1"/>
+                      <a:endParaRPr lang="ko-KR" altLang="en-US" sz="1200" dirty="0"/>
+                    </a:p>
+                  </a:txBody>
+                  <a:tcPr/>
+                </a:tc>
+                <a:tc>
+                  <a:txBody>
+                    <a:bodyPr/>
+                    <a:lstStyle/>
+                    <a:p>
+                      <a:pPr latinLnBrk="1"/>
+                      <a:endParaRPr lang="ko-KR" altLang="en-US" sz="1200"/>
+                    </a:p>
+                  </a:txBody>
+                  <a:tcPr/>
+                </a:tc>
+                <a:tc>
+                  <a:txBody>
+                    <a:bodyPr/>
+                    <a:lstStyle/>
+                    <a:p>
+                      <a:pPr latinLnBrk="1"/>
+                      <a:endParaRPr lang="ko-KR" altLang="en-US" sz="1200"/>
+                    </a:p>
+                  </a:txBody>
+                  <a:tcPr/>
+                </a:tc>
+                <a:tc>
+                  <a:txBody>
+                    <a:bodyPr/>
+                    <a:lstStyle/>
+                    <a:p>
+                      <a:pPr latinLnBrk="1"/>
+                      <a:endParaRPr lang="ko-KR" altLang="en-US" sz="1200"/>
+                    </a:p>
+                  </a:txBody>
+                  <a:tcPr/>
+                </a:tc>
+                <a:tc>
+                  <a:txBody>
+                    <a:bodyPr/>
+                    <a:lstStyle/>
+                    <a:p>
+                      <a:pPr latinLnBrk="1"/>
+                      <a:endParaRPr lang="ko-KR" altLang="en-US" sz="1200"/>
+                    </a:p>
+                  </a:txBody>
+                  <a:tcPr/>
+                </a:tc>
+              </a:tr>
+              <a:tr h="285752">
+                <a:tc>
+                  <a:txBody>
+                    <a:bodyPr/>
+                    <a:lstStyle/>
+                    <a:p>
+                      <a:pPr latinLnBrk="1"/>
+                      <a:endParaRPr lang="ko-KR" altLang="en-US" sz="1200" dirty="0"/>
+                    </a:p>
+                  </a:txBody>
+                  <a:tcPr/>
+                </a:tc>
+                <a:tc>
+                  <a:txBody>
+                    <a:bodyPr/>
+                    <a:lstStyle/>
+                    <a:p>
+                      <a:pPr latinLnBrk="1"/>
+                      <a:endParaRPr lang="ko-KR" altLang="en-US" sz="1200" dirty="0"/>
+                    </a:p>
+                  </a:txBody>
+                  <a:tcPr/>
+                </a:tc>
+                <a:tc>
+                  <a:txBody>
+                    <a:bodyPr/>
+                    <a:lstStyle/>
+                    <a:p>
+                      <a:pPr latinLnBrk="1"/>
+                      <a:endParaRPr lang="ko-KR" altLang="en-US" sz="1200"/>
+                    </a:p>
+                  </a:txBody>
+                  <a:tcPr/>
+                </a:tc>
+                <a:tc>
+                  <a:txBody>
+                    <a:bodyPr/>
+                    <a:lstStyle/>
+                    <a:p>
+                      <a:pPr latinLnBrk="1"/>
+                      <a:endParaRPr lang="ko-KR" altLang="en-US" sz="1200"/>
+                    </a:p>
+                  </a:txBody>
+                  <a:tcPr/>
+                </a:tc>
+                <a:tc>
+                  <a:txBody>
+                    <a:bodyPr/>
+                    <a:lstStyle/>
+                    <a:p>
+                      <a:pPr latinLnBrk="1"/>
+                      <a:endParaRPr lang="ko-KR" altLang="en-US" sz="1200" dirty="0"/>
+                    </a:p>
+                  </a:txBody>
+                  <a:tcPr/>
+                </a:tc>
+              </a:tr>
+              <a:tr h="285752">
+                <a:tc>
+                  <a:txBody>
+                    <a:bodyPr/>
+                    <a:lstStyle/>
+                    <a:p>
+                      <a:pPr latinLnBrk="1"/>
+                      <a:endParaRPr lang="ko-KR" altLang="en-US" sz="1200"/>
+                    </a:p>
+                  </a:txBody>
+                  <a:tcPr/>
+                </a:tc>
+                <a:tc>
+                  <a:txBody>
+                    <a:bodyPr/>
+                    <a:lstStyle/>
+                    <a:p>
+                      <a:pPr latinLnBrk="1"/>
+                      <a:endParaRPr lang="ko-KR" altLang="en-US" sz="1200" dirty="0"/>
+                    </a:p>
+                  </a:txBody>
+                  <a:tcPr/>
+                </a:tc>
+                <a:tc>
+                  <a:txBody>
+                    <a:bodyPr/>
+                    <a:lstStyle/>
+                    <a:p>
+                      <a:pPr latinLnBrk="1"/>
+                      <a:endParaRPr lang="ko-KR" altLang="en-US" sz="1200"/>
+                    </a:p>
+                  </a:txBody>
+                  <a:tcPr/>
+                </a:tc>
+                <a:tc>
+                  <a:txBody>
+                    <a:bodyPr/>
+                    <a:lstStyle/>
+                    <a:p>
+                      <a:pPr latinLnBrk="1"/>
+                      <a:endParaRPr lang="ko-KR" altLang="en-US" sz="1200"/>
+                    </a:p>
+                  </a:txBody>
+                  <a:tcPr/>
+                </a:tc>
+                <a:tc>
+                  <a:txBody>
+                    <a:bodyPr/>
+                    <a:lstStyle/>
+                    <a:p>
+                      <a:pPr latinLnBrk="1"/>
+                      <a:endParaRPr lang="ko-KR" altLang="en-US" sz="1200" dirty="0"/>
+                    </a:p>
+                  </a:txBody>
+                  <a:tcPr/>
+                </a:tc>
+              </a:tr>
+              <a:tr h="285752">
+                <a:tc>
+                  <a:txBody>
+                    <a:bodyPr/>
+                    <a:lstStyle/>
+                    <a:p>
+                      <a:pPr latinLnBrk="1"/>
+                      <a:endParaRPr lang="ko-KR" altLang="en-US" sz="1200" dirty="0"/>
+                    </a:p>
+                  </a:txBody>
+                  <a:tcPr/>
+                </a:tc>
+                <a:tc>
+                  <a:txBody>
+                    <a:bodyPr/>
+                    <a:lstStyle/>
+                    <a:p>
+                      <a:pPr latinLnBrk="1"/>
+                      <a:endParaRPr lang="ko-KR" altLang="en-US" sz="1200" dirty="0"/>
+                    </a:p>
+                  </a:txBody>
+                  <a:tcPr/>
+                </a:tc>
+                <a:tc>
+                  <a:txBody>
+                    <a:bodyPr/>
+                    <a:lstStyle/>
+                    <a:p>
+                      <a:pPr latinLnBrk="1"/>
+                      <a:endParaRPr lang="ko-KR" altLang="en-US" sz="1200"/>
+                    </a:p>
+                  </a:txBody>
+                  <a:tcPr/>
+                </a:tc>
+                <a:tc>
+                  <a:txBody>
+                    <a:bodyPr/>
+                    <a:lstStyle/>
+                    <a:p>
+                      <a:pPr latinLnBrk="1"/>
+                      <a:endParaRPr lang="ko-KR" altLang="en-US" sz="1200"/>
+                    </a:p>
+                  </a:txBody>
+                  <a:tcPr/>
+                </a:tc>
+                <a:tc>
+                  <a:txBody>
+                    <a:bodyPr/>
+                    <a:lstStyle/>
+                    <a:p>
+                      <a:pPr latinLnBrk="1"/>
+                      <a:endParaRPr lang="ko-KR" altLang="en-US" sz="1200" dirty="0"/>
+                    </a:p>
+                  </a:txBody>
+                  <a:tcPr/>
+                </a:tc>
+              </a:tr>
+              <a:tr h="285752">
+                <a:tc>
+                  <a:txBody>
+                    <a:bodyPr/>
+                    <a:lstStyle/>
+                    <a:p>
+                      <a:pPr latinLnBrk="1"/>
+                      <a:endParaRPr lang="ko-KR" altLang="en-US" sz="1200"/>
+                    </a:p>
+                  </a:txBody>
+                  <a:tcPr/>
+                </a:tc>
+                <a:tc>
+                  <a:txBody>
+                    <a:bodyPr/>
+                    <a:lstStyle/>
+                    <a:p>
+                      <a:pPr latinLnBrk="1"/>
+                      <a:endParaRPr lang="ko-KR" altLang="en-US" sz="1200" dirty="0"/>
+                    </a:p>
+                  </a:txBody>
+                  <a:tcPr/>
+                </a:tc>
+                <a:tc>
+                  <a:txBody>
+                    <a:bodyPr/>
+                    <a:lstStyle/>
+                    <a:p>
+                      <a:pPr latinLnBrk="1"/>
+                      <a:endParaRPr lang="ko-KR" altLang="en-US" sz="1200"/>
+                    </a:p>
+                  </a:txBody>
+                  <a:tcPr/>
+                </a:tc>
+                <a:tc>
+                  <a:txBody>
+                    <a:bodyPr/>
+                    <a:lstStyle/>
+                    <a:p>
+                      <a:pPr latinLnBrk="1"/>
+                      <a:endParaRPr lang="ko-KR" altLang="en-US" sz="1200"/>
+                    </a:p>
+                  </a:txBody>
+                  <a:tcPr/>
+                </a:tc>
+                <a:tc>
+                  <a:txBody>
+                    <a:bodyPr/>
+                    <a:lstStyle/>
+                    <a:p>
+                      <a:pPr latinLnBrk="1"/>
+                      <a:endParaRPr lang="ko-KR" altLang="en-US" sz="1200" dirty="0"/>
+                    </a:p>
+                  </a:txBody>
+                  <a:tcPr/>
+                </a:tc>
+              </a:tr>
+              <a:tr h="285752">
+                <a:tc>
+                  <a:txBody>
+                    <a:bodyPr/>
+                    <a:lstStyle/>
+                    <a:p>
+                      <a:pPr latinLnBrk="1"/>
+                      <a:endParaRPr lang="ko-KR" altLang="en-US" sz="1200"/>
+                    </a:p>
+                  </a:txBody>
+                  <a:tcPr/>
+                </a:tc>
+                <a:tc>
+                  <a:txBody>
+                    <a:bodyPr/>
+                    <a:lstStyle/>
+                    <a:p>
+                      <a:pPr latinLnBrk="1"/>
+                      <a:endParaRPr lang="ko-KR" altLang="en-US" sz="1200" dirty="0"/>
+                    </a:p>
+                  </a:txBody>
+                  <a:tcPr/>
+                </a:tc>
+                <a:tc>
+                  <a:txBody>
+                    <a:bodyPr/>
+                    <a:lstStyle/>
+                    <a:p>
+                      <a:pPr latinLnBrk="1"/>
+                      <a:endParaRPr lang="ko-KR" altLang="en-US" sz="1200"/>
+                    </a:p>
+                  </a:txBody>
+                  <a:tcPr/>
+                </a:tc>
+                <a:tc>
+                  <a:txBody>
+                    <a:bodyPr/>
+                    <a:lstStyle/>
+                    <a:p>
+                      <a:pPr latinLnBrk="1"/>
+                      <a:endParaRPr lang="ko-KR" altLang="en-US" sz="1200" dirty="0"/>
+                    </a:p>
+                  </a:txBody>
+                  <a:tcPr/>
+                </a:tc>
+                <a:tc>
+                  <a:txBody>
+                    <a:bodyPr/>
+                    <a:lstStyle/>
+                    <a:p>
+                      <a:pPr latinLnBrk="1"/>
+                      <a:endParaRPr lang="ko-KR" altLang="en-US" sz="1200" dirty="0"/>
+                    </a:p>
+                  </a:txBody>
+                  <a:tcPr/>
+                </a:tc>
+              </a:tr>
+            </a:tbl>
+          </a:graphicData>
+        </a:graphic>
+      </p:graphicFrame>
+      <p:sp>
+        <p:nvSpPr>
+          <p:cNvPr id="16" name="TextBox 15"/>
           <p:cNvSpPr txBox="1"/>
           <p:nvPr/>
         </p:nvSpPr>
         <p:spPr>
           <a:xfrm>
-            <a:off x="151582" y="357166"/>
-            <a:ext cx="2288447" cy="369332"/>
+            <a:off x="357158" y="1571612"/>
+            <a:ext cx="646331" cy="369332"/>
           </a:xfrm>
           <a:prstGeom prst="rect">
             <a:avLst/>
@@ -4338,35 +4958,6 @@
           <a:lstStyle/>
           <a:p>
             <a:r>
-              <a:rPr lang="en-US" altLang="ko-KR" dirty="0" smtClean="0"/>
-              <a:t>Attendance Request</a:t>
-            </a:r>
-          </a:p>
-        </p:txBody>
-      </p:sp>
-      <p:sp>
-        <p:nvSpPr>
-          <p:cNvPr id="14" name="TextBox 13"/>
-          <p:cNvSpPr txBox="1"/>
-          <p:nvPr/>
-        </p:nvSpPr>
-        <p:spPr>
-          <a:xfrm>
-            <a:off x="3214678" y="1714488"/>
-            <a:ext cx="646331" cy="369332"/>
-          </a:xfrm>
-          <a:prstGeom prst="rect">
-            <a:avLst/>
-          </a:prstGeom>
-          <a:noFill/>
-        </p:spPr>
-        <p:txBody>
-          <a:bodyPr wrap="none" rtlCol="0">
-            <a:spAutoFit/>
-          </a:bodyPr>
-          <a:lstStyle/>
-          <a:p>
-            <a:r>
               <a:rPr lang="ko-KR" altLang="en-US" dirty="0" smtClean="0"/>
               <a:t>날짜</a:t>
             </a:r>
@@ -4376,48 +4967,26 @@
       </p:sp>
       <p:sp>
         <p:nvSpPr>
-          <p:cNvPr id="15" name="TextBox 14"/>
-          <p:cNvSpPr txBox="1"/>
-          <p:nvPr/>
-        </p:nvSpPr>
-        <p:spPr>
-          <a:xfrm>
-            <a:off x="3214678" y="2143116"/>
-            <a:ext cx="1107996" cy="369332"/>
-          </a:xfrm>
-          <a:prstGeom prst="rect">
-            <a:avLst/>
-          </a:prstGeom>
-          <a:noFill/>
-        </p:spPr>
-        <p:txBody>
-          <a:bodyPr wrap="none" rtlCol="0">
-            <a:spAutoFit/>
-          </a:bodyPr>
-          <a:lstStyle/>
-          <a:p>
-            <a:r>
-              <a:rPr lang="ko-KR" altLang="en-US" dirty="0" smtClean="0"/>
-              <a:t>출근시간</a:t>
-            </a:r>
-            <a:endParaRPr lang="ko-KR" altLang="en-US" dirty="0"/>
-          </a:p>
-        </p:txBody>
-      </p:sp>
-      <p:sp>
-        <p:nvSpPr>
-          <p:cNvPr id="16" name="직사각형 15"/>
+          <p:cNvPr id="17" name="직사각형 16"/>
           <p:cNvSpPr/>
           <p:nvPr/>
         </p:nvSpPr>
         <p:spPr>
           <a:xfrm>
-            <a:off x="4357686" y="1785926"/>
-            <a:ext cx="1785950" cy="285752"/>
-          </a:xfrm>
-          <a:prstGeom prst="rect">
-            <a:avLst/>
-          </a:prstGeom>
+            <a:off x="1000100" y="1643050"/>
+            <a:ext cx="785818" cy="214314"/>
+          </a:xfrm>
+          <a:prstGeom prst="rect">
+            <a:avLst/>
+          </a:prstGeom>
+          <a:solidFill>
+            <a:schemeClr val="bg1"/>
+          </a:solidFill>
+          <a:ln>
+            <a:solidFill>
+              <a:schemeClr val="tx1"/>
+            </a:solidFill>
+          </a:ln>
         </p:spPr>
         <p:style>
           <a:lnRef idx="2">
@@ -4440,22 +5009,22 @@
           <a:lstStyle/>
           <a:p>
             <a:pPr algn="ctr"/>
-            <a:endParaRPr lang="ko-KR" altLang="en-US" dirty="0"/>
-          </a:p>
-        </p:txBody>
-      </p:sp>
-      <p:sp>
-        <p:nvSpPr>
-          <p:cNvPr id="17" name="직사각형 16"/>
+            <a:endParaRPr lang="ko-KR" altLang="en-US"/>
+          </a:p>
+        </p:txBody>
+      </p:sp>
+      <p:sp>
+        <p:nvSpPr>
+          <p:cNvPr id="19" name="모서리가 둥근 직사각형 18"/>
           <p:cNvSpPr/>
           <p:nvPr/>
         </p:nvSpPr>
         <p:spPr>
           <a:xfrm>
-            <a:off x="4357686" y="2214554"/>
-            <a:ext cx="1785950" cy="285752"/>
-          </a:xfrm>
-          <a:prstGeom prst="rect">
+            <a:off x="3071802" y="1643050"/>
+            <a:ext cx="642942" cy="214314"/>
+          </a:xfrm>
+          <a:prstGeom prst="roundRect">
             <a:avLst/>
           </a:prstGeom>
         </p:spPr>
@@ -4480,20 +5049,24 @@
           <a:lstStyle/>
           <a:p>
             <a:pPr algn="ctr"/>
-            <a:endParaRPr lang="ko-KR" altLang="en-US" dirty="0"/>
-          </a:p>
-        </p:txBody>
-      </p:sp>
-      <p:sp>
-        <p:nvSpPr>
-          <p:cNvPr id="18" name="직사각형 17"/>
+            <a:r>
+              <a:rPr lang="ko-KR" altLang="en-US" sz="1100" dirty="0" smtClean="0"/>
+              <a:t>검색</a:t>
+            </a:r>
+            <a:endParaRPr lang="en-US" altLang="ko-KR" sz="1100" dirty="0" smtClean="0"/>
+          </a:p>
+        </p:txBody>
+      </p:sp>
+      <p:sp>
+        <p:nvSpPr>
+          <p:cNvPr id="25" name="직사각형 24"/>
           <p:cNvSpPr/>
           <p:nvPr/>
         </p:nvSpPr>
         <p:spPr>
           <a:xfrm>
-            <a:off x="5286380" y="4929198"/>
-            <a:ext cx="785818" cy="357190"/>
+            <a:off x="7358082" y="1643050"/>
+            <a:ext cx="1357322" cy="214314"/>
           </a:xfrm>
           <a:prstGeom prst="rect">
             <a:avLst/>
@@ -4521,27 +5094,35 @@
           <a:p>
             <a:pPr algn="ctr"/>
             <a:r>
-              <a:rPr lang="ko-KR" altLang="en-US" dirty="0" smtClean="0"/>
-              <a:t>확인</a:t>
-            </a:r>
-            <a:endParaRPr lang="ko-KR" altLang="en-US" dirty="0"/>
-          </a:p>
-        </p:txBody>
-      </p:sp>
-      <p:sp>
-        <p:nvSpPr>
-          <p:cNvPr id="19" name="직사각형 18"/>
+              <a:rPr lang="ko-KR" altLang="en-US" sz="1200" dirty="0" smtClean="0"/>
+              <a:t>조정신청</a:t>
+            </a:r>
+            <a:endParaRPr lang="ko-KR" altLang="en-US" sz="1200" dirty="0"/>
+          </a:p>
+        </p:txBody>
+      </p:sp>
+      <p:sp>
+        <p:nvSpPr>
+          <p:cNvPr id="26" name="직사각형 25"/>
           <p:cNvSpPr/>
           <p:nvPr/>
         </p:nvSpPr>
         <p:spPr>
           <a:xfrm>
-            <a:off x="4286248" y="4929198"/>
-            <a:ext cx="785818" cy="357190"/>
-          </a:xfrm>
-          <a:prstGeom prst="rect">
-            <a:avLst/>
-          </a:prstGeom>
+            <a:off x="2214546" y="1643050"/>
+            <a:ext cx="785818" cy="214314"/>
+          </a:xfrm>
+          <a:prstGeom prst="rect">
+            <a:avLst/>
+          </a:prstGeom>
+          <a:solidFill>
+            <a:schemeClr val="bg1"/>
+          </a:solidFill>
+          <a:ln>
+            <a:solidFill>
+              <a:schemeClr val="tx1"/>
+            </a:solidFill>
+          </a:ln>
         </p:spPr>
         <p:style>
           <a:lnRef idx="2">
@@ -4564,24 +5145,20 @@
           <a:lstStyle/>
           <a:p>
             <a:pPr algn="ctr"/>
-            <a:r>
-              <a:rPr lang="ko-KR" altLang="en-US" dirty="0" smtClean="0"/>
-              <a:t>취소</a:t>
-            </a:r>
-            <a:endParaRPr lang="ko-KR" altLang="en-US" dirty="0"/>
-          </a:p>
-        </p:txBody>
-      </p:sp>
-      <p:sp>
-        <p:nvSpPr>
-          <p:cNvPr id="25" name="TextBox 24"/>
+            <a:endParaRPr lang="ko-KR" altLang="en-US"/>
+          </a:p>
+        </p:txBody>
+      </p:sp>
+      <p:sp>
+        <p:nvSpPr>
+          <p:cNvPr id="30" name="TextBox 29"/>
           <p:cNvSpPr txBox="1"/>
           <p:nvPr/>
         </p:nvSpPr>
         <p:spPr>
           <a:xfrm>
-            <a:off x="3214678" y="3500438"/>
-            <a:ext cx="646331" cy="369332"/>
+            <a:off x="1857356" y="1571612"/>
+            <a:ext cx="328936" cy="338554"/>
           </a:xfrm>
           <a:prstGeom prst="rect">
             <a:avLst/>
@@ -4595,23 +5172,22 @@
           <a:lstStyle/>
           <a:p>
             <a:r>
-              <a:rPr lang="ko-KR" altLang="en-US" dirty="0" smtClean="0"/>
-              <a:t>사유</a:t>
-            </a:r>
-            <a:endParaRPr lang="ko-KR" altLang="en-US" dirty="0"/>
-          </a:p>
-        </p:txBody>
-      </p:sp>
-      <p:sp>
-        <p:nvSpPr>
-          <p:cNvPr id="22" name="TextBox 21"/>
+              <a:rPr lang="en-US" altLang="ko-KR" sz="1600" dirty="0" smtClean="0"/>
+              <a:t>~</a:t>
+            </a:r>
+          </a:p>
+        </p:txBody>
+      </p:sp>
+      <p:sp>
+        <p:nvSpPr>
+          <p:cNvPr id="31" name="TextBox 30"/>
           <p:cNvSpPr txBox="1"/>
           <p:nvPr/>
         </p:nvSpPr>
         <p:spPr>
           <a:xfrm>
-            <a:off x="3214678" y="2571744"/>
-            <a:ext cx="1107996" cy="369332"/>
+            <a:off x="151582" y="357166"/>
+            <a:ext cx="2845651" cy="369332"/>
           </a:xfrm>
           <a:prstGeom prst="rect">
             <a:avLst/>
@@ -4625,160 +5201,22 @@
           <a:lstStyle/>
           <a:p>
             <a:r>
+              <a:rPr lang="en-US" altLang="ko-KR" dirty="0" smtClean="0"/>
+              <a:t>User – </a:t>
+            </a:r>
+            <a:r>
               <a:rPr lang="ko-KR" altLang="en-US" dirty="0" smtClean="0"/>
-              <a:t>퇴근시간</a:t>
-            </a:r>
-            <a:endParaRPr lang="ko-KR" altLang="en-US" dirty="0"/>
-          </a:p>
-        </p:txBody>
-      </p:sp>
-      <p:sp>
-        <p:nvSpPr>
-          <p:cNvPr id="23" name="직사각형 22"/>
-          <p:cNvSpPr/>
-          <p:nvPr/>
-        </p:nvSpPr>
-        <p:spPr>
-          <a:xfrm>
-            <a:off x="4357686" y="2643182"/>
-            <a:ext cx="1785950" cy="285752"/>
-          </a:xfrm>
-          <a:prstGeom prst="rect">
-            <a:avLst/>
-          </a:prstGeom>
-        </p:spPr>
-        <p:style>
-          <a:lnRef idx="2">
-            <a:schemeClr val="accent1">
-              <a:shade val="50000"/>
-            </a:schemeClr>
-          </a:lnRef>
-          <a:fillRef idx="1">
-            <a:schemeClr val="accent1"/>
-          </a:fillRef>
-          <a:effectRef idx="0">
-            <a:schemeClr val="accent1"/>
-          </a:effectRef>
-          <a:fontRef idx="minor">
-            <a:schemeClr val="lt1"/>
-          </a:fontRef>
-        </p:style>
-        <p:txBody>
-          <a:bodyPr rtlCol="0" anchor="ctr"/>
-          <a:lstStyle/>
-          <a:p>
-            <a:pPr algn="ctr"/>
-            <a:endParaRPr lang="ko-KR" altLang="en-US" dirty="0"/>
-          </a:p>
-        </p:txBody>
-      </p:sp>
-      <p:sp>
-        <p:nvSpPr>
-          <p:cNvPr id="32" name="TextBox 31"/>
-          <p:cNvSpPr txBox="1"/>
-          <p:nvPr/>
-        </p:nvSpPr>
-        <p:spPr>
-          <a:xfrm>
-            <a:off x="3214678" y="3000372"/>
-            <a:ext cx="646331" cy="369332"/>
-          </a:xfrm>
-          <a:prstGeom prst="rect">
-            <a:avLst/>
-          </a:prstGeom>
-          <a:noFill/>
-        </p:spPr>
-        <p:txBody>
-          <a:bodyPr wrap="none" rtlCol="0">
-            <a:spAutoFit/>
-          </a:bodyPr>
-          <a:lstStyle/>
-          <a:p>
+              <a:t>출근</a:t>
+            </a:r>
+            <a:r>
+              <a:rPr lang="en-US" altLang="ko-KR" dirty="0" smtClean="0"/>
+              <a:t>, </a:t>
+            </a:r>
             <a:r>
               <a:rPr lang="ko-KR" altLang="en-US" dirty="0" smtClean="0"/>
-              <a:t>구분</a:t>
-            </a:r>
-            <a:endParaRPr lang="ko-KR" altLang="en-US" dirty="0"/>
-          </a:p>
-        </p:txBody>
-      </p:sp>
-      <p:sp>
-        <p:nvSpPr>
-          <p:cNvPr id="37" name="직사각형 36"/>
-          <p:cNvSpPr/>
-          <p:nvPr/>
-        </p:nvSpPr>
-        <p:spPr>
-          <a:xfrm>
-            <a:off x="4357686" y="3071810"/>
-            <a:ext cx="1785950" cy="285752"/>
-          </a:xfrm>
-          <a:prstGeom prst="rect">
-            <a:avLst/>
-          </a:prstGeom>
-        </p:spPr>
-        <p:style>
-          <a:lnRef idx="2">
-            <a:schemeClr val="accent1">
-              <a:shade val="50000"/>
-            </a:schemeClr>
-          </a:lnRef>
-          <a:fillRef idx="1">
-            <a:schemeClr val="accent1"/>
-          </a:fillRef>
-          <a:effectRef idx="0">
-            <a:schemeClr val="accent1"/>
-          </a:effectRef>
-          <a:fontRef idx="minor">
-            <a:schemeClr val="lt1"/>
-          </a:fontRef>
-        </p:style>
-        <p:txBody>
-          <a:bodyPr rtlCol="0" anchor="ctr"/>
-          <a:lstStyle/>
-          <a:p>
-            <a:pPr algn="ctr"/>
-            <a:endParaRPr lang="ko-KR" altLang="en-US" dirty="0"/>
-          </a:p>
-        </p:txBody>
-      </p:sp>
-      <p:sp>
-        <p:nvSpPr>
-          <p:cNvPr id="38" name="직사각형 37"/>
-          <p:cNvSpPr/>
-          <p:nvPr/>
-        </p:nvSpPr>
-        <p:spPr>
-          <a:xfrm>
-            <a:off x="4357686" y="3500438"/>
-            <a:ext cx="1785950" cy="1071570"/>
-          </a:xfrm>
-          <a:prstGeom prst="rect">
-            <a:avLst/>
-          </a:prstGeom>
-        </p:spPr>
-        <p:style>
-          <a:lnRef idx="2">
-            <a:schemeClr val="accent1">
-              <a:shade val="50000"/>
-            </a:schemeClr>
-          </a:lnRef>
-          <a:fillRef idx="1">
-            <a:schemeClr val="accent1"/>
-          </a:fillRef>
-          <a:effectRef idx="0">
-            <a:schemeClr val="accent1"/>
-          </a:effectRef>
-          <a:fontRef idx="minor">
-            <a:schemeClr val="lt1"/>
-          </a:fontRef>
-        </p:style>
-        <p:txBody>
-          <a:bodyPr rtlCol="0" anchor="ctr"/>
-          <a:lstStyle/>
-          <a:p>
-            <a:pPr algn="ctr"/>
-            <a:endParaRPr lang="ko-KR" altLang="en-US" dirty="0"/>
+              <a:t>조회 시 팝업</a:t>
+            </a:r>
+            <a:endParaRPr lang="en-US" altLang="ko-KR" dirty="0" smtClean="0"/>
           </a:p>
         </p:txBody>
       </p:sp>
@@ -4815,6 +5253,544 @@
         </p:nvSpPr>
         <p:spPr>
           <a:xfrm>
+            <a:off x="3071802" y="1357298"/>
+            <a:ext cx="3286148" cy="4714908"/>
+          </a:xfrm>
+          <a:prstGeom prst="rect">
+            <a:avLst/>
+          </a:prstGeom>
+          <a:noFill/>
+          <a:ln>
+            <a:solidFill>
+              <a:schemeClr val="tx1"/>
+            </a:solidFill>
+          </a:ln>
+        </p:spPr>
+        <p:style>
+          <a:lnRef idx="2">
+            <a:schemeClr val="accent1">
+              <a:shade val="50000"/>
+            </a:schemeClr>
+          </a:lnRef>
+          <a:fillRef idx="1">
+            <a:schemeClr val="accent1"/>
+          </a:fillRef>
+          <a:effectRef idx="0">
+            <a:schemeClr val="accent1"/>
+          </a:effectRef>
+          <a:fontRef idx="minor">
+            <a:schemeClr val="lt1"/>
+          </a:fontRef>
+        </p:style>
+        <p:txBody>
+          <a:bodyPr rtlCol="0" anchor="ctr"/>
+          <a:lstStyle/>
+          <a:p>
+            <a:pPr algn="ctr"/>
+            <a:endParaRPr lang="ko-KR" altLang="en-US" dirty="0"/>
+          </a:p>
+        </p:txBody>
+      </p:sp>
+      <p:sp>
+        <p:nvSpPr>
+          <p:cNvPr id="31" name="TextBox 30"/>
+          <p:cNvSpPr txBox="1"/>
+          <p:nvPr/>
+        </p:nvSpPr>
+        <p:spPr>
+          <a:xfrm>
+            <a:off x="151582" y="357166"/>
+            <a:ext cx="2288447" cy="369332"/>
+          </a:xfrm>
+          <a:prstGeom prst="rect">
+            <a:avLst/>
+          </a:prstGeom>
+          <a:noFill/>
+        </p:spPr>
+        <p:txBody>
+          <a:bodyPr wrap="none" rtlCol="0">
+            <a:spAutoFit/>
+          </a:bodyPr>
+          <a:lstStyle/>
+          <a:p>
+            <a:r>
+              <a:rPr lang="en-US" altLang="ko-KR" dirty="0" smtClean="0"/>
+              <a:t>Attendance Request</a:t>
+            </a:r>
+          </a:p>
+        </p:txBody>
+      </p:sp>
+      <p:sp>
+        <p:nvSpPr>
+          <p:cNvPr id="14" name="TextBox 13"/>
+          <p:cNvSpPr txBox="1"/>
+          <p:nvPr/>
+        </p:nvSpPr>
+        <p:spPr>
+          <a:xfrm>
+            <a:off x="3214678" y="1714488"/>
+            <a:ext cx="646331" cy="369332"/>
+          </a:xfrm>
+          <a:prstGeom prst="rect">
+            <a:avLst/>
+          </a:prstGeom>
+          <a:noFill/>
+        </p:spPr>
+        <p:txBody>
+          <a:bodyPr wrap="none" rtlCol="0">
+            <a:spAutoFit/>
+          </a:bodyPr>
+          <a:lstStyle/>
+          <a:p>
+            <a:r>
+              <a:rPr lang="ko-KR" altLang="en-US" dirty="0" smtClean="0"/>
+              <a:t>날짜</a:t>
+            </a:r>
+            <a:endParaRPr lang="en-US" altLang="ko-KR" dirty="0" smtClean="0"/>
+          </a:p>
+        </p:txBody>
+      </p:sp>
+      <p:sp>
+        <p:nvSpPr>
+          <p:cNvPr id="15" name="TextBox 14"/>
+          <p:cNvSpPr txBox="1"/>
+          <p:nvPr/>
+        </p:nvSpPr>
+        <p:spPr>
+          <a:xfrm>
+            <a:off x="3214678" y="2143116"/>
+            <a:ext cx="1107996" cy="369332"/>
+          </a:xfrm>
+          <a:prstGeom prst="rect">
+            <a:avLst/>
+          </a:prstGeom>
+          <a:noFill/>
+        </p:spPr>
+        <p:txBody>
+          <a:bodyPr wrap="none" rtlCol="0">
+            <a:spAutoFit/>
+          </a:bodyPr>
+          <a:lstStyle/>
+          <a:p>
+            <a:r>
+              <a:rPr lang="ko-KR" altLang="en-US" dirty="0" smtClean="0"/>
+              <a:t>출근시간</a:t>
+            </a:r>
+            <a:endParaRPr lang="ko-KR" altLang="en-US" dirty="0"/>
+          </a:p>
+        </p:txBody>
+      </p:sp>
+      <p:sp>
+        <p:nvSpPr>
+          <p:cNvPr id="16" name="직사각형 15"/>
+          <p:cNvSpPr/>
+          <p:nvPr/>
+        </p:nvSpPr>
+        <p:spPr>
+          <a:xfrm>
+            <a:off x="4357686" y="1785926"/>
+            <a:ext cx="1785950" cy="285752"/>
+          </a:xfrm>
+          <a:prstGeom prst="rect">
+            <a:avLst/>
+          </a:prstGeom>
+        </p:spPr>
+        <p:style>
+          <a:lnRef idx="2">
+            <a:schemeClr val="accent1">
+              <a:shade val="50000"/>
+            </a:schemeClr>
+          </a:lnRef>
+          <a:fillRef idx="1">
+            <a:schemeClr val="accent1"/>
+          </a:fillRef>
+          <a:effectRef idx="0">
+            <a:schemeClr val="accent1"/>
+          </a:effectRef>
+          <a:fontRef idx="minor">
+            <a:schemeClr val="lt1"/>
+          </a:fontRef>
+        </p:style>
+        <p:txBody>
+          <a:bodyPr rtlCol="0" anchor="ctr"/>
+          <a:lstStyle/>
+          <a:p>
+            <a:pPr algn="ctr"/>
+            <a:endParaRPr lang="ko-KR" altLang="en-US" dirty="0"/>
+          </a:p>
+        </p:txBody>
+      </p:sp>
+      <p:sp>
+        <p:nvSpPr>
+          <p:cNvPr id="17" name="직사각형 16"/>
+          <p:cNvSpPr/>
+          <p:nvPr/>
+        </p:nvSpPr>
+        <p:spPr>
+          <a:xfrm>
+            <a:off x="4357686" y="2214554"/>
+            <a:ext cx="1785950" cy="285752"/>
+          </a:xfrm>
+          <a:prstGeom prst="rect">
+            <a:avLst/>
+          </a:prstGeom>
+        </p:spPr>
+        <p:style>
+          <a:lnRef idx="2">
+            <a:schemeClr val="accent1">
+              <a:shade val="50000"/>
+            </a:schemeClr>
+          </a:lnRef>
+          <a:fillRef idx="1">
+            <a:schemeClr val="accent1"/>
+          </a:fillRef>
+          <a:effectRef idx="0">
+            <a:schemeClr val="accent1"/>
+          </a:effectRef>
+          <a:fontRef idx="minor">
+            <a:schemeClr val="lt1"/>
+          </a:fontRef>
+        </p:style>
+        <p:txBody>
+          <a:bodyPr rtlCol="0" anchor="ctr"/>
+          <a:lstStyle/>
+          <a:p>
+            <a:pPr algn="ctr"/>
+            <a:endParaRPr lang="ko-KR" altLang="en-US" dirty="0"/>
+          </a:p>
+        </p:txBody>
+      </p:sp>
+      <p:sp>
+        <p:nvSpPr>
+          <p:cNvPr id="18" name="직사각형 17"/>
+          <p:cNvSpPr/>
+          <p:nvPr/>
+        </p:nvSpPr>
+        <p:spPr>
+          <a:xfrm>
+            <a:off x="5286380" y="4929198"/>
+            <a:ext cx="785818" cy="357190"/>
+          </a:xfrm>
+          <a:prstGeom prst="rect">
+            <a:avLst/>
+          </a:prstGeom>
+        </p:spPr>
+        <p:style>
+          <a:lnRef idx="2">
+            <a:schemeClr val="accent1">
+              <a:shade val="50000"/>
+            </a:schemeClr>
+          </a:lnRef>
+          <a:fillRef idx="1">
+            <a:schemeClr val="accent1"/>
+          </a:fillRef>
+          <a:effectRef idx="0">
+            <a:schemeClr val="accent1"/>
+          </a:effectRef>
+          <a:fontRef idx="minor">
+            <a:schemeClr val="lt1"/>
+          </a:fontRef>
+        </p:style>
+        <p:txBody>
+          <a:bodyPr rtlCol="0" anchor="ctr"/>
+          <a:lstStyle/>
+          <a:p>
+            <a:pPr algn="ctr"/>
+            <a:r>
+              <a:rPr lang="ko-KR" altLang="en-US" dirty="0" smtClean="0"/>
+              <a:t>확인</a:t>
+            </a:r>
+            <a:endParaRPr lang="ko-KR" altLang="en-US" dirty="0"/>
+          </a:p>
+        </p:txBody>
+      </p:sp>
+      <p:sp>
+        <p:nvSpPr>
+          <p:cNvPr id="19" name="직사각형 18"/>
+          <p:cNvSpPr/>
+          <p:nvPr/>
+        </p:nvSpPr>
+        <p:spPr>
+          <a:xfrm>
+            <a:off x="4286248" y="4929198"/>
+            <a:ext cx="785818" cy="357190"/>
+          </a:xfrm>
+          <a:prstGeom prst="rect">
+            <a:avLst/>
+          </a:prstGeom>
+        </p:spPr>
+        <p:style>
+          <a:lnRef idx="2">
+            <a:schemeClr val="accent1">
+              <a:shade val="50000"/>
+            </a:schemeClr>
+          </a:lnRef>
+          <a:fillRef idx="1">
+            <a:schemeClr val="accent1"/>
+          </a:fillRef>
+          <a:effectRef idx="0">
+            <a:schemeClr val="accent1"/>
+          </a:effectRef>
+          <a:fontRef idx="minor">
+            <a:schemeClr val="lt1"/>
+          </a:fontRef>
+        </p:style>
+        <p:txBody>
+          <a:bodyPr rtlCol="0" anchor="ctr"/>
+          <a:lstStyle/>
+          <a:p>
+            <a:pPr algn="ctr"/>
+            <a:r>
+              <a:rPr lang="ko-KR" altLang="en-US" dirty="0" smtClean="0"/>
+              <a:t>취소</a:t>
+            </a:r>
+            <a:endParaRPr lang="ko-KR" altLang="en-US" dirty="0"/>
+          </a:p>
+        </p:txBody>
+      </p:sp>
+      <p:sp>
+        <p:nvSpPr>
+          <p:cNvPr id="25" name="TextBox 24"/>
+          <p:cNvSpPr txBox="1"/>
+          <p:nvPr/>
+        </p:nvSpPr>
+        <p:spPr>
+          <a:xfrm>
+            <a:off x="3214678" y="3500438"/>
+            <a:ext cx="646331" cy="369332"/>
+          </a:xfrm>
+          <a:prstGeom prst="rect">
+            <a:avLst/>
+          </a:prstGeom>
+          <a:noFill/>
+        </p:spPr>
+        <p:txBody>
+          <a:bodyPr wrap="none" rtlCol="0">
+            <a:spAutoFit/>
+          </a:bodyPr>
+          <a:lstStyle/>
+          <a:p>
+            <a:r>
+              <a:rPr lang="ko-KR" altLang="en-US" dirty="0" smtClean="0"/>
+              <a:t>사유</a:t>
+            </a:r>
+            <a:endParaRPr lang="ko-KR" altLang="en-US" dirty="0"/>
+          </a:p>
+        </p:txBody>
+      </p:sp>
+      <p:sp>
+        <p:nvSpPr>
+          <p:cNvPr id="22" name="TextBox 21"/>
+          <p:cNvSpPr txBox="1"/>
+          <p:nvPr/>
+        </p:nvSpPr>
+        <p:spPr>
+          <a:xfrm>
+            <a:off x="3214678" y="2571744"/>
+            <a:ext cx="1107996" cy="369332"/>
+          </a:xfrm>
+          <a:prstGeom prst="rect">
+            <a:avLst/>
+          </a:prstGeom>
+          <a:noFill/>
+        </p:spPr>
+        <p:txBody>
+          <a:bodyPr wrap="none" rtlCol="0">
+            <a:spAutoFit/>
+          </a:bodyPr>
+          <a:lstStyle/>
+          <a:p>
+            <a:r>
+              <a:rPr lang="ko-KR" altLang="en-US" dirty="0" smtClean="0"/>
+              <a:t>퇴근시간</a:t>
+            </a:r>
+            <a:endParaRPr lang="ko-KR" altLang="en-US" dirty="0"/>
+          </a:p>
+        </p:txBody>
+      </p:sp>
+      <p:sp>
+        <p:nvSpPr>
+          <p:cNvPr id="23" name="직사각형 22"/>
+          <p:cNvSpPr/>
+          <p:nvPr/>
+        </p:nvSpPr>
+        <p:spPr>
+          <a:xfrm>
+            <a:off x="4357686" y="2643182"/>
+            <a:ext cx="1785950" cy="285752"/>
+          </a:xfrm>
+          <a:prstGeom prst="rect">
+            <a:avLst/>
+          </a:prstGeom>
+        </p:spPr>
+        <p:style>
+          <a:lnRef idx="2">
+            <a:schemeClr val="accent1">
+              <a:shade val="50000"/>
+            </a:schemeClr>
+          </a:lnRef>
+          <a:fillRef idx="1">
+            <a:schemeClr val="accent1"/>
+          </a:fillRef>
+          <a:effectRef idx="0">
+            <a:schemeClr val="accent1"/>
+          </a:effectRef>
+          <a:fontRef idx="minor">
+            <a:schemeClr val="lt1"/>
+          </a:fontRef>
+        </p:style>
+        <p:txBody>
+          <a:bodyPr rtlCol="0" anchor="ctr"/>
+          <a:lstStyle/>
+          <a:p>
+            <a:pPr algn="ctr"/>
+            <a:endParaRPr lang="ko-KR" altLang="en-US" dirty="0"/>
+          </a:p>
+        </p:txBody>
+      </p:sp>
+      <p:sp>
+        <p:nvSpPr>
+          <p:cNvPr id="32" name="TextBox 31"/>
+          <p:cNvSpPr txBox="1"/>
+          <p:nvPr/>
+        </p:nvSpPr>
+        <p:spPr>
+          <a:xfrm>
+            <a:off x="3214678" y="3000372"/>
+            <a:ext cx="646331" cy="369332"/>
+          </a:xfrm>
+          <a:prstGeom prst="rect">
+            <a:avLst/>
+          </a:prstGeom>
+          <a:noFill/>
+        </p:spPr>
+        <p:txBody>
+          <a:bodyPr wrap="none" rtlCol="0">
+            <a:spAutoFit/>
+          </a:bodyPr>
+          <a:lstStyle/>
+          <a:p>
+            <a:r>
+              <a:rPr lang="ko-KR" altLang="en-US" dirty="0" smtClean="0"/>
+              <a:t>구분</a:t>
+            </a:r>
+            <a:endParaRPr lang="ko-KR" altLang="en-US" dirty="0"/>
+          </a:p>
+        </p:txBody>
+      </p:sp>
+      <p:sp>
+        <p:nvSpPr>
+          <p:cNvPr id="37" name="직사각형 36"/>
+          <p:cNvSpPr/>
+          <p:nvPr/>
+        </p:nvSpPr>
+        <p:spPr>
+          <a:xfrm>
+            <a:off x="4357686" y="3071810"/>
+            <a:ext cx="1785950" cy="285752"/>
+          </a:xfrm>
+          <a:prstGeom prst="rect">
+            <a:avLst/>
+          </a:prstGeom>
+        </p:spPr>
+        <p:style>
+          <a:lnRef idx="2">
+            <a:schemeClr val="accent1">
+              <a:shade val="50000"/>
+            </a:schemeClr>
+          </a:lnRef>
+          <a:fillRef idx="1">
+            <a:schemeClr val="accent1"/>
+          </a:fillRef>
+          <a:effectRef idx="0">
+            <a:schemeClr val="accent1"/>
+          </a:effectRef>
+          <a:fontRef idx="minor">
+            <a:schemeClr val="lt1"/>
+          </a:fontRef>
+        </p:style>
+        <p:txBody>
+          <a:bodyPr rtlCol="0" anchor="ctr"/>
+          <a:lstStyle/>
+          <a:p>
+            <a:pPr algn="ctr"/>
+            <a:endParaRPr lang="ko-KR" altLang="en-US" dirty="0"/>
+          </a:p>
+        </p:txBody>
+      </p:sp>
+      <p:sp>
+        <p:nvSpPr>
+          <p:cNvPr id="38" name="직사각형 37"/>
+          <p:cNvSpPr/>
+          <p:nvPr/>
+        </p:nvSpPr>
+        <p:spPr>
+          <a:xfrm>
+            <a:off x="4357686" y="3500438"/>
+            <a:ext cx="1785950" cy="1071570"/>
+          </a:xfrm>
+          <a:prstGeom prst="rect">
+            <a:avLst/>
+          </a:prstGeom>
+        </p:spPr>
+        <p:style>
+          <a:lnRef idx="2">
+            <a:schemeClr val="accent1">
+              <a:shade val="50000"/>
+            </a:schemeClr>
+          </a:lnRef>
+          <a:fillRef idx="1">
+            <a:schemeClr val="accent1"/>
+          </a:fillRef>
+          <a:effectRef idx="0">
+            <a:schemeClr val="accent1"/>
+          </a:effectRef>
+          <a:fontRef idx="minor">
+            <a:schemeClr val="lt1"/>
+          </a:fontRef>
+        </p:style>
+        <p:txBody>
+          <a:bodyPr rtlCol="0" anchor="ctr"/>
+          <a:lstStyle/>
+          <a:p>
+            <a:pPr algn="ctr"/>
+            <a:endParaRPr lang="ko-KR" altLang="en-US" dirty="0"/>
+          </a:p>
+        </p:txBody>
+      </p:sp>
+    </p:spTree>
+  </p:cSld>
+  <p:clrMapOvr>
+    <a:masterClrMapping/>
+  </p:clrMapOvr>
+</p:sld>
+</file>
+
+<file path=ppt/slides/slide12.xml><?xml version="1.0" encoding="utf-8"?>
+<p:sld xmlns:a="http://schemas.openxmlformats.org/drawingml/2006/main" xmlns:r="http://schemas.openxmlformats.org/officeDocument/2006/relationships" xmlns:p="http://schemas.openxmlformats.org/presentationml/2006/main">
+  <p:cSld>
+    <p:spTree>
+      <p:nvGrpSpPr>
+        <p:cNvPr id="1" name=""/>
+        <p:cNvGrpSpPr/>
+        <p:nvPr/>
+      </p:nvGrpSpPr>
+      <p:grpSpPr>
+        <a:xfrm>
+          <a:off x="0" y="0"/>
+          <a:ext cx="0" cy="0"/>
+          <a:chOff x="0" y="0"/>
+          <a:chExt cx="0" cy="0"/>
+        </a:xfrm>
+      </p:grpSpPr>
+      <p:sp>
+        <p:nvSpPr>
+          <p:cNvPr id="4" name="직사각형 3"/>
+          <p:cNvSpPr/>
+          <p:nvPr/>
+        </p:nvSpPr>
+        <p:spPr>
+          <a:xfrm>
             <a:off x="857224" y="1785926"/>
             <a:ext cx="3286148" cy="3214710"/>
           </a:xfrm>
@@ -6487,15 +7463,7 @@
                   <a:schemeClr val="tx1"/>
                 </a:solidFill>
               </a:rPr>
-              <a:t>수</a:t>
-            </a:r>
-            <a:r>
-              <a:rPr lang="ko-KR" altLang="en-US" dirty="0" smtClean="0">
-                <a:solidFill>
-                  <a:schemeClr val="tx1"/>
-                </a:solidFill>
-              </a:rPr>
-              <a:t>정</a:t>
+              <a:t>수정</a:t>
             </a:r>
             <a:endParaRPr lang="ko-KR" altLang="en-US" dirty="0">
               <a:solidFill>
@@ -7872,11 +8840,7 @@
           <a:p>
             <a:r>
               <a:rPr lang="ko-KR" altLang="en-US" dirty="0" smtClean="0"/>
-              <a:t>사</a:t>
-            </a:r>
-            <a:r>
-              <a:rPr lang="ko-KR" altLang="en-US" dirty="0" smtClean="0"/>
-              <a:t>유</a:t>
+              <a:t>사유</a:t>
             </a:r>
             <a:endParaRPr lang="ko-KR" altLang="en-US" dirty="0"/>
           </a:p>
@@ -12491,6 +13455,611 @@
       </p:grpSpPr>
       <p:sp>
         <p:nvSpPr>
+          <p:cNvPr id="31" name="TextBox 30"/>
+          <p:cNvSpPr txBox="1"/>
+          <p:nvPr/>
+        </p:nvSpPr>
+        <p:spPr>
+          <a:xfrm>
+            <a:off x="151582" y="357166"/>
+            <a:ext cx="3520131" cy="369332"/>
+          </a:xfrm>
+          <a:prstGeom prst="rect">
+            <a:avLst/>
+          </a:prstGeom>
+          <a:noFill/>
+        </p:spPr>
+        <p:txBody>
+          <a:bodyPr wrap="none" rtlCol="0">
+            <a:spAutoFit/>
+          </a:bodyPr>
+          <a:lstStyle/>
+          <a:p>
+            <a:r>
+              <a:rPr lang="en-US" altLang="ko-KR" dirty="0" smtClean="0"/>
+              <a:t>Attendance</a:t>
+            </a:r>
+            <a:r>
+              <a:rPr lang="en-US" altLang="ko-KR" dirty="0" smtClean="0"/>
+              <a:t> </a:t>
+            </a:r>
+            <a:r>
+              <a:rPr lang="en-US" altLang="ko-KR" dirty="0" smtClean="0"/>
+              <a:t>Management – </a:t>
+            </a:r>
+            <a:r>
+              <a:rPr lang="en-US" altLang="ko-KR" dirty="0" smtClean="0"/>
+              <a:t>Edit</a:t>
+            </a:r>
+            <a:endParaRPr lang="en-US" altLang="ko-KR" dirty="0" smtClean="0"/>
+          </a:p>
+        </p:txBody>
+      </p:sp>
+      <p:sp>
+        <p:nvSpPr>
+          <p:cNvPr id="51" name="직사각형 50"/>
+          <p:cNvSpPr/>
+          <p:nvPr/>
+        </p:nvSpPr>
+        <p:spPr>
+          <a:xfrm>
+            <a:off x="2928926" y="1428736"/>
+            <a:ext cx="3214710" cy="3643338"/>
+          </a:xfrm>
+          <a:prstGeom prst="rect">
+            <a:avLst/>
+          </a:prstGeom>
+          <a:noFill/>
+          <a:ln>
+            <a:solidFill>
+              <a:schemeClr val="tx1"/>
+            </a:solidFill>
+          </a:ln>
+        </p:spPr>
+        <p:style>
+          <a:lnRef idx="2">
+            <a:schemeClr val="accent1">
+              <a:shade val="50000"/>
+            </a:schemeClr>
+          </a:lnRef>
+          <a:fillRef idx="1">
+            <a:schemeClr val="accent1"/>
+          </a:fillRef>
+          <a:effectRef idx="0">
+            <a:schemeClr val="accent1"/>
+          </a:effectRef>
+          <a:fontRef idx="minor">
+            <a:schemeClr val="lt1"/>
+          </a:fontRef>
+        </p:style>
+        <p:txBody>
+          <a:bodyPr rtlCol="0" anchor="ctr"/>
+          <a:lstStyle/>
+          <a:p>
+            <a:pPr algn="ctr"/>
+            <a:endParaRPr lang="ko-KR" altLang="en-US"/>
+          </a:p>
+        </p:txBody>
+      </p:sp>
+      <p:sp>
+        <p:nvSpPr>
+          <p:cNvPr id="59" name="TextBox 58"/>
+          <p:cNvSpPr txBox="1"/>
+          <p:nvPr/>
+        </p:nvSpPr>
+        <p:spPr>
+          <a:xfrm>
+            <a:off x="3357554" y="1785926"/>
+            <a:ext cx="1143008" cy="369332"/>
+          </a:xfrm>
+          <a:prstGeom prst="rect">
+            <a:avLst/>
+          </a:prstGeom>
+          <a:noFill/>
+        </p:spPr>
+        <p:txBody>
+          <a:bodyPr wrap="square" rtlCol="0">
+            <a:spAutoFit/>
+          </a:bodyPr>
+          <a:lstStyle/>
+          <a:p>
+            <a:r>
+              <a:rPr lang="ko-KR" altLang="en-US" dirty="0" smtClean="0"/>
+              <a:t>출근시</a:t>
+            </a:r>
+            <a:r>
+              <a:rPr lang="ko-KR" altLang="en-US" dirty="0" smtClean="0"/>
+              <a:t>간</a:t>
+            </a:r>
+            <a:endParaRPr lang="ko-KR" altLang="en-US" dirty="0"/>
+          </a:p>
+        </p:txBody>
+      </p:sp>
+      <p:sp>
+        <p:nvSpPr>
+          <p:cNvPr id="60" name="TextBox 59"/>
+          <p:cNvSpPr txBox="1"/>
+          <p:nvPr/>
+        </p:nvSpPr>
+        <p:spPr>
+          <a:xfrm>
+            <a:off x="3357554" y="2268574"/>
+            <a:ext cx="1143008" cy="369332"/>
+          </a:xfrm>
+          <a:prstGeom prst="rect">
+            <a:avLst/>
+          </a:prstGeom>
+          <a:noFill/>
+        </p:spPr>
+        <p:txBody>
+          <a:bodyPr wrap="square" rtlCol="0">
+            <a:spAutoFit/>
+          </a:bodyPr>
+          <a:lstStyle/>
+          <a:p>
+            <a:r>
+              <a:rPr lang="ko-KR" altLang="en-US" dirty="0" smtClean="0"/>
+              <a:t>퇴근시간</a:t>
+            </a:r>
+            <a:endParaRPr lang="ko-KR" altLang="en-US" dirty="0"/>
+          </a:p>
+        </p:txBody>
+      </p:sp>
+      <p:sp>
+        <p:nvSpPr>
+          <p:cNvPr id="61" name="직사각형 60"/>
+          <p:cNvSpPr/>
+          <p:nvPr/>
+        </p:nvSpPr>
+        <p:spPr>
+          <a:xfrm>
+            <a:off x="4643438" y="1857364"/>
+            <a:ext cx="1357322" cy="285752"/>
+          </a:xfrm>
+          <a:prstGeom prst="rect">
+            <a:avLst/>
+          </a:prstGeom>
+          <a:noFill/>
+          <a:ln w="19050">
+            <a:solidFill>
+              <a:schemeClr val="tx1"/>
+            </a:solidFill>
+          </a:ln>
+        </p:spPr>
+        <p:style>
+          <a:lnRef idx="2">
+            <a:schemeClr val="accent1">
+              <a:shade val="50000"/>
+            </a:schemeClr>
+          </a:lnRef>
+          <a:fillRef idx="1">
+            <a:schemeClr val="accent1"/>
+          </a:fillRef>
+          <a:effectRef idx="0">
+            <a:schemeClr val="accent1"/>
+          </a:effectRef>
+          <a:fontRef idx="minor">
+            <a:schemeClr val="lt1"/>
+          </a:fontRef>
+        </p:style>
+        <p:txBody>
+          <a:bodyPr rtlCol="0" anchor="ctr"/>
+          <a:lstStyle/>
+          <a:p>
+            <a:pPr algn="ctr"/>
+            <a:endParaRPr lang="ko-KR" altLang="en-US"/>
+          </a:p>
+        </p:txBody>
+      </p:sp>
+      <p:sp>
+        <p:nvSpPr>
+          <p:cNvPr id="62" name="직사각형 61"/>
+          <p:cNvSpPr/>
+          <p:nvPr/>
+        </p:nvSpPr>
+        <p:spPr>
+          <a:xfrm>
+            <a:off x="4643438" y="2340012"/>
+            <a:ext cx="1357322" cy="285752"/>
+          </a:xfrm>
+          <a:prstGeom prst="rect">
+            <a:avLst/>
+          </a:prstGeom>
+          <a:noFill/>
+          <a:ln w="19050">
+            <a:solidFill>
+              <a:schemeClr val="tx1"/>
+            </a:solidFill>
+          </a:ln>
+        </p:spPr>
+        <p:style>
+          <a:lnRef idx="2">
+            <a:schemeClr val="accent1">
+              <a:shade val="50000"/>
+            </a:schemeClr>
+          </a:lnRef>
+          <a:fillRef idx="1">
+            <a:schemeClr val="accent1"/>
+          </a:fillRef>
+          <a:effectRef idx="0">
+            <a:schemeClr val="accent1"/>
+          </a:effectRef>
+          <a:fontRef idx="minor">
+            <a:schemeClr val="lt1"/>
+          </a:fontRef>
+        </p:style>
+        <p:txBody>
+          <a:bodyPr rtlCol="0" anchor="ctr"/>
+          <a:lstStyle/>
+          <a:p>
+            <a:pPr algn="ctr"/>
+            <a:endParaRPr lang="ko-KR" altLang="en-US"/>
+          </a:p>
+        </p:txBody>
+      </p:sp>
+      <p:sp>
+        <p:nvSpPr>
+          <p:cNvPr id="63" name="직사각형 62"/>
+          <p:cNvSpPr/>
+          <p:nvPr/>
+        </p:nvSpPr>
+        <p:spPr>
+          <a:xfrm>
+            <a:off x="4643438" y="4500570"/>
+            <a:ext cx="785818" cy="357190"/>
+          </a:xfrm>
+          <a:prstGeom prst="rect">
+            <a:avLst/>
+          </a:prstGeom>
+        </p:spPr>
+        <p:style>
+          <a:lnRef idx="2">
+            <a:schemeClr val="accent1">
+              <a:shade val="50000"/>
+            </a:schemeClr>
+          </a:lnRef>
+          <a:fillRef idx="1">
+            <a:schemeClr val="accent1"/>
+          </a:fillRef>
+          <a:effectRef idx="0">
+            <a:schemeClr val="accent1"/>
+          </a:effectRef>
+          <a:fontRef idx="minor">
+            <a:schemeClr val="lt1"/>
+          </a:fontRef>
+        </p:style>
+        <p:txBody>
+          <a:bodyPr rtlCol="0" anchor="ctr"/>
+          <a:lstStyle/>
+          <a:p>
+            <a:pPr algn="ctr"/>
+            <a:r>
+              <a:rPr lang="ko-KR" altLang="en-US" dirty="0" smtClean="0"/>
+              <a:t>추가</a:t>
+            </a:r>
+            <a:endParaRPr lang="ko-KR" altLang="en-US" dirty="0"/>
+          </a:p>
+        </p:txBody>
+      </p:sp>
+      <p:sp>
+        <p:nvSpPr>
+          <p:cNvPr id="64" name="직사각형 63"/>
+          <p:cNvSpPr/>
+          <p:nvPr/>
+        </p:nvSpPr>
+        <p:spPr>
+          <a:xfrm>
+            <a:off x="3643306" y="4500570"/>
+            <a:ext cx="785818" cy="357190"/>
+          </a:xfrm>
+          <a:prstGeom prst="rect">
+            <a:avLst/>
+          </a:prstGeom>
+        </p:spPr>
+        <p:style>
+          <a:lnRef idx="2">
+            <a:schemeClr val="accent1">
+              <a:shade val="50000"/>
+            </a:schemeClr>
+          </a:lnRef>
+          <a:fillRef idx="1">
+            <a:schemeClr val="accent1"/>
+          </a:fillRef>
+          <a:effectRef idx="0">
+            <a:schemeClr val="accent1"/>
+          </a:effectRef>
+          <a:fontRef idx="minor">
+            <a:schemeClr val="lt1"/>
+          </a:fontRef>
+        </p:style>
+        <p:txBody>
+          <a:bodyPr rtlCol="0" anchor="ctr"/>
+          <a:lstStyle/>
+          <a:p>
+            <a:pPr algn="ctr"/>
+            <a:r>
+              <a:rPr lang="ko-KR" altLang="en-US" dirty="0" smtClean="0"/>
+              <a:t>취소</a:t>
+            </a:r>
+            <a:endParaRPr lang="ko-KR" altLang="en-US" dirty="0"/>
+          </a:p>
+        </p:txBody>
+      </p:sp>
+      <p:sp>
+        <p:nvSpPr>
+          <p:cNvPr id="71" name="이등변 삼각형 70"/>
+          <p:cNvSpPr/>
+          <p:nvPr/>
+        </p:nvSpPr>
+        <p:spPr>
+          <a:xfrm flipH="1" flipV="1">
+            <a:off x="5786446" y="1928802"/>
+            <a:ext cx="142876" cy="142876"/>
+          </a:xfrm>
+          <a:prstGeom prst="triangle">
+            <a:avLst/>
+          </a:prstGeom>
+        </p:spPr>
+        <p:style>
+          <a:lnRef idx="2">
+            <a:schemeClr val="accent1">
+              <a:shade val="50000"/>
+            </a:schemeClr>
+          </a:lnRef>
+          <a:fillRef idx="1">
+            <a:schemeClr val="accent1"/>
+          </a:fillRef>
+          <a:effectRef idx="0">
+            <a:schemeClr val="accent1"/>
+          </a:effectRef>
+          <a:fontRef idx="minor">
+            <a:schemeClr val="lt1"/>
+          </a:fontRef>
+        </p:style>
+        <p:txBody>
+          <a:bodyPr rtlCol="0" anchor="ctr"/>
+          <a:lstStyle/>
+          <a:p>
+            <a:pPr algn="ctr"/>
+            <a:endParaRPr lang="ko-KR" altLang="en-US"/>
+          </a:p>
+        </p:txBody>
+      </p:sp>
+      <p:sp>
+        <p:nvSpPr>
+          <p:cNvPr id="72" name="이등변 삼각형 71"/>
+          <p:cNvSpPr/>
+          <p:nvPr/>
+        </p:nvSpPr>
+        <p:spPr>
+          <a:xfrm flipH="1" flipV="1">
+            <a:off x="5786446" y="2428868"/>
+            <a:ext cx="142876" cy="142876"/>
+          </a:xfrm>
+          <a:prstGeom prst="triangle">
+            <a:avLst/>
+          </a:prstGeom>
+        </p:spPr>
+        <p:style>
+          <a:lnRef idx="2">
+            <a:schemeClr val="accent1">
+              <a:shade val="50000"/>
+            </a:schemeClr>
+          </a:lnRef>
+          <a:fillRef idx="1">
+            <a:schemeClr val="accent1"/>
+          </a:fillRef>
+          <a:effectRef idx="0">
+            <a:schemeClr val="accent1"/>
+          </a:effectRef>
+          <a:fontRef idx="minor">
+            <a:schemeClr val="lt1"/>
+          </a:fontRef>
+        </p:style>
+        <p:txBody>
+          <a:bodyPr rtlCol="0" anchor="ctr"/>
+          <a:lstStyle/>
+          <a:p>
+            <a:pPr algn="ctr"/>
+            <a:endParaRPr lang="ko-KR" altLang="en-US"/>
+          </a:p>
+        </p:txBody>
+      </p:sp>
+      <p:sp>
+        <p:nvSpPr>
+          <p:cNvPr id="74" name="직사각형 73"/>
+          <p:cNvSpPr/>
+          <p:nvPr/>
+        </p:nvSpPr>
+        <p:spPr>
+          <a:xfrm>
+            <a:off x="3143240" y="2357430"/>
+            <a:ext cx="142876" cy="142876"/>
+          </a:xfrm>
+          <a:prstGeom prst="rect">
+            <a:avLst/>
+          </a:prstGeom>
+          <a:noFill/>
+          <a:ln w="19050">
+            <a:solidFill>
+              <a:schemeClr val="tx1"/>
+            </a:solidFill>
+          </a:ln>
+        </p:spPr>
+        <p:style>
+          <a:lnRef idx="2">
+            <a:schemeClr val="accent1">
+              <a:shade val="50000"/>
+            </a:schemeClr>
+          </a:lnRef>
+          <a:fillRef idx="1">
+            <a:schemeClr val="accent1"/>
+          </a:fillRef>
+          <a:effectRef idx="0">
+            <a:schemeClr val="accent1"/>
+          </a:effectRef>
+          <a:fontRef idx="minor">
+            <a:schemeClr val="lt1"/>
+          </a:fontRef>
+        </p:style>
+        <p:txBody>
+          <a:bodyPr rtlCol="0" anchor="ctr"/>
+          <a:lstStyle/>
+          <a:p>
+            <a:pPr algn="ctr"/>
+            <a:endParaRPr lang="ko-KR" altLang="en-US"/>
+          </a:p>
+        </p:txBody>
+      </p:sp>
+      <p:sp>
+        <p:nvSpPr>
+          <p:cNvPr id="75" name="직사각형 74"/>
+          <p:cNvSpPr/>
+          <p:nvPr/>
+        </p:nvSpPr>
+        <p:spPr>
+          <a:xfrm>
+            <a:off x="3143240" y="1857364"/>
+            <a:ext cx="142876" cy="142876"/>
+          </a:xfrm>
+          <a:prstGeom prst="rect">
+            <a:avLst/>
+          </a:prstGeom>
+          <a:noFill/>
+          <a:ln w="19050">
+            <a:solidFill>
+              <a:schemeClr val="tx1"/>
+            </a:solidFill>
+          </a:ln>
+        </p:spPr>
+        <p:style>
+          <a:lnRef idx="2">
+            <a:schemeClr val="accent1">
+              <a:shade val="50000"/>
+            </a:schemeClr>
+          </a:lnRef>
+          <a:fillRef idx="1">
+            <a:schemeClr val="accent1"/>
+          </a:fillRef>
+          <a:effectRef idx="0">
+            <a:schemeClr val="accent1"/>
+          </a:effectRef>
+          <a:fontRef idx="minor">
+            <a:schemeClr val="lt1"/>
+          </a:fontRef>
+        </p:style>
+        <p:txBody>
+          <a:bodyPr rtlCol="0" anchor="ctr"/>
+          <a:lstStyle/>
+          <a:p>
+            <a:pPr algn="ctr"/>
+            <a:endParaRPr lang="ko-KR" altLang="en-US"/>
+          </a:p>
+        </p:txBody>
+      </p:sp>
+      <p:sp>
+        <p:nvSpPr>
+          <p:cNvPr id="78" name="TextBox 77"/>
+          <p:cNvSpPr txBox="1"/>
+          <p:nvPr/>
+        </p:nvSpPr>
+        <p:spPr>
+          <a:xfrm>
+            <a:off x="3350611" y="2786058"/>
+            <a:ext cx="646331" cy="369332"/>
+          </a:xfrm>
+          <a:prstGeom prst="rect">
+            <a:avLst/>
+          </a:prstGeom>
+          <a:noFill/>
+        </p:spPr>
+        <p:txBody>
+          <a:bodyPr wrap="square" rtlCol="0">
+            <a:spAutoFit/>
+          </a:bodyPr>
+          <a:lstStyle/>
+          <a:p>
+            <a:r>
+              <a:rPr lang="ko-KR" altLang="en-US" dirty="0" smtClean="0"/>
+              <a:t>사유</a:t>
+            </a:r>
+            <a:endParaRPr lang="ko-KR" altLang="en-US" dirty="0"/>
+          </a:p>
+        </p:txBody>
+      </p:sp>
+      <p:sp>
+        <p:nvSpPr>
+          <p:cNvPr id="79" name="직사각형 78"/>
+          <p:cNvSpPr/>
+          <p:nvPr/>
+        </p:nvSpPr>
+        <p:spPr>
+          <a:xfrm>
+            <a:off x="4636495" y="2857496"/>
+            <a:ext cx="1357322" cy="1000132"/>
+          </a:xfrm>
+          <a:prstGeom prst="rect">
+            <a:avLst/>
+          </a:prstGeom>
+          <a:noFill/>
+          <a:ln w="19050">
+            <a:solidFill>
+              <a:schemeClr val="tx1"/>
+            </a:solidFill>
+          </a:ln>
+        </p:spPr>
+        <p:style>
+          <a:lnRef idx="2">
+            <a:schemeClr val="accent1">
+              <a:shade val="50000"/>
+            </a:schemeClr>
+          </a:lnRef>
+          <a:fillRef idx="1">
+            <a:schemeClr val="accent1"/>
+          </a:fillRef>
+          <a:effectRef idx="0">
+            <a:schemeClr val="accent1"/>
+          </a:effectRef>
+          <a:fontRef idx="minor">
+            <a:schemeClr val="lt1"/>
+          </a:fontRef>
+        </p:style>
+        <p:txBody>
+          <a:bodyPr rtlCol="0" anchor="ctr"/>
+          <a:lstStyle/>
+          <a:p>
+            <a:pPr algn="ctr"/>
+            <a:endParaRPr lang="ko-KR" altLang="en-US"/>
+          </a:p>
+        </p:txBody>
+      </p:sp>
+    </p:spTree>
+  </p:cSld>
+  <p:clrMapOvr>
+    <a:masterClrMapping/>
+  </p:clrMapOvr>
+</p:sld>
+</file>
+
+<file path=ppt/slides/slide8.xml><?xml version="1.0" encoding="utf-8"?>
+<p:sld xmlns:a="http://schemas.openxmlformats.org/drawingml/2006/main" xmlns:r="http://schemas.openxmlformats.org/officeDocument/2006/relationships" xmlns:p="http://schemas.openxmlformats.org/presentationml/2006/main">
+  <p:cSld>
+    <p:spTree>
+      <p:nvGrpSpPr>
+        <p:cNvPr id="1" name=""/>
+        <p:cNvGrpSpPr/>
+        <p:nvPr/>
+      </p:nvGrpSpPr>
+      <p:grpSpPr>
+        <a:xfrm>
+          <a:off x="0" y="0"/>
+          <a:ext cx="0" cy="0"/>
+          <a:chOff x="0" y="0"/>
+          <a:chExt cx="0" cy="0"/>
+        </a:xfrm>
+      </p:grpSpPr>
+      <p:sp>
+        <p:nvSpPr>
           <p:cNvPr id="4" name="직사각형 3"/>
           <p:cNvSpPr/>
           <p:nvPr/>
@@ -13745,7 +15314,7 @@
 </p:sld>
 </file>
 
-<file path=ppt/slides/slide8.xml><?xml version="1.0" encoding="utf-8"?>
+<file path=ppt/slides/slide9.xml><?xml version="1.0" encoding="utf-8"?>
 <p:sld xmlns:a="http://schemas.openxmlformats.org/drawingml/2006/main" xmlns:r="http://schemas.openxmlformats.org/officeDocument/2006/relationships" xmlns:p="http://schemas.openxmlformats.org/presentationml/2006/main">
   <p:cSld>
     <p:spTree>
@@ -14852,981 +16421,6 @@
             <a:r>
               <a:rPr lang="ko-KR" altLang="en-US" dirty="0" smtClean="0"/>
               <a:t>출결 조정 신청 현황</a:t>
-            </a:r>
-            <a:endParaRPr lang="en-US" altLang="ko-KR" dirty="0" smtClean="0"/>
-          </a:p>
-        </p:txBody>
-      </p:sp>
-    </p:spTree>
-  </p:cSld>
-  <p:clrMapOvr>
-    <a:masterClrMapping/>
-  </p:clrMapOvr>
-</p:sld>
-</file>
-
-<file path=ppt/slides/slide9.xml><?xml version="1.0" encoding="utf-8"?>
-<p:sld xmlns:a="http://schemas.openxmlformats.org/drawingml/2006/main" xmlns:r="http://schemas.openxmlformats.org/officeDocument/2006/relationships" xmlns:p="http://schemas.openxmlformats.org/presentationml/2006/main">
-  <p:cSld>
-    <p:spTree>
-      <p:nvGrpSpPr>
-        <p:cNvPr id="1" name=""/>
-        <p:cNvGrpSpPr/>
-        <p:nvPr/>
-      </p:nvGrpSpPr>
-      <p:grpSpPr>
-        <a:xfrm>
-          <a:off x="0" y="0"/>
-          <a:ext cx="0" cy="0"/>
-          <a:chOff x="0" y="0"/>
-          <a:chExt cx="0" cy="0"/>
-        </a:xfrm>
-      </p:grpSpPr>
-      <p:sp>
-        <p:nvSpPr>
-          <p:cNvPr id="4" name="직사각형 3"/>
-          <p:cNvSpPr/>
-          <p:nvPr/>
-        </p:nvSpPr>
-        <p:spPr>
-          <a:xfrm>
-            <a:off x="142844" y="1285860"/>
-            <a:ext cx="8858312" cy="4143404"/>
-          </a:xfrm>
-          <a:prstGeom prst="rect">
-            <a:avLst/>
-          </a:prstGeom>
-          <a:noFill/>
-          <a:ln>
-            <a:solidFill>
-              <a:schemeClr val="tx1"/>
-            </a:solidFill>
-          </a:ln>
-        </p:spPr>
-        <p:style>
-          <a:lnRef idx="2">
-            <a:schemeClr val="accent1">
-              <a:shade val="50000"/>
-            </a:schemeClr>
-          </a:lnRef>
-          <a:fillRef idx="1">
-            <a:schemeClr val="accent1"/>
-          </a:fillRef>
-          <a:effectRef idx="0">
-            <a:schemeClr val="accent1"/>
-          </a:effectRef>
-          <a:fontRef idx="minor">
-            <a:schemeClr val="lt1"/>
-          </a:fontRef>
-        </p:style>
-        <p:txBody>
-          <a:bodyPr rtlCol="0" anchor="ctr"/>
-          <a:lstStyle/>
-          <a:p>
-            <a:pPr algn="ctr"/>
-            <a:endParaRPr lang="ko-KR" altLang="en-US" dirty="0"/>
-          </a:p>
-        </p:txBody>
-      </p:sp>
-      <p:graphicFrame>
-        <p:nvGraphicFramePr>
-          <p:cNvPr id="15" name="표 14"/>
-          <p:cNvGraphicFramePr>
-            <a:graphicFrameLocks noGrp="1"/>
-          </p:cNvGraphicFramePr>
-          <p:nvPr/>
-        </p:nvGraphicFramePr>
-        <p:xfrm>
-          <a:off x="357158" y="2000240"/>
-          <a:ext cx="8501125" cy="3071834"/>
-        </p:xfrm>
-        <a:graphic>
-          <a:graphicData uri="http://schemas.openxmlformats.org/drawingml/2006/table">
-            <a:tbl>
-              <a:tblPr firstRow="1" bandRow="1">
-                <a:tableStyleId>{073A0DAA-6AF3-43AB-8588-CEC1D06C72B9}</a:tableStyleId>
-              </a:tblPr>
-              <a:tblGrid>
-                <a:gridCol w="1700225"/>
-                <a:gridCol w="1700225"/>
-                <a:gridCol w="1700225"/>
-                <a:gridCol w="1700225"/>
-                <a:gridCol w="1700225"/>
-              </a:tblGrid>
-              <a:tr h="500066">
-                <a:tc>
-                  <a:txBody>
-                    <a:bodyPr/>
-                    <a:lstStyle/>
-                    <a:p>
-                      <a:pPr algn="ctr" latinLnBrk="1"/>
-                      <a:r>
-                        <a:rPr lang="ko-KR" altLang="en-US" sz="1200" dirty="0" smtClean="0"/>
-                        <a:t>날짜</a:t>
-                      </a:r>
-                      <a:endParaRPr lang="ko-KR" altLang="en-US" sz="1200" dirty="0"/>
-                    </a:p>
-                  </a:txBody>
-                  <a:tcPr anchor="ctr"/>
-                </a:tc>
-                <a:tc>
-                  <a:txBody>
-                    <a:bodyPr/>
-                    <a:lstStyle/>
-                    <a:p>
-                      <a:pPr algn="ctr" latinLnBrk="1"/>
-                      <a:r>
-                        <a:rPr lang="ko-KR" altLang="en-US" sz="1200" dirty="0" smtClean="0"/>
-                        <a:t>출근시간</a:t>
-                      </a:r>
-                      <a:endParaRPr lang="ko-KR" altLang="en-US" sz="1200" dirty="0"/>
-                    </a:p>
-                  </a:txBody>
-                  <a:tcPr anchor="ctr"/>
-                </a:tc>
-                <a:tc>
-                  <a:txBody>
-                    <a:bodyPr/>
-                    <a:lstStyle/>
-                    <a:p>
-                      <a:pPr algn="ctr" latinLnBrk="1"/>
-                      <a:r>
-                        <a:rPr lang="ko-KR" altLang="en-US" sz="1200" dirty="0" smtClean="0"/>
-                        <a:t>퇴근시간</a:t>
-                      </a:r>
-                      <a:endParaRPr lang="ko-KR" altLang="en-US" sz="1200" dirty="0"/>
-                    </a:p>
-                  </a:txBody>
-                  <a:tcPr anchor="ctr"/>
-                </a:tc>
-                <a:tc>
-                  <a:txBody>
-                    <a:bodyPr/>
-                    <a:lstStyle/>
-                    <a:p>
-                      <a:pPr algn="ctr" latinLnBrk="1"/>
-                      <a:r>
-                        <a:rPr lang="ko-KR" altLang="en-US" sz="1200" dirty="0" smtClean="0"/>
-                        <a:t>초과근무시간</a:t>
-                      </a:r>
-                      <a:endParaRPr lang="ko-KR" altLang="en-US" sz="1200" dirty="0"/>
-                    </a:p>
-                  </a:txBody>
-                  <a:tcPr anchor="ctr"/>
-                </a:tc>
-                <a:tc>
-                  <a:txBody>
-                    <a:bodyPr/>
-                    <a:lstStyle/>
-                    <a:p>
-                      <a:pPr algn="ctr" latinLnBrk="1"/>
-                      <a:r>
-                        <a:rPr lang="ko-KR" altLang="en-US" sz="1200" dirty="0" smtClean="0"/>
-                        <a:t>구분</a:t>
-                      </a:r>
-                      <a:endParaRPr lang="ko-KR" altLang="en-US" sz="1200" dirty="0"/>
-                    </a:p>
-                  </a:txBody>
-                  <a:tcPr anchor="ctr"/>
-                </a:tc>
-              </a:tr>
-              <a:tr h="285752">
-                <a:tc>
-                  <a:txBody>
-                    <a:bodyPr/>
-                    <a:lstStyle/>
-                    <a:p>
-                      <a:pPr latinLnBrk="1"/>
-                      <a:endParaRPr lang="ko-KR" altLang="en-US" sz="1200" dirty="0"/>
-                    </a:p>
-                  </a:txBody>
-                  <a:tcPr/>
-                </a:tc>
-                <a:tc>
-                  <a:txBody>
-                    <a:bodyPr/>
-                    <a:lstStyle/>
-                    <a:p>
-                      <a:pPr latinLnBrk="1"/>
-                      <a:endParaRPr lang="ko-KR" altLang="en-US" sz="1200"/>
-                    </a:p>
-                  </a:txBody>
-                  <a:tcPr/>
-                </a:tc>
-                <a:tc>
-                  <a:txBody>
-                    <a:bodyPr/>
-                    <a:lstStyle/>
-                    <a:p>
-                      <a:pPr latinLnBrk="1"/>
-                      <a:endParaRPr lang="ko-KR" altLang="en-US" sz="1200" dirty="0"/>
-                    </a:p>
-                  </a:txBody>
-                  <a:tcPr/>
-                </a:tc>
-                <a:tc>
-                  <a:txBody>
-                    <a:bodyPr/>
-                    <a:lstStyle/>
-                    <a:p>
-                      <a:pPr latinLnBrk="1"/>
-                      <a:endParaRPr lang="ko-KR" altLang="en-US" sz="1200" dirty="0"/>
-                    </a:p>
-                  </a:txBody>
-                  <a:tcPr/>
-                </a:tc>
-                <a:tc>
-                  <a:txBody>
-                    <a:bodyPr/>
-                    <a:lstStyle/>
-                    <a:p>
-                      <a:pPr latinLnBrk="1"/>
-                      <a:endParaRPr lang="ko-KR" altLang="en-US" sz="1200"/>
-                    </a:p>
-                  </a:txBody>
-                  <a:tcPr/>
-                </a:tc>
-              </a:tr>
-              <a:tr h="285752">
-                <a:tc>
-                  <a:txBody>
-                    <a:bodyPr/>
-                    <a:lstStyle/>
-                    <a:p>
-                      <a:pPr latinLnBrk="1"/>
-                      <a:endParaRPr lang="ko-KR" altLang="en-US" sz="1200"/>
-                    </a:p>
-                  </a:txBody>
-                  <a:tcPr/>
-                </a:tc>
-                <a:tc>
-                  <a:txBody>
-                    <a:bodyPr/>
-                    <a:lstStyle/>
-                    <a:p>
-                      <a:pPr latinLnBrk="1"/>
-                      <a:endParaRPr lang="ko-KR" altLang="en-US" sz="1200"/>
-                    </a:p>
-                  </a:txBody>
-                  <a:tcPr/>
-                </a:tc>
-                <a:tc>
-                  <a:txBody>
-                    <a:bodyPr/>
-                    <a:lstStyle/>
-                    <a:p>
-                      <a:pPr latinLnBrk="1"/>
-                      <a:endParaRPr lang="ko-KR" altLang="en-US" sz="1200"/>
-                    </a:p>
-                  </a:txBody>
-                  <a:tcPr/>
-                </a:tc>
-                <a:tc>
-                  <a:txBody>
-                    <a:bodyPr/>
-                    <a:lstStyle/>
-                    <a:p>
-                      <a:pPr latinLnBrk="1"/>
-                      <a:endParaRPr lang="ko-KR" altLang="en-US" sz="1200" dirty="0"/>
-                    </a:p>
-                  </a:txBody>
-                  <a:tcPr/>
-                </a:tc>
-                <a:tc>
-                  <a:txBody>
-                    <a:bodyPr/>
-                    <a:lstStyle/>
-                    <a:p>
-                      <a:pPr latinLnBrk="1"/>
-                      <a:endParaRPr lang="ko-KR" altLang="en-US" sz="1200"/>
-                    </a:p>
-                  </a:txBody>
-                  <a:tcPr/>
-                </a:tc>
-              </a:tr>
-              <a:tr h="285752">
-                <a:tc>
-                  <a:txBody>
-                    <a:bodyPr/>
-                    <a:lstStyle/>
-                    <a:p>
-                      <a:pPr latinLnBrk="1"/>
-                      <a:endParaRPr lang="ko-KR" altLang="en-US" sz="1200" dirty="0"/>
-                    </a:p>
-                  </a:txBody>
-                  <a:tcPr/>
-                </a:tc>
-                <a:tc>
-                  <a:txBody>
-                    <a:bodyPr/>
-                    <a:lstStyle/>
-                    <a:p>
-                      <a:pPr latinLnBrk="1"/>
-                      <a:endParaRPr lang="ko-KR" altLang="en-US" sz="1200"/>
-                    </a:p>
-                  </a:txBody>
-                  <a:tcPr/>
-                </a:tc>
-                <a:tc>
-                  <a:txBody>
-                    <a:bodyPr/>
-                    <a:lstStyle/>
-                    <a:p>
-                      <a:pPr latinLnBrk="1"/>
-                      <a:endParaRPr lang="ko-KR" altLang="en-US" sz="1200"/>
-                    </a:p>
-                  </a:txBody>
-                  <a:tcPr/>
-                </a:tc>
-                <a:tc>
-                  <a:txBody>
-                    <a:bodyPr/>
-                    <a:lstStyle/>
-                    <a:p>
-                      <a:pPr latinLnBrk="1"/>
-                      <a:endParaRPr lang="ko-KR" altLang="en-US" sz="1200"/>
-                    </a:p>
-                  </a:txBody>
-                  <a:tcPr/>
-                </a:tc>
-                <a:tc>
-                  <a:txBody>
-                    <a:bodyPr/>
-                    <a:lstStyle/>
-                    <a:p>
-                      <a:pPr latinLnBrk="1"/>
-                      <a:endParaRPr lang="ko-KR" altLang="en-US" sz="1200"/>
-                    </a:p>
-                  </a:txBody>
-                  <a:tcPr/>
-                </a:tc>
-              </a:tr>
-              <a:tr h="285752">
-                <a:tc>
-                  <a:txBody>
-                    <a:bodyPr/>
-                    <a:lstStyle/>
-                    <a:p>
-                      <a:pPr latinLnBrk="1"/>
-                      <a:endParaRPr lang="ko-KR" altLang="en-US" sz="1200" dirty="0"/>
-                    </a:p>
-                  </a:txBody>
-                  <a:tcPr/>
-                </a:tc>
-                <a:tc>
-                  <a:txBody>
-                    <a:bodyPr/>
-                    <a:lstStyle/>
-                    <a:p>
-                      <a:pPr latinLnBrk="1"/>
-                      <a:endParaRPr lang="ko-KR" altLang="en-US" sz="1200"/>
-                    </a:p>
-                  </a:txBody>
-                  <a:tcPr/>
-                </a:tc>
-                <a:tc>
-                  <a:txBody>
-                    <a:bodyPr/>
-                    <a:lstStyle/>
-                    <a:p>
-                      <a:pPr latinLnBrk="1"/>
-                      <a:endParaRPr lang="ko-KR" altLang="en-US" sz="1200"/>
-                    </a:p>
-                  </a:txBody>
-                  <a:tcPr/>
-                </a:tc>
-                <a:tc>
-                  <a:txBody>
-                    <a:bodyPr/>
-                    <a:lstStyle/>
-                    <a:p>
-                      <a:pPr latinLnBrk="1"/>
-                      <a:endParaRPr lang="ko-KR" altLang="en-US" sz="1200"/>
-                    </a:p>
-                  </a:txBody>
-                  <a:tcPr/>
-                </a:tc>
-                <a:tc>
-                  <a:txBody>
-                    <a:bodyPr/>
-                    <a:lstStyle/>
-                    <a:p>
-                      <a:pPr latinLnBrk="1"/>
-                      <a:endParaRPr lang="ko-KR" altLang="en-US" sz="1200"/>
-                    </a:p>
-                  </a:txBody>
-                  <a:tcPr/>
-                </a:tc>
-              </a:tr>
-              <a:tr h="285752">
-                <a:tc>
-                  <a:txBody>
-                    <a:bodyPr/>
-                    <a:lstStyle/>
-                    <a:p>
-                      <a:pPr latinLnBrk="1"/>
-                      <a:endParaRPr lang="ko-KR" altLang="en-US" sz="1200" dirty="0"/>
-                    </a:p>
-                  </a:txBody>
-                  <a:tcPr/>
-                </a:tc>
-                <a:tc>
-                  <a:txBody>
-                    <a:bodyPr/>
-                    <a:lstStyle/>
-                    <a:p>
-                      <a:pPr latinLnBrk="1"/>
-                      <a:endParaRPr lang="ko-KR" altLang="en-US" sz="1200" dirty="0"/>
-                    </a:p>
-                  </a:txBody>
-                  <a:tcPr/>
-                </a:tc>
-                <a:tc>
-                  <a:txBody>
-                    <a:bodyPr/>
-                    <a:lstStyle/>
-                    <a:p>
-                      <a:pPr latinLnBrk="1"/>
-                      <a:endParaRPr lang="ko-KR" altLang="en-US" sz="1200"/>
-                    </a:p>
-                  </a:txBody>
-                  <a:tcPr/>
-                </a:tc>
-                <a:tc>
-                  <a:txBody>
-                    <a:bodyPr/>
-                    <a:lstStyle/>
-                    <a:p>
-                      <a:pPr latinLnBrk="1"/>
-                      <a:endParaRPr lang="ko-KR" altLang="en-US" sz="1200"/>
-                    </a:p>
-                  </a:txBody>
-                  <a:tcPr/>
-                </a:tc>
-                <a:tc>
-                  <a:txBody>
-                    <a:bodyPr/>
-                    <a:lstStyle/>
-                    <a:p>
-                      <a:pPr latinLnBrk="1"/>
-                      <a:endParaRPr lang="ko-KR" altLang="en-US" sz="1200" dirty="0"/>
-                    </a:p>
-                  </a:txBody>
-                  <a:tcPr/>
-                </a:tc>
-              </a:tr>
-              <a:tr h="285752">
-                <a:tc>
-                  <a:txBody>
-                    <a:bodyPr/>
-                    <a:lstStyle/>
-                    <a:p>
-                      <a:pPr latinLnBrk="1"/>
-                      <a:endParaRPr lang="ko-KR" altLang="en-US" sz="1200"/>
-                    </a:p>
-                  </a:txBody>
-                  <a:tcPr/>
-                </a:tc>
-                <a:tc>
-                  <a:txBody>
-                    <a:bodyPr/>
-                    <a:lstStyle/>
-                    <a:p>
-                      <a:pPr latinLnBrk="1"/>
-                      <a:endParaRPr lang="ko-KR" altLang="en-US" sz="1200" dirty="0"/>
-                    </a:p>
-                  </a:txBody>
-                  <a:tcPr/>
-                </a:tc>
-                <a:tc>
-                  <a:txBody>
-                    <a:bodyPr/>
-                    <a:lstStyle/>
-                    <a:p>
-                      <a:pPr latinLnBrk="1"/>
-                      <a:endParaRPr lang="ko-KR" altLang="en-US" sz="1200"/>
-                    </a:p>
-                  </a:txBody>
-                  <a:tcPr/>
-                </a:tc>
-                <a:tc>
-                  <a:txBody>
-                    <a:bodyPr/>
-                    <a:lstStyle/>
-                    <a:p>
-                      <a:pPr latinLnBrk="1"/>
-                      <a:endParaRPr lang="ko-KR" altLang="en-US" sz="1200"/>
-                    </a:p>
-                  </a:txBody>
-                  <a:tcPr/>
-                </a:tc>
-                <a:tc>
-                  <a:txBody>
-                    <a:bodyPr/>
-                    <a:lstStyle/>
-                    <a:p>
-                      <a:pPr latinLnBrk="1"/>
-                      <a:endParaRPr lang="ko-KR" altLang="en-US" sz="1200" dirty="0"/>
-                    </a:p>
-                  </a:txBody>
-                  <a:tcPr/>
-                </a:tc>
-              </a:tr>
-              <a:tr h="285752">
-                <a:tc>
-                  <a:txBody>
-                    <a:bodyPr/>
-                    <a:lstStyle/>
-                    <a:p>
-                      <a:pPr latinLnBrk="1"/>
-                      <a:endParaRPr lang="ko-KR" altLang="en-US" sz="1200" dirty="0"/>
-                    </a:p>
-                  </a:txBody>
-                  <a:tcPr/>
-                </a:tc>
-                <a:tc>
-                  <a:txBody>
-                    <a:bodyPr/>
-                    <a:lstStyle/>
-                    <a:p>
-                      <a:pPr latinLnBrk="1"/>
-                      <a:endParaRPr lang="ko-KR" altLang="en-US" sz="1200" dirty="0"/>
-                    </a:p>
-                  </a:txBody>
-                  <a:tcPr/>
-                </a:tc>
-                <a:tc>
-                  <a:txBody>
-                    <a:bodyPr/>
-                    <a:lstStyle/>
-                    <a:p>
-                      <a:pPr latinLnBrk="1"/>
-                      <a:endParaRPr lang="ko-KR" altLang="en-US" sz="1200"/>
-                    </a:p>
-                  </a:txBody>
-                  <a:tcPr/>
-                </a:tc>
-                <a:tc>
-                  <a:txBody>
-                    <a:bodyPr/>
-                    <a:lstStyle/>
-                    <a:p>
-                      <a:pPr latinLnBrk="1"/>
-                      <a:endParaRPr lang="ko-KR" altLang="en-US" sz="1200"/>
-                    </a:p>
-                  </a:txBody>
-                  <a:tcPr/>
-                </a:tc>
-                <a:tc>
-                  <a:txBody>
-                    <a:bodyPr/>
-                    <a:lstStyle/>
-                    <a:p>
-                      <a:pPr latinLnBrk="1"/>
-                      <a:endParaRPr lang="ko-KR" altLang="en-US" sz="1200" dirty="0"/>
-                    </a:p>
-                  </a:txBody>
-                  <a:tcPr/>
-                </a:tc>
-              </a:tr>
-              <a:tr h="285752">
-                <a:tc>
-                  <a:txBody>
-                    <a:bodyPr/>
-                    <a:lstStyle/>
-                    <a:p>
-                      <a:pPr latinLnBrk="1"/>
-                      <a:endParaRPr lang="ko-KR" altLang="en-US" sz="1200"/>
-                    </a:p>
-                  </a:txBody>
-                  <a:tcPr/>
-                </a:tc>
-                <a:tc>
-                  <a:txBody>
-                    <a:bodyPr/>
-                    <a:lstStyle/>
-                    <a:p>
-                      <a:pPr latinLnBrk="1"/>
-                      <a:endParaRPr lang="ko-KR" altLang="en-US" sz="1200" dirty="0"/>
-                    </a:p>
-                  </a:txBody>
-                  <a:tcPr/>
-                </a:tc>
-                <a:tc>
-                  <a:txBody>
-                    <a:bodyPr/>
-                    <a:lstStyle/>
-                    <a:p>
-                      <a:pPr latinLnBrk="1"/>
-                      <a:endParaRPr lang="ko-KR" altLang="en-US" sz="1200"/>
-                    </a:p>
-                  </a:txBody>
-                  <a:tcPr/>
-                </a:tc>
-                <a:tc>
-                  <a:txBody>
-                    <a:bodyPr/>
-                    <a:lstStyle/>
-                    <a:p>
-                      <a:pPr latinLnBrk="1"/>
-                      <a:endParaRPr lang="ko-KR" altLang="en-US" sz="1200"/>
-                    </a:p>
-                  </a:txBody>
-                  <a:tcPr/>
-                </a:tc>
-                <a:tc>
-                  <a:txBody>
-                    <a:bodyPr/>
-                    <a:lstStyle/>
-                    <a:p>
-                      <a:pPr latinLnBrk="1"/>
-                      <a:endParaRPr lang="ko-KR" altLang="en-US" sz="1200" dirty="0"/>
-                    </a:p>
-                  </a:txBody>
-                  <a:tcPr/>
-                </a:tc>
-              </a:tr>
-              <a:tr h="285752">
-                <a:tc>
-                  <a:txBody>
-                    <a:bodyPr/>
-                    <a:lstStyle/>
-                    <a:p>
-                      <a:pPr latinLnBrk="1"/>
-                      <a:endParaRPr lang="ko-KR" altLang="en-US" sz="1200"/>
-                    </a:p>
-                  </a:txBody>
-                  <a:tcPr/>
-                </a:tc>
-                <a:tc>
-                  <a:txBody>
-                    <a:bodyPr/>
-                    <a:lstStyle/>
-                    <a:p>
-                      <a:pPr latinLnBrk="1"/>
-                      <a:endParaRPr lang="ko-KR" altLang="en-US" sz="1200" dirty="0"/>
-                    </a:p>
-                  </a:txBody>
-                  <a:tcPr/>
-                </a:tc>
-                <a:tc>
-                  <a:txBody>
-                    <a:bodyPr/>
-                    <a:lstStyle/>
-                    <a:p>
-                      <a:pPr latinLnBrk="1"/>
-                      <a:endParaRPr lang="ko-KR" altLang="en-US" sz="1200"/>
-                    </a:p>
-                  </a:txBody>
-                  <a:tcPr/>
-                </a:tc>
-                <a:tc>
-                  <a:txBody>
-                    <a:bodyPr/>
-                    <a:lstStyle/>
-                    <a:p>
-                      <a:pPr latinLnBrk="1"/>
-                      <a:endParaRPr lang="ko-KR" altLang="en-US" sz="1200" dirty="0"/>
-                    </a:p>
-                  </a:txBody>
-                  <a:tcPr/>
-                </a:tc>
-                <a:tc>
-                  <a:txBody>
-                    <a:bodyPr/>
-                    <a:lstStyle/>
-                    <a:p>
-                      <a:pPr latinLnBrk="1"/>
-                      <a:endParaRPr lang="ko-KR" altLang="en-US" sz="1200" dirty="0"/>
-                    </a:p>
-                  </a:txBody>
-                  <a:tcPr/>
-                </a:tc>
-              </a:tr>
-            </a:tbl>
-          </a:graphicData>
-        </a:graphic>
-      </p:graphicFrame>
-      <p:sp>
-        <p:nvSpPr>
-          <p:cNvPr id="16" name="TextBox 15"/>
-          <p:cNvSpPr txBox="1"/>
-          <p:nvPr/>
-        </p:nvSpPr>
-        <p:spPr>
-          <a:xfrm>
-            <a:off x="357158" y="1571612"/>
-            <a:ext cx="646331" cy="369332"/>
-          </a:xfrm>
-          <a:prstGeom prst="rect">
-            <a:avLst/>
-          </a:prstGeom>
-          <a:noFill/>
-        </p:spPr>
-        <p:txBody>
-          <a:bodyPr wrap="none" rtlCol="0">
-            <a:spAutoFit/>
-          </a:bodyPr>
-          <a:lstStyle/>
-          <a:p>
-            <a:r>
-              <a:rPr lang="ko-KR" altLang="en-US" dirty="0" smtClean="0"/>
-              <a:t>날짜</a:t>
-            </a:r>
-            <a:endParaRPr lang="en-US" altLang="ko-KR" dirty="0" smtClean="0"/>
-          </a:p>
-        </p:txBody>
-      </p:sp>
-      <p:sp>
-        <p:nvSpPr>
-          <p:cNvPr id="17" name="직사각형 16"/>
-          <p:cNvSpPr/>
-          <p:nvPr/>
-        </p:nvSpPr>
-        <p:spPr>
-          <a:xfrm>
-            <a:off x="1000100" y="1643050"/>
-            <a:ext cx="785818" cy="214314"/>
-          </a:xfrm>
-          <a:prstGeom prst="rect">
-            <a:avLst/>
-          </a:prstGeom>
-          <a:solidFill>
-            <a:schemeClr val="bg1"/>
-          </a:solidFill>
-          <a:ln>
-            <a:solidFill>
-              <a:schemeClr val="tx1"/>
-            </a:solidFill>
-          </a:ln>
-        </p:spPr>
-        <p:style>
-          <a:lnRef idx="2">
-            <a:schemeClr val="accent1">
-              <a:shade val="50000"/>
-            </a:schemeClr>
-          </a:lnRef>
-          <a:fillRef idx="1">
-            <a:schemeClr val="accent1"/>
-          </a:fillRef>
-          <a:effectRef idx="0">
-            <a:schemeClr val="accent1"/>
-          </a:effectRef>
-          <a:fontRef idx="minor">
-            <a:schemeClr val="lt1"/>
-          </a:fontRef>
-        </p:style>
-        <p:txBody>
-          <a:bodyPr rtlCol="0" anchor="ctr"/>
-          <a:lstStyle/>
-          <a:p>
-            <a:pPr algn="ctr"/>
-            <a:endParaRPr lang="ko-KR" altLang="en-US"/>
-          </a:p>
-        </p:txBody>
-      </p:sp>
-      <p:sp>
-        <p:nvSpPr>
-          <p:cNvPr id="19" name="모서리가 둥근 직사각형 18"/>
-          <p:cNvSpPr/>
-          <p:nvPr/>
-        </p:nvSpPr>
-        <p:spPr>
-          <a:xfrm>
-            <a:off x="3071802" y="1643050"/>
-            <a:ext cx="642942" cy="214314"/>
-          </a:xfrm>
-          <a:prstGeom prst="roundRect">
-            <a:avLst/>
-          </a:prstGeom>
-        </p:spPr>
-        <p:style>
-          <a:lnRef idx="2">
-            <a:schemeClr val="accent1">
-              <a:shade val="50000"/>
-            </a:schemeClr>
-          </a:lnRef>
-          <a:fillRef idx="1">
-            <a:schemeClr val="accent1"/>
-          </a:fillRef>
-          <a:effectRef idx="0">
-            <a:schemeClr val="accent1"/>
-          </a:effectRef>
-          <a:fontRef idx="minor">
-            <a:schemeClr val="lt1"/>
-          </a:fontRef>
-        </p:style>
-        <p:txBody>
-          <a:bodyPr rtlCol="0" anchor="ctr"/>
-          <a:lstStyle/>
-          <a:p>
-            <a:pPr algn="ctr"/>
-            <a:r>
-              <a:rPr lang="ko-KR" altLang="en-US" sz="1100" dirty="0" smtClean="0"/>
-              <a:t>검색</a:t>
-            </a:r>
-            <a:endParaRPr lang="en-US" altLang="ko-KR" sz="1100" dirty="0" smtClean="0"/>
-          </a:p>
-        </p:txBody>
-      </p:sp>
-      <p:sp>
-        <p:nvSpPr>
-          <p:cNvPr id="25" name="직사각형 24"/>
-          <p:cNvSpPr/>
-          <p:nvPr/>
-        </p:nvSpPr>
-        <p:spPr>
-          <a:xfrm>
-            <a:off x="7358082" y="1643050"/>
-            <a:ext cx="1357322" cy="214314"/>
-          </a:xfrm>
-          <a:prstGeom prst="rect">
-            <a:avLst/>
-          </a:prstGeom>
-        </p:spPr>
-        <p:style>
-          <a:lnRef idx="2">
-            <a:schemeClr val="accent1">
-              <a:shade val="50000"/>
-            </a:schemeClr>
-          </a:lnRef>
-          <a:fillRef idx="1">
-            <a:schemeClr val="accent1"/>
-          </a:fillRef>
-          <a:effectRef idx="0">
-            <a:schemeClr val="accent1"/>
-          </a:effectRef>
-          <a:fontRef idx="minor">
-            <a:schemeClr val="lt1"/>
-          </a:fontRef>
-        </p:style>
-        <p:txBody>
-          <a:bodyPr rtlCol="0" anchor="ctr"/>
-          <a:lstStyle/>
-          <a:p>
-            <a:pPr algn="ctr"/>
-            <a:r>
-              <a:rPr lang="ko-KR" altLang="en-US" sz="1200" dirty="0" smtClean="0"/>
-              <a:t>조정신청</a:t>
-            </a:r>
-            <a:endParaRPr lang="ko-KR" altLang="en-US" sz="1200" dirty="0"/>
-          </a:p>
-        </p:txBody>
-      </p:sp>
-      <p:sp>
-        <p:nvSpPr>
-          <p:cNvPr id="26" name="직사각형 25"/>
-          <p:cNvSpPr/>
-          <p:nvPr/>
-        </p:nvSpPr>
-        <p:spPr>
-          <a:xfrm>
-            <a:off x="2214546" y="1643050"/>
-            <a:ext cx="785818" cy="214314"/>
-          </a:xfrm>
-          <a:prstGeom prst="rect">
-            <a:avLst/>
-          </a:prstGeom>
-          <a:solidFill>
-            <a:schemeClr val="bg1"/>
-          </a:solidFill>
-          <a:ln>
-            <a:solidFill>
-              <a:schemeClr val="tx1"/>
-            </a:solidFill>
-          </a:ln>
-        </p:spPr>
-        <p:style>
-          <a:lnRef idx="2">
-            <a:schemeClr val="accent1">
-              <a:shade val="50000"/>
-            </a:schemeClr>
-          </a:lnRef>
-          <a:fillRef idx="1">
-            <a:schemeClr val="accent1"/>
-          </a:fillRef>
-          <a:effectRef idx="0">
-            <a:schemeClr val="accent1"/>
-          </a:effectRef>
-          <a:fontRef idx="minor">
-            <a:schemeClr val="lt1"/>
-          </a:fontRef>
-        </p:style>
-        <p:txBody>
-          <a:bodyPr rtlCol="0" anchor="ctr"/>
-          <a:lstStyle/>
-          <a:p>
-            <a:pPr algn="ctr"/>
-            <a:endParaRPr lang="ko-KR" altLang="en-US"/>
-          </a:p>
-        </p:txBody>
-      </p:sp>
-      <p:sp>
-        <p:nvSpPr>
-          <p:cNvPr id="30" name="TextBox 29"/>
-          <p:cNvSpPr txBox="1"/>
-          <p:nvPr/>
-        </p:nvSpPr>
-        <p:spPr>
-          <a:xfrm>
-            <a:off x="1857356" y="1571612"/>
-            <a:ext cx="328936" cy="338554"/>
-          </a:xfrm>
-          <a:prstGeom prst="rect">
-            <a:avLst/>
-          </a:prstGeom>
-          <a:noFill/>
-        </p:spPr>
-        <p:txBody>
-          <a:bodyPr wrap="none" rtlCol="0">
-            <a:spAutoFit/>
-          </a:bodyPr>
-          <a:lstStyle/>
-          <a:p>
-            <a:r>
-              <a:rPr lang="en-US" altLang="ko-KR" sz="1600" dirty="0" smtClean="0"/>
-              <a:t>~</a:t>
-            </a:r>
-          </a:p>
-        </p:txBody>
-      </p:sp>
-      <p:sp>
-        <p:nvSpPr>
-          <p:cNvPr id="31" name="TextBox 30"/>
-          <p:cNvSpPr txBox="1"/>
-          <p:nvPr/>
-        </p:nvSpPr>
-        <p:spPr>
-          <a:xfrm>
-            <a:off x="151582" y="357166"/>
-            <a:ext cx="2845651" cy="369332"/>
-          </a:xfrm>
-          <a:prstGeom prst="rect">
-            <a:avLst/>
-          </a:prstGeom>
-          <a:noFill/>
-        </p:spPr>
-        <p:txBody>
-          <a:bodyPr wrap="none" rtlCol="0">
-            <a:spAutoFit/>
-          </a:bodyPr>
-          <a:lstStyle/>
-          <a:p>
-            <a:r>
-              <a:rPr lang="en-US" altLang="ko-KR" dirty="0" smtClean="0"/>
-              <a:t>User – </a:t>
-            </a:r>
-            <a:r>
-              <a:rPr lang="ko-KR" altLang="en-US" dirty="0" smtClean="0"/>
-              <a:t>출근</a:t>
-            </a:r>
-            <a:r>
-              <a:rPr lang="en-US" altLang="ko-KR" dirty="0" smtClean="0"/>
-              <a:t>, </a:t>
-            </a:r>
-            <a:r>
-              <a:rPr lang="ko-KR" altLang="en-US" dirty="0" smtClean="0"/>
-              <a:t>조회 시 팝업</a:t>
             </a:r>
             <a:endParaRPr lang="en-US" altLang="ko-KR" dirty="0" smtClean="0"/>
           </a:p>

</xml_diff>